<commit_message>
WNMA project complete review
</commit_message>
<xml_diff>
--- a/Wireless Networks for Mobile Applications/Project/Presentation/Presentation.pptx
+++ b/Wireless Networks for Mobile Applications/Project/Presentation/Presentation.pptx
@@ -13,10 +13,10 @@
     <p:sldId id="258" r:id="rId4"/>
     <p:sldId id="260" r:id="rId5"/>
     <p:sldId id="261" r:id="rId6"/>
-    <p:sldId id="262" r:id="rId7"/>
-    <p:sldId id="263" r:id="rId8"/>
-    <p:sldId id="268" r:id="rId9"/>
-    <p:sldId id="264" r:id="rId10"/>
+    <p:sldId id="264" r:id="rId7"/>
+    <p:sldId id="262" r:id="rId8"/>
+    <p:sldId id="263" r:id="rId9"/>
+    <p:sldId id="268" r:id="rId10"/>
     <p:sldId id="265" r:id="rId11"/>
     <p:sldId id="270" r:id="rId12"/>
     <p:sldId id="269" r:id="rId13"/>
@@ -213,7 +213,7 @@
           <a:p>
             <a:fld id="{0E4AAC6D-2322-45B9-8ECA-34DF280B0776}" type="datetimeFigureOut">
               <a:rPr lang="en-US" smtClean="0"/>
-              <a:t>12/24/2024</a:t>
+              <a:t>1/1/2025</a:t>
             </a:fld>
             <a:endParaRPr lang="en-US"/>
           </a:p>
@@ -2190,7 +2190,7 @@
               <a:rPr lang="en-US" dirty="0">
                 <a:latin typeface="Aptos" panose="020B0004020202020204" pitchFamily="34" charset="0"/>
               </a:rPr>
-              <a:t> of XX</a:t>
+              <a:t> of 17</a:t>
             </a:r>
           </a:p>
         </p:txBody>
@@ -2319,7 +2319,7 @@
               <a:rPr lang="en-US" dirty="0">
                 <a:latin typeface="Aptos" panose="020B0004020202020204" pitchFamily="34" charset="0"/>
               </a:rPr>
-              <a:t> of XX</a:t>
+              <a:t> of 17</a:t>
             </a:r>
           </a:p>
         </p:txBody>
@@ -2411,94 +2411,80 @@
         </p:spPr>
         <p:txBody>
           <a:bodyPr>
-            <a:normAutofit fontScale="85000" lnSpcReduction="20000"/>
+            <a:normAutofit/>
           </a:bodyPr>
           <a:lstStyle/>
           <a:p>
             <a:r>
-              <a:rPr lang="en-GB" b="1" dirty="0">
+              <a:rPr lang="en-GB" sz="2400" b="1" dirty="0">
                 <a:latin typeface="Aptos" panose="020B0004020202020204" pitchFamily="34" charset="0"/>
               </a:rPr>
               <a:t>Findings</a:t>
             </a:r>
             <a:r>
+              <a:rPr lang="en-GB" sz="2400" dirty="0">
+                <a:latin typeface="Aptos" panose="020B0004020202020204" pitchFamily="34" charset="0"/>
+              </a:rPr>
+              <a:t>:</a:t>
+            </a:r>
+          </a:p>
+          <a:p>
+            <a:pPr lvl="1"/>
+            <a:r>
+              <a:rPr lang="en-GB" b="1" u="sng" dirty="0">
+                <a:latin typeface="Aptos" panose="020B0004020202020204" pitchFamily="34" charset="0"/>
+              </a:rPr>
+              <a:t>Latency</a:t>
+            </a:r>
+            <a:r>
               <a:rPr lang="en-GB" dirty="0">
                 <a:latin typeface="Aptos" panose="020B0004020202020204" pitchFamily="34" charset="0"/>
               </a:rPr>
-              <a:t>:</a:t>
+              <a:t>: Edge setup achieved network delay (ND) of &lt;20ms, outperforming cloud setups which showed &gt;50ms delay.</a:t>
             </a:r>
           </a:p>
           <a:p>
             <a:pPr lvl="1"/>
             <a:r>
+              <a:rPr lang="en-GB" b="1" u="sng" dirty="0">
+                <a:latin typeface="Aptos" panose="020B0004020202020204" pitchFamily="34" charset="0"/>
+              </a:rPr>
+              <a:t>Virtualization</a:t>
+            </a:r>
+            <a:r>
               <a:rPr lang="en-GB" dirty="0">
                 <a:latin typeface="Aptos" panose="020B0004020202020204" pitchFamily="34" charset="0"/>
               </a:rPr>
-              <a:t>Latency: Edge setup achieved network delay (ND) of &lt;20ms, outperforming cloud setups which showed &gt;50ms delay.</a:t>
+              <a:t>: Containers delivered near-bare-metal performance, while hypervisor virtualization incurred ~30% higher processing delay.</a:t>
             </a:r>
           </a:p>
           <a:p>
             <a:pPr lvl="1"/>
             <a:r>
+              <a:rPr lang="en-GB" b="1" u="sng" dirty="0">
+                <a:latin typeface="Aptos" panose="020B0004020202020204" pitchFamily="34" charset="0"/>
+              </a:rPr>
+              <a:t>Resolution</a:t>
+            </a:r>
+            <a:r>
               <a:rPr lang="en-GB" dirty="0">
                 <a:latin typeface="Aptos" panose="020B0004020202020204" pitchFamily="34" charset="0"/>
               </a:rPr>
-              <a:t>Virtualization: Containers delivered near-bare-metal performance, while hypervisor virtualization incurred ~30% higher processing delay.</a:t>
-            </a:r>
-          </a:p>
-          <a:p>
-            <a:pPr lvl="1"/>
-            <a:r>
-              <a:rPr lang="en-GB" dirty="0">
-                <a:latin typeface="Aptos" panose="020B0004020202020204" pitchFamily="34" charset="0"/>
-              </a:rPr>
-              <a:t>Resolution: Full HD processing times at the edge were significantly better compared to centralized cloud setups.</a:t>
-            </a:r>
-          </a:p>
-          <a:p>
-            <a:r>
-              <a:rPr lang="en-GB" b="1" dirty="0">
-                <a:latin typeface="Aptos" panose="020B0004020202020204" pitchFamily="34" charset="0"/>
-              </a:rPr>
-              <a:t>Implications</a:t>
-            </a:r>
-            <a:r>
-              <a:rPr lang="en-GB" dirty="0">
-                <a:latin typeface="Aptos" panose="020B0004020202020204" pitchFamily="34" charset="0"/>
-              </a:rPr>
-              <a:t>:</a:t>
-            </a:r>
-          </a:p>
-          <a:p>
-            <a:pPr lvl="1"/>
-            <a:r>
-              <a:rPr lang="en-GB" dirty="0">
-                <a:latin typeface="Aptos" panose="020B0004020202020204" pitchFamily="34" charset="0"/>
-              </a:rPr>
-              <a:t>Edge computing enables high-quality gaming with latency &lt;70ms, essential for immersive experiences.</a:t>
-            </a:r>
-          </a:p>
-          <a:p>
-            <a:pPr lvl="1"/>
-            <a:r>
-              <a:rPr lang="en-GB" dirty="0">
-                <a:latin typeface="Aptos" panose="020B0004020202020204" pitchFamily="34" charset="0"/>
-              </a:rPr>
-              <a:t>Cloud setups, despite better computational resources, fall short in latency-critical scenarios like gaming.</a:t>
-            </a:r>
-          </a:p>
-          <a:p>
-            <a:r>
-              <a:rPr lang="en-GB" b="1" dirty="0">
+              <a:t>: Full HD processing times at the edge were significantly better compared to centralized cloud setups.</a:t>
+            </a:r>
+          </a:p>
+          <a:p>
+            <a:r>
+              <a:rPr lang="en-GB" sz="2600" b="1" dirty="0">
                 <a:latin typeface="Aptos" panose="020B0004020202020204" pitchFamily="34" charset="0"/>
               </a:rPr>
               <a:t>Conclusion</a:t>
             </a:r>
             <a:r>
-              <a:rPr lang="en-GB" dirty="0">
-                <a:latin typeface="Aptos" panose="020B0004020202020204" pitchFamily="34" charset="0"/>
-              </a:rPr>
-              <a:t>: Proximity of computational resources in edge computing is critical for enhancing user experience in mobile gaming applications.</a:t>
+              <a:rPr lang="en-GB" sz="2600" dirty="0">
+                <a:latin typeface="Aptos" panose="020B0004020202020204" pitchFamily="34" charset="0"/>
+              </a:rPr>
+              <a:t>: Proximity of computational resources crucial to enhance UX.</a:t>
             </a:r>
           </a:p>
         </p:txBody>
@@ -2535,7 +2521,7 @@
               <a:rPr lang="en-US" dirty="0">
                 <a:latin typeface="Aptos" panose="020B0004020202020204" pitchFamily="34" charset="0"/>
               </a:rPr>
-              <a:t> of XX</a:t>
+              <a:t> of 17</a:t>
             </a:r>
           </a:p>
         </p:txBody>
@@ -2663,7 +2649,7 @@
               <a:rPr lang="en-US" dirty="0">
                 <a:latin typeface="Aptos" panose="020B0004020202020204" pitchFamily="34" charset="0"/>
               </a:rPr>
-              <a:t> of XX</a:t>
+              <a:t> of 17</a:t>
             </a:r>
           </a:p>
         </p:txBody>
@@ -2796,7 +2782,7 @@
         <p:spPr>
           <a:xfrm>
             <a:off x="625960" y="1406413"/>
-            <a:ext cx="7886700" cy="5169878"/>
+            <a:ext cx="7886700" cy="5086751"/>
           </a:xfrm>
         </p:spPr>
         <p:txBody>
@@ -2909,7 +2895,7 @@
               <a:rPr lang="en-US" sz="2200" dirty="0">
                 <a:latin typeface="Aptos" panose="020B0004020202020204" pitchFamily="34" charset="0"/>
               </a:rPr>
-              <a:t>Edge layers focus on real-time processing, security, and immediate business logic execution, ensuring a balanced workload.</a:t>
+              <a:t>Edge layers focus on real-time processing, security, and immediate business logic execution.</a:t>
             </a:r>
           </a:p>
         </p:txBody>
@@ -2936,15 +2922,18 @@
           <a:lstStyle/>
           <a:p>
             <a:fld id="{4D021CEB-2F22-4EA1-9BAF-E3833982B82A}" type="slidenum">
-              <a:rPr lang="en-US" smtClean="0"/>
+              <a:rPr lang="en-US" smtClean="0">
+                <a:latin typeface="Aptos" panose="020B0004020202020204" pitchFamily="34" charset="0"/>
+              </a:rPr>
               <a:pPr/>
               <a:t>14</a:t>
             </a:fld>
             <a:r>
-              <a:rPr lang="en-US"/>
-              <a:t> of XX</a:t>
-            </a:r>
-            <a:endParaRPr lang="en-US" dirty="0"/>
+              <a:rPr lang="en-US" dirty="0">
+                <a:latin typeface="Aptos" panose="020B0004020202020204" pitchFamily="34" charset="0"/>
+              </a:rPr>
+              <a:t> of 17</a:t>
+            </a:r>
           </a:p>
         </p:txBody>
       </p:sp>
@@ -3152,15 +3141,18 @@
           <a:lstStyle/>
           <a:p>
             <a:fld id="{4D021CEB-2F22-4EA1-9BAF-E3833982B82A}" type="slidenum">
-              <a:rPr lang="en-US" smtClean="0"/>
+              <a:rPr lang="en-US" smtClean="0">
+                <a:latin typeface="Aptos" panose="020B0004020202020204" pitchFamily="34" charset="0"/>
+              </a:rPr>
               <a:pPr/>
               <a:t>15</a:t>
             </a:fld>
             <a:r>
-              <a:rPr lang="en-US"/>
-              <a:t> of XX</a:t>
-            </a:r>
-            <a:endParaRPr lang="en-US" dirty="0"/>
+              <a:rPr lang="en-US" dirty="0">
+                <a:latin typeface="Aptos" panose="020B0004020202020204" pitchFamily="34" charset="0"/>
+              </a:rPr>
+              <a:t> of 17</a:t>
+            </a:r>
           </a:p>
         </p:txBody>
       </p:sp>
@@ -3402,7 +3394,7 @@
               <a:rPr lang="en-US" dirty="0">
                 <a:latin typeface="Aptos" panose="020B0004020202020204" pitchFamily="34" charset="0"/>
               </a:rPr>
-              <a:t> of XX</a:t>
+              <a:t> of 17</a:t>
             </a:r>
           </a:p>
         </p:txBody>
@@ -3729,7 +3721,7 @@
               <a:rPr lang="en-US" dirty="0">
                 <a:latin typeface="Aptos" panose="020B0004020202020204" pitchFamily="34" charset="0"/>
               </a:rPr>
-              <a:t> of XX</a:t>
+              <a:t> of 17</a:t>
             </a:r>
           </a:p>
         </p:txBody>
@@ -3875,7 +3867,34 @@
               <a:rPr lang="en-US" sz="2600" dirty="0">
                 <a:latin typeface="Aptos" panose="020B0004020202020204" pitchFamily="34" charset="0"/>
               </a:rPr>
-              <a:t>A study on Mobile Edge Computing (MEC)</a:t>
+              <a:t>Case studies </a:t>
+            </a:r>
+          </a:p>
+          <a:p>
+            <a:pPr lvl="1"/>
+            <a:r>
+              <a:rPr lang="en-US" sz="2600" dirty="0">
+                <a:latin typeface="Aptos" panose="020B0004020202020204" pitchFamily="34" charset="0"/>
+              </a:rPr>
+              <a:t>Mobile Edge Computing (MEC)</a:t>
+            </a:r>
+          </a:p>
+          <a:p>
+            <a:pPr lvl="1"/>
+            <a:r>
+              <a:rPr lang="en-US" sz="2600" dirty="0">
+                <a:latin typeface="Aptos" panose="020B0004020202020204" pitchFamily="34" charset="0"/>
+              </a:rPr>
+              <a:t>Mobile Gaming </a:t>
+            </a:r>
+          </a:p>
+          <a:p>
+            <a:pPr lvl="1"/>
+            <a:r>
+              <a:rPr lang="en-US" sz="2600" dirty="0">
+                <a:latin typeface="Aptos" panose="020B0004020202020204" pitchFamily="34" charset="0"/>
+              </a:rPr>
+              <a:t>Industrial Manufacturing</a:t>
             </a:r>
           </a:p>
           <a:p>
@@ -3887,36 +3906,6 @@
               <a:rPr lang="en-US" sz="2600" dirty="0">
                 <a:latin typeface="Aptos" panose="020B0004020202020204" pitchFamily="34" charset="0"/>
               </a:rPr>
-              <a:t>Case studies </a:t>
-            </a:r>
-          </a:p>
-          <a:p>
-            <a:pPr lvl="1"/>
-            <a:r>
-              <a:rPr lang="en-US" sz="2600" dirty="0">
-                <a:latin typeface="Aptos" panose="020B0004020202020204" pitchFamily="34" charset="0"/>
-              </a:rPr>
-              <a:t>Mobile Gaming </a:t>
-            </a:r>
-          </a:p>
-          <a:p>
-            <a:pPr lvl="1"/>
-            <a:r>
-              <a:rPr lang="en-US" sz="2600" dirty="0">
-                <a:latin typeface="Aptos" panose="020B0004020202020204" pitchFamily="34" charset="0"/>
-              </a:rPr>
-              <a:t>Industrial Manufacturing</a:t>
-            </a:r>
-          </a:p>
-          <a:p>
-            <a:pPr marL="514350" indent="-514350">
-              <a:buFont typeface="+mj-lt"/>
-              <a:buAutoNum type="arabicPeriod"/>
-            </a:pPr>
-            <a:r>
-              <a:rPr lang="en-US" sz="2600" dirty="0">
-                <a:latin typeface="Aptos" panose="020B0004020202020204" pitchFamily="34" charset="0"/>
-              </a:rPr>
               <a:t>Open research challenges</a:t>
             </a:r>
           </a:p>
@@ -3954,7 +3943,7 @@
               <a:rPr lang="en-US" dirty="0">
                 <a:latin typeface="Aptos" panose="020B0004020202020204" pitchFamily="34" charset="0"/>
               </a:rPr>
-              <a:t> of XX</a:t>
+              <a:t> of 17</a:t>
             </a:r>
           </a:p>
         </p:txBody>
@@ -4056,7 +4045,7 @@
               <a:rPr lang="en-US" dirty="0">
                 <a:latin typeface="Aptos" panose="020B0004020202020204" pitchFamily="34" charset="0"/>
               </a:rPr>
-              <a:t> of XX</a:t>
+              <a:t> of 17</a:t>
             </a:r>
           </a:p>
         </p:txBody>
@@ -4323,7 +4312,7 @@
               <a:rPr lang="en-US" dirty="0">
                 <a:latin typeface="Aptos" panose="020B0004020202020204" pitchFamily="34" charset="0"/>
               </a:rPr>
-              <a:t> of XX</a:t>
+              <a:t> of 17</a:t>
             </a:r>
           </a:p>
         </p:txBody>
@@ -4543,7 +4532,7 @@
               <a:rPr lang="en-US" dirty="0">
                 <a:latin typeface="Aptos" panose="020B0004020202020204" pitchFamily="34" charset="0"/>
               </a:rPr>
-              <a:t> of XX</a:t>
+              <a:t> of 17</a:t>
             </a:r>
           </a:p>
         </p:txBody>
@@ -4619,7 +4608,7 @@
           <p:cNvPr id="2" name="Titolo 1">
             <a:extLst>
               <a:ext uri="{FF2B5EF4-FFF2-40B4-BE49-F238E27FC236}">
-                <a16:creationId xmlns:a16="http://schemas.microsoft.com/office/drawing/2014/main" id="{84DB7B71-3E49-A59F-EA57-8E547D677822}"/>
+                <a16:creationId xmlns:a16="http://schemas.microsoft.com/office/drawing/2014/main" id="{76F3B2C1-6C20-4891-5B02-71D9324DDBBB}"/>
               </a:ext>
             </a:extLst>
           </p:cNvPr>
@@ -4641,181 +4630,8 @@
               <a:rPr lang="en-GB" sz="4000" dirty="0">
                 <a:latin typeface="Aptos" panose="020B0004020202020204" pitchFamily="34" charset="0"/>
               </a:rPr>
-              <a:t>Computing paradigms</a:t>
-            </a:r>
-          </a:p>
-        </p:txBody>
-      </p:sp>
-      <p:sp>
-        <p:nvSpPr>
-          <p:cNvPr id="3" name="Segnaposto contenuto 2">
-            <a:extLst>
-              <a:ext uri="{FF2B5EF4-FFF2-40B4-BE49-F238E27FC236}">
-                <a16:creationId xmlns:a16="http://schemas.microsoft.com/office/drawing/2014/main" id="{8D81842C-9091-6508-DA02-0FE1376D96AB}"/>
-              </a:ext>
-            </a:extLst>
-          </p:cNvPr>
-          <p:cNvSpPr>
-            <a:spLocks noGrp="1"/>
-          </p:cNvSpPr>
-          <p:nvPr>
-            <p:ph idx="1"/>
-          </p:nvPr>
-        </p:nvSpPr>
-        <p:spPr>
-          <a:xfrm>
-            <a:off x="625960" y="1406412"/>
-            <a:ext cx="7886700" cy="4883551"/>
-          </a:xfrm>
-        </p:spPr>
-        <p:txBody>
-          <a:bodyPr>
-            <a:noAutofit/>
-          </a:bodyPr>
-          <a:lstStyle/>
-          <a:p>
-            <a:pPr>
-              <a:spcBef>
-                <a:spcPts val="0"/>
-              </a:spcBef>
-              <a:spcAft>
-                <a:spcPts val="1200"/>
-              </a:spcAft>
-            </a:pPr>
-            <a:r>
-              <a:rPr lang="en-US" sz="2200" b="1" dirty="0">
-                <a:latin typeface="Aptos" panose="020B0004020202020204" pitchFamily="34" charset="0"/>
-              </a:rPr>
-              <a:t>Centralized Cloud Computing</a:t>
-            </a:r>
-            <a:r>
-              <a:rPr lang="en-US" sz="2200" dirty="0">
-                <a:latin typeface="Aptos" panose="020B0004020202020204" pitchFamily="34" charset="0"/>
-              </a:rPr>
-              <a:t>:  Processes all data in remote servers.</a:t>
-            </a:r>
-          </a:p>
-          <a:p>
-            <a:pPr>
-              <a:spcBef>
-                <a:spcPts val="0"/>
-              </a:spcBef>
-              <a:spcAft>
-                <a:spcPts val="1200"/>
-              </a:spcAft>
-            </a:pPr>
-            <a:r>
-              <a:rPr lang="en-US" sz="2200" b="1" dirty="0">
-                <a:latin typeface="Aptos" panose="020B0004020202020204" pitchFamily="34" charset="0"/>
-              </a:rPr>
-              <a:t>Fog Computing</a:t>
-            </a:r>
-            <a:r>
-              <a:rPr lang="en-US" sz="2200" dirty="0">
-                <a:latin typeface="Aptos" panose="020B0004020202020204" pitchFamily="34" charset="0"/>
-              </a:rPr>
-              <a:t>: Localized processing on network devices like routers.</a:t>
-            </a:r>
-            <a:endParaRPr lang="en-US" sz="2200" b="1" dirty="0">
-              <a:latin typeface="Aptos" panose="020B0004020202020204" pitchFamily="34" charset="0"/>
-            </a:endParaRPr>
-          </a:p>
-          <a:p>
-            <a:pPr>
-              <a:spcBef>
-                <a:spcPts val="0"/>
-              </a:spcBef>
-              <a:spcAft>
-                <a:spcPts val="1200"/>
-              </a:spcAft>
-            </a:pPr>
-            <a:r>
-              <a:rPr lang="en-US" sz="2200" b="1" dirty="0">
-                <a:latin typeface="Aptos" panose="020B0004020202020204" pitchFamily="34" charset="0"/>
-              </a:rPr>
-              <a:t>Cloudlet Computing</a:t>
-            </a:r>
-            <a:r>
-              <a:rPr lang="en-US" sz="2200" dirty="0">
-                <a:latin typeface="Aptos" panose="020B0004020202020204" pitchFamily="34" charset="0"/>
-              </a:rPr>
-              <a:t>: Small servers near IoT devices for low-latency tasks.</a:t>
-            </a:r>
-          </a:p>
-          <a:p>
-            <a:pPr>
-              <a:spcBef>
-                <a:spcPts val="0"/>
-              </a:spcBef>
-              <a:spcAft>
-                <a:spcPts val="1200"/>
-              </a:spcAft>
-            </a:pPr>
-            <a:r>
-              <a:rPr lang="en-US" sz="2200" b="1" dirty="0">
-                <a:latin typeface="Aptos" panose="020B0004020202020204" pitchFamily="34" charset="0"/>
-              </a:rPr>
-              <a:t>Mobile Edge Computing (MEC)</a:t>
-            </a:r>
-            <a:r>
-              <a:rPr lang="en-US" sz="2200" dirty="0">
-                <a:latin typeface="Aptos" panose="020B0004020202020204" pitchFamily="34" charset="0"/>
-              </a:rPr>
-              <a:t>: Computing at mobile network edges for real-time responses.</a:t>
-            </a:r>
-            <a:endParaRPr lang="en-US" sz="2200" b="1" dirty="0">
-              <a:latin typeface="Aptos" panose="020B0004020202020204" pitchFamily="34" charset="0"/>
-            </a:endParaRPr>
-          </a:p>
-          <a:p>
-            <a:pPr>
-              <a:spcBef>
-                <a:spcPts val="0"/>
-              </a:spcBef>
-              <a:spcAft>
-                <a:spcPts val="1200"/>
-              </a:spcAft>
-            </a:pPr>
-            <a:r>
-              <a:rPr lang="en-US" sz="2200" b="1" dirty="0">
-                <a:latin typeface="Aptos" panose="020B0004020202020204" pitchFamily="34" charset="0"/>
-              </a:rPr>
-              <a:t>Mobile Ad Hoc Cloud (MAC)</a:t>
-            </a:r>
-            <a:r>
-              <a:rPr lang="en-US" sz="2200" dirty="0">
-                <a:latin typeface="Aptos" panose="020B0004020202020204" pitchFamily="34" charset="0"/>
-              </a:rPr>
-              <a:t>: Dynamic use of nearby mobile devices for processing.</a:t>
-            </a:r>
-            <a:endParaRPr lang="en-US" sz="2200" b="1" dirty="0">
-              <a:latin typeface="Aptos" panose="020B0004020202020204" pitchFamily="34" charset="0"/>
-            </a:endParaRPr>
-          </a:p>
-          <a:p>
-            <a:pPr>
-              <a:spcBef>
-                <a:spcPts val="0"/>
-              </a:spcBef>
-              <a:spcAft>
-                <a:spcPts val="1200"/>
-              </a:spcAft>
-            </a:pPr>
-            <a:r>
-              <a:rPr lang="en-US" sz="2200" b="1" dirty="0">
-                <a:latin typeface="Aptos" panose="020B0004020202020204" pitchFamily="34" charset="0"/>
-              </a:rPr>
-              <a:t>Hybrid Computing</a:t>
-            </a:r>
-            <a:r>
-              <a:rPr lang="en-US" sz="2200" dirty="0">
-                <a:latin typeface="Aptos" panose="020B0004020202020204" pitchFamily="34" charset="0"/>
-              </a:rPr>
-              <a:t>: Combines cloud and edge for balanced performance.</a:t>
-            </a:r>
-            <a:endParaRPr lang="en-GB" sz="2200" dirty="0">
-              <a:latin typeface="Aptos" panose="020B0004020202020204" pitchFamily="34" charset="0"/>
-            </a:endParaRPr>
+              <a:t>Edge computing applications</a:t>
+            </a:r>
           </a:p>
         </p:txBody>
       </p:sp>
@@ -4824,7 +4640,7 @@
           <p:cNvPr id="4" name="Segnaposto numero diapositiva 3">
             <a:extLst>
               <a:ext uri="{FF2B5EF4-FFF2-40B4-BE49-F238E27FC236}">
-                <a16:creationId xmlns:a16="http://schemas.microsoft.com/office/drawing/2014/main" id="{18C5C538-5146-A10E-05AE-7147107C63E0}"/>
+                <a16:creationId xmlns:a16="http://schemas.microsoft.com/office/drawing/2014/main" id="{33BCA6AB-5E41-A33E-5A1E-1B3E7BE516EC}"/>
               </a:ext>
             </a:extLst>
           </p:cNvPr>
@@ -4851,449 +4667,7 @@
               <a:rPr lang="en-US" dirty="0">
                 <a:latin typeface="Aptos" panose="020B0004020202020204" pitchFamily="34" charset="0"/>
               </a:rPr>
-              <a:t> of XX</a:t>
-            </a:r>
-          </a:p>
-        </p:txBody>
-      </p:sp>
-    </p:spTree>
-    <p:extLst>
-      <p:ext uri="{BB962C8B-B14F-4D97-AF65-F5344CB8AC3E}">
-        <p14:creationId xmlns:p14="http://schemas.microsoft.com/office/powerpoint/2010/main" val="4072636620"/>
-      </p:ext>
-    </p:extLst>
-  </p:cSld>
-  <p:clrMapOvr>
-    <a:masterClrMapping/>
-  </p:clrMapOvr>
-</p:sld>
-</file>
-
-<file path=ppt/slides/slide7.xml><?xml version="1.0" encoding="utf-8"?>
-<p:sld xmlns:a="http://schemas.openxmlformats.org/drawingml/2006/main" xmlns:r="http://schemas.openxmlformats.org/officeDocument/2006/relationships" xmlns:p="http://schemas.openxmlformats.org/presentationml/2006/main">
-  <p:cSld>
-    <p:spTree>
-      <p:nvGrpSpPr>
-        <p:cNvPr id="1" name=""/>
-        <p:cNvGrpSpPr/>
-        <p:nvPr/>
-      </p:nvGrpSpPr>
-      <p:grpSpPr>
-        <a:xfrm>
-          <a:off x="0" y="0"/>
-          <a:ext cx="0" cy="0"/>
-          <a:chOff x="0" y="0"/>
-          <a:chExt cx="0" cy="0"/>
-        </a:xfrm>
-      </p:grpSpPr>
-      <p:sp>
-        <p:nvSpPr>
-          <p:cNvPr id="2" name="Titolo 1">
-            <a:extLst>
-              <a:ext uri="{FF2B5EF4-FFF2-40B4-BE49-F238E27FC236}">
-                <a16:creationId xmlns:a16="http://schemas.microsoft.com/office/drawing/2014/main" id="{FCB36F05-2DB2-EB71-8E5E-742A11CEE5B0}"/>
-              </a:ext>
-            </a:extLst>
-          </p:cNvPr>
-          <p:cNvSpPr>
-            <a:spLocks noGrp="1"/>
-          </p:cNvSpPr>
-          <p:nvPr>
-            <p:ph type="title"/>
-          </p:nvPr>
-        </p:nvSpPr>
-        <p:spPr/>
-        <p:txBody>
-          <a:bodyPr>
-            <a:noAutofit/>
-          </a:bodyPr>
-          <a:lstStyle/>
-          <a:p>
-            <a:r>
-              <a:rPr lang="en-US" sz="2800" dirty="0">
-                <a:latin typeface="Aptos" panose="020B0004020202020204" pitchFamily="34" charset="0"/>
-              </a:rPr>
-              <a:t>A study on Mobile Edge Computing (MEC)</a:t>
-            </a:r>
-            <a:endParaRPr lang="en-GB" sz="2800" dirty="0"/>
-          </a:p>
-        </p:txBody>
-      </p:sp>
-      <p:pic>
-        <p:nvPicPr>
-          <p:cNvPr id="6" name="Segnaposto contenuto 5">
-            <a:extLst>
-              <a:ext uri="{FF2B5EF4-FFF2-40B4-BE49-F238E27FC236}">
-                <a16:creationId xmlns:a16="http://schemas.microsoft.com/office/drawing/2014/main" id="{F8734891-186A-F4CD-EEE1-5EA4CFF74CA9}"/>
-              </a:ext>
-            </a:extLst>
-          </p:cNvPr>
-          <p:cNvPicPr>
-            <a:picLocks noGrp="1" noChangeAspect="1"/>
-          </p:cNvPicPr>
-          <p:nvPr>
-            <p:ph idx="1"/>
-          </p:nvPr>
-        </p:nvPicPr>
-        <p:blipFill>
-          <a:blip r:embed="rId2"/>
-          <a:stretch>
-            <a:fillRect/>
-          </a:stretch>
-        </p:blipFill>
-        <p:spPr>
-          <a:xfrm>
-            <a:off x="1028396" y="1260475"/>
-            <a:ext cx="7087208" cy="4351338"/>
-          </a:xfrm>
-        </p:spPr>
-      </p:pic>
-      <p:sp>
-        <p:nvSpPr>
-          <p:cNvPr id="4" name="Segnaposto numero diapositiva 3">
-            <a:extLst>
-              <a:ext uri="{FF2B5EF4-FFF2-40B4-BE49-F238E27FC236}">
-                <a16:creationId xmlns:a16="http://schemas.microsoft.com/office/drawing/2014/main" id="{E126EE7F-4D83-931A-46E6-BFBFB260AECD}"/>
-              </a:ext>
-            </a:extLst>
-          </p:cNvPr>
-          <p:cNvSpPr>
-            <a:spLocks noGrp="1"/>
-          </p:cNvSpPr>
-          <p:nvPr>
-            <p:ph type="sldNum" sz="quarter" idx="4"/>
-          </p:nvPr>
-        </p:nvSpPr>
-        <p:spPr/>
-        <p:txBody>
-          <a:bodyPr/>
-          <a:lstStyle/>
-          <a:p>
-            <a:fld id="{4D021CEB-2F22-4EA1-9BAF-E3833982B82A}" type="slidenum">
-              <a:rPr lang="en-US" smtClean="0">
-                <a:latin typeface="Aptos" panose="020B0004020202020204" pitchFamily="34" charset="0"/>
-              </a:rPr>
-              <a:pPr/>
-              <a:t>7</a:t>
-            </a:fld>
-            <a:r>
-              <a:rPr lang="en-US" dirty="0">
-                <a:latin typeface="Aptos" panose="020B0004020202020204" pitchFamily="34" charset="0"/>
-              </a:rPr>
-              <a:t> of XX</a:t>
-            </a:r>
-          </a:p>
-        </p:txBody>
-      </p:sp>
-      <p:sp>
-        <p:nvSpPr>
-          <p:cNvPr id="11" name="CasellaDiTesto 10">
-            <a:extLst>
-              <a:ext uri="{FF2B5EF4-FFF2-40B4-BE49-F238E27FC236}">
-                <a16:creationId xmlns:a16="http://schemas.microsoft.com/office/drawing/2014/main" id="{3A3A0075-1EDF-CD73-E5EC-6C91E068147E}"/>
-              </a:ext>
-            </a:extLst>
-          </p:cNvPr>
-          <p:cNvSpPr txBox="1"/>
-          <p:nvPr/>
-        </p:nvSpPr>
-        <p:spPr>
-          <a:xfrm>
-            <a:off x="1163782" y="5624658"/>
-            <a:ext cx="5551071" cy="369332"/>
-          </a:xfrm>
-          <a:prstGeom prst="rect">
-            <a:avLst/>
-          </a:prstGeom>
-          <a:noFill/>
-        </p:spPr>
-        <p:txBody>
-          <a:bodyPr wrap="none" rtlCol="0">
-            <a:spAutoFit/>
-          </a:bodyPr>
-          <a:lstStyle/>
-          <a:p>
-            <a:r>
-              <a:rPr lang="en-GB" b="1" dirty="0">
-                <a:latin typeface="Aptos" panose="020B0004020202020204" pitchFamily="34" charset="0"/>
-              </a:rPr>
-              <a:t>Figure 2.</a:t>
-            </a:r>
-            <a:r>
-              <a:rPr lang="en-GB" dirty="0">
-                <a:latin typeface="Aptos" panose="020B0004020202020204" pitchFamily="34" charset="0"/>
-              </a:rPr>
-              <a:t> </a:t>
-            </a:r>
-            <a:r>
-              <a:rPr lang="en-GB" sz="1800" b="0" i="0" u="none" strike="noStrike" baseline="0" dirty="0">
-                <a:latin typeface="Aptos" panose="020B0004020202020204" pitchFamily="34" charset="0"/>
-              </a:rPr>
-              <a:t>Mobility-aware hierarchical MEC framework.</a:t>
-            </a:r>
-            <a:r>
-              <a:rPr lang="en-GB" dirty="0">
-                <a:latin typeface="Aptos" panose="020B0004020202020204" pitchFamily="34" charset="0"/>
-              </a:rPr>
-              <a:t> </a:t>
-            </a:r>
-          </a:p>
-        </p:txBody>
-      </p:sp>
-    </p:spTree>
-    <p:extLst>
-      <p:ext uri="{BB962C8B-B14F-4D97-AF65-F5344CB8AC3E}">
-        <p14:creationId xmlns:p14="http://schemas.microsoft.com/office/powerpoint/2010/main" val="4004152936"/>
-      </p:ext>
-    </p:extLst>
-  </p:cSld>
-  <p:clrMapOvr>
-    <a:masterClrMapping/>
-  </p:clrMapOvr>
-</p:sld>
-</file>
-
-<file path=ppt/slides/slide8.xml><?xml version="1.0" encoding="utf-8"?>
-<p:sld xmlns:a="http://schemas.openxmlformats.org/drawingml/2006/main" xmlns:r="http://schemas.openxmlformats.org/officeDocument/2006/relationships" xmlns:p="http://schemas.openxmlformats.org/presentationml/2006/main">
-  <p:cSld>
-    <p:spTree>
-      <p:nvGrpSpPr>
-        <p:cNvPr id="1" name=""/>
-        <p:cNvGrpSpPr/>
-        <p:nvPr/>
-      </p:nvGrpSpPr>
-      <p:grpSpPr>
-        <a:xfrm>
-          <a:off x="0" y="0"/>
-          <a:ext cx="0" cy="0"/>
-          <a:chOff x="0" y="0"/>
-          <a:chExt cx="0" cy="0"/>
-        </a:xfrm>
-      </p:grpSpPr>
-      <p:sp>
-        <p:nvSpPr>
-          <p:cNvPr id="2" name="Titolo 1">
-            <a:extLst>
-              <a:ext uri="{FF2B5EF4-FFF2-40B4-BE49-F238E27FC236}">
-                <a16:creationId xmlns:a16="http://schemas.microsoft.com/office/drawing/2014/main" id="{3C0758D5-AC57-6F31-B599-B481D0B8D023}"/>
-              </a:ext>
-            </a:extLst>
-          </p:cNvPr>
-          <p:cNvSpPr>
-            <a:spLocks noGrp="1"/>
-          </p:cNvSpPr>
-          <p:nvPr>
-            <p:ph type="title"/>
-          </p:nvPr>
-        </p:nvSpPr>
-        <p:spPr/>
-        <p:txBody>
-          <a:bodyPr>
-            <a:noAutofit/>
-          </a:bodyPr>
-          <a:lstStyle/>
-          <a:p>
-            <a:r>
-              <a:rPr lang="en-US" sz="2800" dirty="0">
-                <a:latin typeface="Aptos" panose="020B0004020202020204" pitchFamily="34" charset="0"/>
-              </a:rPr>
-              <a:t>A study on Mobile Edge Computing (MEC)</a:t>
-            </a:r>
-            <a:endParaRPr lang="en-GB" sz="2800" dirty="0"/>
-          </a:p>
-        </p:txBody>
-      </p:sp>
-      <p:pic>
-        <p:nvPicPr>
-          <p:cNvPr id="6" name="Segnaposto contenuto 5">
-            <a:extLst>
-              <a:ext uri="{FF2B5EF4-FFF2-40B4-BE49-F238E27FC236}">
-                <a16:creationId xmlns:a16="http://schemas.microsoft.com/office/drawing/2014/main" id="{F20C8A2F-27C0-63F2-1EE9-FDC24AE04A39}"/>
-              </a:ext>
-            </a:extLst>
-          </p:cNvPr>
-          <p:cNvPicPr>
-            <a:picLocks noGrp="1" noChangeAspect="1"/>
-          </p:cNvPicPr>
-          <p:nvPr>
-            <p:ph idx="1"/>
-          </p:nvPr>
-        </p:nvPicPr>
-        <p:blipFill>
-          <a:blip r:embed="rId2"/>
-          <a:stretch>
-            <a:fillRect/>
-          </a:stretch>
-        </p:blipFill>
-        <p:spPr>
-          <a:xfrm>
-            <a:off x="27650" y="1897417"/>
-            <a:ext cx="4563568" cy="3154866"/>
-          </a:xfrm>
-        </p:spPr>
-      </p:pic>
-      <p:sp>
-        <p:nvSpPr>
-          <p:cNvPr id="4" name="Segnaposto numero diapositiva 3">
-            <a:extLst>
-              <a:ext uri="{FF2B5EF4-FFF2-40B4-BE49-F238E27FC236}">
-                <a16:creationId xmlns:a16="http://schemas.microsoft.com/office/drawing/2014/main" id="{F0585C01-1FBB-734F-7299-2D324FC21DBA}"/>
-              </a:ext>
-            </a:extLst>
-          </p:cNvPr>
-          <p:cNvSpPr>
-            <a:spLocks noGrp="1"/>
-          </p:cNvSpPr>
-          <p:nvPr>
-            <p:ph type="sldNum" sz="quarter" idx="4"/>
-          </p:nvPr>
-        </p:nvSpPr>
-        <p:spPr/>
-        <p:txBody>
-          <a:bodyPr/>
-          <a:lstStyle/>
-          <a:p>
-            <a:fld id="{4D021CEB-2F22-4EA1-9BAF-E3833982B82A}" type="slidenum">
-              <a:rPr lang="en-US" smtClean="0">
-                <a:latin typeface="Aptos" panose="020B0004020202020204" pitchFamily="34" charset="0"/>
-              </a:rPr>
-              <a:pPr/>
-              <a:t>8</a:t>
-            </a:fld>
-            <a:r>
-              <a:rPr lang="en-US" dirty="0">
-                <a:latin typeface="Aptos" panose="020B0004020202020204" pitchFamily="34" charset="0"/>
-              </a:rPr>
-              <a:t> of XX</a:t>
-            </a:r>
-          </a:p>
-        </p:txBody>
-      </p:sp>
-      <p:pic>
-        <p:nvPicPr>
-          <p:cNvPr id="8" name="Immagine 7">
-            <a:extLst>
-              <a:ext uri="{FF2B5EF4-FFF2-40B4-BE49-F238E27FC236}">
-                <a16:creationId xmlns:a16="http://schemas.microsoft.com/office/drawing/2014/main" id="{E6EF7038-2931-8DFA-BD91-A732BD81B15D}"/>
-              </a:ext>
-            </a:extLst>
-          </p:cNvPr>
-          <p:cNvPicPr>
-            <a:picLocks noChangeAspect="1"/>
-          </p:cNvPicPr>
-          <p:nvPr/>
-        </p:nvPicPr>
-        <p:blipFill>
-          <a:blip r:embed="rId3"/>
-          <a:stretch>
-            <a:fillRect/>
-          </a:stretch>
-        </p:blipFill>
-        <p:spPr>
-          <a:xfrm>
-            <a:off x="4591218" y="1885006"/>
-            <a:ext cx="4505527" cy="3305830"/>
-          </a:xfrm>
-          <a:prstGeom prst="rect">
-            <a:avLst/>
-          </a:prstGeom>
-        </p:spPr>
-      </p:pic>
-    </p:spTree>
-    <p:extLst>
-      <p:ext uri="{BB962C8B-B14F-4D97-AF65-F5344CB8AC3E}">
-        <p14:creationId xmlns:p14="http://schemas.microsoft.com/office/powerpoint/2010/main" val="3974262898"/>
-      </p:ext>
-    </p:extLst>
-  </p:cSld>
-  <p:clrMapOvr>
-    <a:masterClrMapping/>
-  </p:clrMapOvr>
-</p:sld>
-</file>
-
-<file path=ppt/slides/slide9.xml><?xml version="1.0" encoding="utf-8"?>
-<p:sld xmlns:a="http://schemas.openxmlformats.org/drawingml/2006/main" xmlns:r="http://schemas.openxmlformats.org/officeDocument/2006/relationships" xmlns:p="http://schemas.openxmlformats.org/presentationml/2006/main">
-  <p:cSld>
-    <p:spTree>
-      <p:nvGrpSpPr>
-        <p:cNvPr id="1" name=""/>
-        <p:cNvGrpSpPr/>
-        <p:nvPr/>
-      </p:nvGrpSpPr>
-      <p:grpSpPr>
-        <a:xfrm>
-          <a:off x="0" y="0"/>
-          <a:ext cx="0" cy="0"/>
-          <a:chOff x="0" y="0"/>
-          <a:chExt cx="0" cy="0"/>
-        </a:xfrm>
-      </p:grpSpPr>
-      <p:sp>
-        <p:nvSpPr>
-          <p:cNvPr id="2" name="Titolo 1">
-            <a:extLst>
-              <a:ext uri="{FF2B5EF4-FFF2-40B4-BE49-F238E27FC236}">
-                <a16:creationId xmlns:a16="http://schemas.microsoft.com/office/drawing/2014/main" id="{76F3B2C1-6C20-4891-5B02-71D9324DDBBB}"/>
-              </a:ext>
-            </a:extLst>
-          </p:cNvPr>
-          <p:cNvSpPr>
-            <a:spLocks noGrp="1"/>
-          </p:cNvSpPr>
-          <p:nvPr>
-            <p:ph type="title"/>
-          </p:nvPr>
-        </p:nvSpPr>
-        <p:spPr/>
-        <p:txBody>
-          <a:bodyPr>
-            <a:normAutofit/>
-          </a:bodyPr>
-          <a:lstStyle/>
-          <a:p>
-            <a:r>
-              <a:rPr lang="en-GB" sz="4000" dirty="0">
-                <a:latin typeface="Aptos" panose="020B0004020202020204" pitchFamily="34" charset="0"/>
-              </a:rPr>
-              <a:t>Edge computing applications</a:t>
-            </a:r>
-          </a:p>
-        </p:txBody>
-      </p:sp>
-      <p:sp>
-        <p:nvSpPr>
-          <p:cNvPr id="4" name="Segnaposto numero diapositiva 3">
-            <a:extLst>
-              <a:ext uri="{FF2B5EF4-FFF2-40B4-BE49-F238E27FC236}">
-                <a16:creationId xmlns:a16="http://schemas.microsoft.com/office/drawing/2014/main" id="{33BCA6AB-5E41-A33E-5A1E-1B3E7BE516EC}"/>
-              </a:ext>
-            </a:extLst>
-          </p:cNvPr>
-          <p:cNvSpPr>
-            <a:spLocks noGrp="1"/>
-          </p:cNvSpPr>
-          <p:nvPr>
-            <p:ph type="sldNum" sz="quarter" idx="4"/>
-          </p:nvPr>
-        </p:nvSpPr>
-        <p:spPr/>
-        <p:txBody>
-          <a:bodyPr/>
-          <a:lstStyle/>
-          <a:p>
-            <a:fld id="{4D021CEB-2F22-4EA1-9BAF-E3833982B82A}" type="slidenum">
-              <a:rPr lang="en-US" smtClean="0">
-                <a:latin typeface="Aptos" panose="020B0004020202020204" pitchFamily="34" charset="0"/>
-              </a:rPr>
-              <a:pPr/>
-              <a:t>9</a:t>
-            </a:fld>
-            <a:r>
-              <a:rPr lang="en-US" dirty="0">
-                <a:latin typeface="Aptos" panose="020B0004020202020204" pitchFamily="34" charset="0"/>
-              </a:rPr>
-              <a:t> of XX</a:t>
+              <a:t> of 17</a:t>
             </a:r>
           </a:p>
         </p:txBody>
@@ -5351,6 +4725,621 @@
     <p:extLst>
       <p:ext uri="{BB962C8B-B14F-4D97-AF65-F5344CB8AC3E}">
         <p14:creationId xmlns:p14="http://schemas.microsoft.com/office/powerpoint/2010/main" val="1903803709"/>
+      </p:ext>
+    </p:extLst>
+  </p:cSld>
+  <p:clrMapOvr>
+    <a:masterClrMapping/>
+  </p:clrMapOvr>
+</p:sld>
+</file>
+
+<file path=ppt/slides/slide7.xml><?xml version="1.0" encoding="utf-8"?>
+<p:sld xmlns:a="http://schemas.openxmlformats.org/drawingml/2006/main" xmlns:r="http://schemas.openxmlformats.org/officeDocument/2006/relationships" xmlns:p="http://schemas.openxmlformats.org/presentationml/2006/main">
+  <p:cSld>
+    <p:spTree>
+      <p:nvGrpSpPr>
+        <p:cNvPr id="1" name=""/>
+        <p:cNvGrpSpPr/>
+        <p:nvPr/>
+      </p:nvGrpSpPr>
+      <p:grpSpPr>
+        <a:xfrm>
+          <a:off x="0" y="0"/>
+          <a:ext cx="0" cy="0"/>
+          <a:chOff x="0" y="0"/>
+          <a:chExt cx="0" cy="0"/>
+        </a:xfrm>
+      </p:grpSpPr>
+      <p:sp>
+        <p:nvSpPr>
+          <p:cNvPr id="2" name="Titolo 1">
+            <a:extLst>
+              <a:ext uri="{FF2B5EF4-FFF2-40B4-BE49-F238E27FC236}">
+                <a16:creationId xmlns:a16="http://schemas.microsoft.com/office/drawing/2014/main" id="{84DB7B71-3E49-A59F-EA57-8E547D677822}"/>
+              </a:ext>
+            </a:extLst>
+          </p:cNvPr>
+          <p:cNvSpPr>
+            <a:spLocks noGrp="1"/>
+          </p:cNvSpPr>
+          <p:nvPr>
+            <p:ph type="title"/>
+          </p:nvPr>
+        </p:nvSpPr>
+        <p:spPr/>
+        <p:txBody>
+          <a:bodyPr>
+            <a:normAutofit/>
+          </a:bodyPr>
+          <a:lstStyle/>
+          <a:p>
+            <a:r>
+              <a:rPr lang="en-GB" sz="4000" dirty="0">
+                <a:latin typeface="Aptos" panose="020B0004020202020204" pitchFamily="34" charset="0"/>
+              </a:rPr>
+              <a:t>Computing paradigms</a:t>
+            </a:r>
+          </a:p>
+        </p:txBody>
+      </p:sp>
+      <p:sp>
+        <p:nvSpPr>
+          <p:cNvPr id="3" name="Segnaposto contenuto 2">
+            <a:extLst>
+              <a:ext uri="{FF2B5EF4-FFF2-40B4-BE49-F238E27FC236}">
+                <a16:creationId xmlns:a16="http://schemas.microsoft.com/office/drawing/2014/main" id="{8D81842C-9091-6508-DA02-0FE1376D96AB}"/>
+              </a:ext>
+            </a:extLst>
+          </p:cNvPr>
+          <p:cNvSpPr>
+            <a:spLocks noGrp="1"/>
+          </p:cNvSpPr>
+          <p:nvPr>
+            <p:ph idx="1"/>
+          </p:nvPr>
+        </p:nvSpPr>
+        <p:spPr>
+          <a:xfrm>
+            <a:off x="625960" y="1406412"/>
+            <a:ext cx="7886700" cy="4883551"/>
+          </a:xfrm>
+        </p:spPr>
+        <p:txBody>
+          <a:bodyPr>
+            <a:noAutofit/>
+          </a:bodyPr>
+          <a:lstStyle/>
+          <a:p>
+            <a:pPr>
+              <a:spcBef>
+                <a:spcPts val="0"/>
+              </a:spcBef>
+              <a:spcAft>
+                <a:spcPts val="1200"/>
+              </a:spcAft>
+            </a:pPr>
+            <a:r>
+              <a:rPr lang="en-US" sz="2200" b="1" dirty="0">
+                <a:latin typeface="Aptos" panose="020B0004020202020204" pitchFamily="34" charset="0"/>
+              </a:rPr>
+              <a:t>Centralized Cloud Computing</a:t>
+            </a:r>
+            <a:r>
+              <a:rPr lang="en-US" sz="2200" dirty="0">
+                <a:latin typeface="Aptos" panose="020B0004020202020204" pitchFamily="34" charset="0"/>
+              </a:rPr>
+              <a:t>:  Processes all data in remote servers.</a:t>
+            </a:r>
+          </a:p>
+          <a:p>
+            <a:pPr>
+              <a:spcBef>
+                <a:spcPts val="0"/>
+              </a:spcBef>
+              <a:spcAft>
+                <a:spcPts val="1200"/>
+              </a:spcAft>
+            </a:pPr>
+            <a:r>
+              <a:rPr lang="en-US" sz="2200" b="1" dirty="0">
+                <a:latin typeface="Aptos" panose="020B0004020202020204" pitchFamily="34" charset="0"/>
+              </a:rPr>
+              <a:t>Fog Computing</a:t>
+            </a:r>
+            <a:r>
+              <a:rPr lang="en-US" sz="2200" dirty="0">
+                <a:latin typeface="Aptos" panose="020B0004020202020204" pitchFamily="34" charset="0"/>
+              </a:rPr>
+              <a:t>: Localized processing on network devices like routers.</a:t>
+            </a:r>
+            <a:endParaRPr lang="en-US" sz="2200" b="1" dirty="0">
+              <a:latin typeface="Aptos" panose="020B0004020202020204" pitchFamily="34" charset="0"/>
+            </a:endParaRPr>
+          </a:p>
+          <a:p>
+            <a:pPr>
+              <a:spcBef>
+                <a:spcPts val="0"/>
+              </a:spcBef>
+              <a:spcAft>
+                <a:spcPts val="1200"/>
+              </a:spcAft>
+            </a:pPr>
+            <a:r>
+              <a:rPr lang="en-US" sz="2200" b="1" dirty="0">
+                <a:latin typeface="Aptos" panose="020B0004020202020204" pitchFamily="34" charset="0"/>
+              </a:rPr>
+              <a:t>Cloudlet Computing</a:t>
+            </a:r>
+            <a:r>
+              <a:rPr lang="en-US" sz="2200" dirty="0">
+                <a:latin typeface="Aptos" panose="020B0004020202020204" pitchFamily="34" charset="0"/>
+              </a:rPr>
+              <a:t>: Small servers near IoT devices for low-latency tasks.</a:t>
+            </a:r>
+          </a:p>
+          <a:p>
+            <a:pPr>
+              <a:spcBef>
+                <a:spcPts val="0"/>
+              </a:spcBef>
+              <a:spcAft>
+                <a:spcPts val="1200"/>
+              </a:spcAft>
+            </a:pPr>
+            <a:r>
+              <a:rPr lang="en-US" sz="2200" b="1" dirty="0">
+                <a:latin typeface="Aptos" panose="020B0004020202020204" pitchFamily="34" charset="0"/>
+              </a:rPr>
+              <a:t>Mobile Edge Computing (MEC)</a:t>
+            </a:r>
+            <a:r>
+              <a:rPr lang="en-US" sz="2200" dirty="0">
+                <a:latin typeface="Aptos" panose="020B0004020202020204" pitchFamily="34" charset="0"/>
+              </a:rPr>
+              <a:t>: Computing at mobile network edges for real-time responses.</a:t>
+            </a:r>
+            <a:endParaRPr lang="en-US" sz="2200" b="1" dirty="0">
+              <a:latin typeface="Aptos" panose="020B0004020202020204" pitchFamily="34" charset="0"/>
+            </a:endParaRPr>
+          </a:p>
+          <a:p>
+            <a:pPr>
+              <a:spcBef>
+                <a:spcPts val="0"/>
+              </a:spcBef>
+              <a:spcAft>
+                <a:spcPts val="1200"/>
+              </a:spcAft>
+            </a:pPr>
+            <a:r>
+              <a:rPr lang="en-US" sz="2200" b="1" dirty="0">
+                <a:latin typeface="Aptos" panose="020B0004020202020204" pitchFamily="34" charset="0"/>
+              </a:rPr>
+              <a:t>Mobile Ad Hoc Cloud (MAC)</a:t>
+            </a:r>
+            <a:r>
+              <a:rPr lang="en-US" sz="2200" dirty="0">
+                <a:latin typeface="Aptos" panose="020B0004020202020204" pitchFamily="34" charset="0"/>
+              </a:rPr>
+              <a:t>: Dynamic use of nearby mobile devices for processing.</a:t>
+            </a:r>
+            <a:endParaRPr lang="en-US" sz="2200" b="1" dirty="0">
+              <a:latin typeface="Aptos" panose="020B0004020202020204" pitchFamily="34" charset="0"/>
+            </a:endParaRPr>
+          </a:p>
+          <a:p>
+            <a:pPr>
+              <a:spcBef>
+                <a:spcPts val="0"/>
+              </a:spcBef>
+              <a:spcAft>
+                <a:spcPts val="1200"/>
+              </a:spcAft>
+            </a:pPr>
+            <a:r>
+              <a:rPr lang="en-US" sz="2200" b="1" dirty="0">
+                <a:latin typeface="Aptos" panose="020B0004020202020204" pitchFamily="34" charset="0"/>
+              </a:rPr>
+              <a:t>Hybrid Computing</a:t>
+            </a:r>
+            <a:r>
+              <a:rPr lang="en-US" sz="2200" dirty="0">
+                <a:latin typeface="Aptos" panose="020B0004020202020204" pitchFamily="34" charset="0"/>
+              </a:rPr>
+              <a:t>: Combines cloud and edge for balanced performance.</a:t>
+            </a:r>
+            <a:endParaRPr lang="en-GB" sz="2200" dirty="0">
+              <a:latin typeface="Aptos" panose="020B0004020202020204" pitchFamily="34" charset="0"/>
+            </a:endParaRPr>
+          </a:p>
+        </p:txBody>
+      </p:sp>
+      <p:sp>
+        <p:nvSpPr>
+          <p:cNvPr id="4" name="Segnaposto numero diapositiva 3">
+            <a:extLst>
+              <a:ext uri="{FF2B5EF4-FFF2-40B4-BE49-F238E27FC236}">
+                <a16:creationId xmlns:a16="http://schemas.microsoft.com/office/drawing/2014/main" id="{18C5C538-5146-A10E-05AE-7147107C63E0}"/>
+              </a:ext>
+            </a:extLst>
+          </p:cNvPr>
+          <p:cNvSpPr>
+            <a:spLocks noGrp="1"/>
+          </p:cNvSpPr>
+          <p:nvPr>
+            <p:ph type="sldNum" sz="quarter" idx="4"/>
+          </p:nvPr>
+        </p:nvSpPr>
+        <p:spPr/>
+        <p:txBody>
+          <a:bodyPr/>
+          <a:lstStyle/>
+          <a:p>
+            <a:fld id="{4D021CEB-2F22-4EA1-9BAF-E3833982B82A}" type="slidenum">
+              <a:rPr lang="en-US" smtClean="0">
+                <a:latin typeface="Aptos" panose="020B0004020202020204" pitchFamily="34" charset="0"/>
+              </a:rPr>
+              <a:pPr/>
+              <a:t>7</a:t>
+            </a:fld>
+            <a:r>
+              <a:rPr lang="en-US" dirty="0">
+                <a:latin typeface="Aptos" panose="020B0004020202020204" pitchFamily="34" charset="0"/>
+              </a:rPr>
+              <a:t> of 17</a:t>
+            </a:r>
+          </a:p>
+        </p:txBody>
+      </p:sp>
+    </p:spTree>
+    <p:extLst>
+      <p:ext uri="{BB962C8B-B14F-4D97-AF65-F5344CB8AC3E}">
+        <p14:creationId xmlns:p14="http://schemas.microsoft.com/office/powerpoint/2010/main" val="4072636620"/>
+      </p:ext>
+    </p:extLst>
+  </p:cSld>
+  <p:clrMapOvr>
+    <a:masterClrMapping/>
+  </p:clrMapOvr>
+</p:sld>
+</file>
+
+<file path=ppt/slides/slide8.xml><?xml version="1.0" encoding="utf-8"?>
+<p:sld xmlns:a="http://schemas.openxmlformats.org/drawingml/2006/main" xmlns:r="http://schemas.openxmlformats.org/officeDocument/2006/relationships" xmlns:p="http://schemas.openxmlformats.org/presentationml/2006/main">
+  <p:cSld>
+    <p:spTree>
+      <p:nvGrpSpPr>
+        <p:cNvPr id="1" name=""/>
+        <p:cNvGrpSpPr/>
+        <p:nvPr/>
+      </p:nvGrpSpPr>
+      <p:grpSpPr>
+        <a:xfrm>
+          <a:off x="0" y="0"/>
+          <a:ext cx="0" cy="0"/>
+          <a:chOff x="0" y="0"/>
+          <a:chExt cx="0" cy="0"/>
+        </a:xfrm>
+      </p:grpSpPr>
+      <p:sp>
+        <p:nvSpPr>
+          <p:cNvPr id="2" name="Titolo 1">
+            <a:extLst>
+              <a:ext uri="{FF2B5EF4-FFF2-40B4-BE49-F238E27FC236}">
+                <a16:creationId xmlns:a16="http://schemas.microsoft.com/office/drawing/2014/main" id="{FCB36F05-2DB2-EB71-8E5E-742A11CEE5B0}"/>
+              </a:ext>
+            </a:extLst>
+          </p:cNvPr>
+          <p:cNvSpPr>
+            <a:spLocks noGrp="1"/>
+          </p:cNvSpPr>
+          <p:nvPr>
+            <p:ph type="title"/>
+          </p:nvPr>
+        </p:nvSpPr>
+        <p:spPr/>
+        <p:txBody>
+          <a:bodyPr>
+            <a:noAutofit/>
+          </a:bodyPr>
+          <a:lstStyle/>
+          <a:p>
+            <a:r>
+              <a:rPr lang="en-US" sz="2800" dirty="0">
+                <a:latin typeface="Aptos" panose="020B0004020202020204" pitchFamily="34" charset="0"/>
+              </a:rPr>
+              <a:t>A study on Mobile Edge Computing (MEC)</a:t>
+            </a:r>
+            <a:endParaRPr lang="en-GB" sz="2800" dirty="0"/>
+          </a:p>
+        </p:txBody>
+      </p:sp>
+      <p:pic>
+        <p:nvPicPr>
+          <p:cNvPr id="6" name="Segnaposto contenuto 5">
+            <a:extLst>
+              <a:ext uri="{FF2B5EF4-FFF2-40B4-BE49-F238E27FC236}">
+                <a16:creationId xmlns:a16="http://schemas.microsoft.com/office/drawing/2014/main" id="{F8734891-186A-F4CD-EEE1-5EA4CFF74CA9}"/>
+              </a:ext>
+            </a:extLst>
+          </p:cNvPr>
+          <p:cNvPicPr>
+            <a:picLocks noGrp="1" noChangeAspect="1"/>
+          </p:cNvPicPr>
+          <p:nvPr>
+            <p:ph idx="1"/>
+          </p:nvPr>
+        </p:nvPicPr>
+        <p:blipFill>
+          <a:blip r:embed="rId2"/>
+          <a:stretch>
+            <a:fillRect/>
+          </a:stretch>
+        </p:blipFill>
+        <p:spPr>
+          <a:xfrm>
+            <a:off x="1028396" y="1260475"/>
+            <a:ext cx="7087208" cy="4351338"/>
+          </a:xfrm>
+        </p:spPr>
+      </p:pic>
+      <p:sp>
+        <p:nvSpPr>
+          <p:cNvPr id="4" name="Segnaposto numero diapositiva 3">
+            <a:extLst>
+              <a:ext uri="{FF2B5EF4-FFF2-40B4-BE49-F238E27FC236}">
+                <a16:creationId xmlns:a16="http://schemas.microsoft.com/office/drawing/2014/main" id="{E126EE7F-4D83-931A-46E6-BFBFB260AECD}"/>
+              </a:ext>
+            </a:extLst>
+          </p:cNvPr>
+          <p:cNvSpPr>
+            <a:spLocks noGrp="1"/>
+          </p:cNvSpPr>
+          <p:nvPr>
+            <p:ph type="sldNum" sz="quarter" idx="4"/>
+          </p:nvPr>
+        </p:nvSpPr>
+        <p:spPr/>
+        <p:txBody>
+          <a:bodyPr/>
+          <a:lstStyle/>
+          <a:p>
+            <a:fld id="{4D021CEB-2F22-4EA1-9BAF-E3833982B82A}" type="slidenum">
+              <a:rPr lang="en-US" smtClean="0">
+                <a:latin typeface="Aptos" panose="020B0004020202020204" pitchFamily="34" charset="0"/>
+              </a:rPr>
+              <a:pPr/>
+              <a:t>8</a:t>
+            </a:fld>
+            <a:r>
+              <a:rPr lang="en-US" dirty="0">
+                <a:latin typeface="Aptos" panose="020B0004020202020204" pitchFamily="34" charset="0"/>
+              </a:rPr>
+              <a:t> of 17</a:t>
+            </a:r>
+          </a:p>
+        </p:txBody>
+      </p:sp>
+      <p:sp>
+        <p:nvSpPr>
+          <p:cNvPr id="11" name="CasellaDiTesto 10">
+            <a:extLst>
+              <a:ext uri="{FF2B5EF4-FFF2-40B4-BE49-F238E27FC236}">
+                <a16:creationId xmlns:a16="http://schemas.microsoft.com/office/drawing/2014/main" id="{3A3A0075-1EDF-CD73-E5EC-6C91E068147E}"/>
+              </a:ext>
+            </a:extLst>
+          </p:cNvPr>
+          <p:cNvSpPr txBox="1"/>
+          <p:nvPr/>
+        </p:nvSpPr>
+        <p:spPr>
+          <a:xfrm>
+            <a:off x="1163782" y="5624658"/>
+            <a:ext cx="5551071" cy="369332"/>
+          </a:xfrm>
+          <a:prstGeom prst="rect">
+            <a:avLst/>
+          </a:prstGeom>
+          <a:noFill/>
+        </p:spPr>
+        <p:txBody>
+          <a:bodyPr wrap="none" rtlCol="0">
+            <a:spAutoFit/>
+          </a:bodyPr>
+          <a:lstStyle/>
+          <a:p>
+            <a:r>
+              <a:rPr lang="en-GB" b="1" dirty="0">
+                <a:latin typeface="Aptos" panose="020B0004020202020204" pitchFamily="34" charset="0"/>
+              </a:rPr>
+              <a:t>Figure 2.</a:t>
+            </a:r>
+            <a:r>
+              <a:rPr lang="en-GB" dirty="0">
+                <a:latin typeface="Aptos" panose="020B0004020202020204" pitchFamily="34" charset="0"/>
+              </a:rPr>
+              <a:t> </a:t>
+            </a:r>
+            <a:r>
+              <a:rPr lang="en-GB" sz="1800" b="0" i="0" u="none" strike="noStrike" baseline="0" dirty="0">
+                <a:latin typeface="Aptos" panose="020B0004020202020204" pitchFamily="34" charset="0"/>
+              </a:rPr>
+              <a:t>Mobility-aware hierarchical MEC framework.</a:t>
+            </a:r>
+            <a:r>
+              <a:rPr lang="en-GB" dirty="0">
+                <a:latin typeface="Aptos" panose="020B0004020202020204" pitchFamily="34" charset="0"/>
+              </a:rPr>
+              <a:t> </a:t>
+            </a:r>
+          </a:p>
+        </p:txBody>
+      </p:sp>
+    </p:spTree>
+    <p:extLst>
+      <p:ext uri="{BB962C8B-B14F-4D97-AF65-F5344CB8AC3E}">
+        <p14:creationId xmlns:p14="http://schemas.microsoft.com/office/powerpoint/2010/main" val="4004152936"/>
+      </p:ext>
+    </p:extLst>
+  </p:cSld>
+  <p:clrMapOvr>
+    <a:masterClrMapping/>
+  </p:clrMapOvr>
+</p:sld>
+</file>
+
+<file path=ppt/slides/slide9.xml><?xml version="1.0" encoding="utf-8"?>
+<p:sld xmlns:a="http://schemas.openxmlformats.org/drawingml/2006/main" xmlns:r="http://schemas.openxmlformats.org/officeDocument/2006/relationships" xmlns:p="http://schemas.openxmlformats.org/presentationml/2006/main">
+  <p:cSld>
+    <p:spTree>
+      <p:nvGrpSpPr>
+        <p:cNvPr id="1" name=""/>
+        <p:cNvGrpSpPr/>
+        <p:nvPr/>
+      </p:nvGrpSpPr>
+      <p:grpSpPr>
+        <a:xfrm>
+          <a:off x="0" y="0"/>
+          <a:ext cx="0" cy="0"/>
+          <a:chOff x="0" y="0"/>
+          <a:chExt cx="0" cy="0"/>
+        </a:xfrm>
+      </p:grpSpPr>
+      <p:sp>
+        <p:nvSpPr>
+          <p:cNvPr id="2" name="Titolo 1">
+            <a:extLst>
+              <a:ext uri="{FF2B5EF4-FFF2-40B4-BE49-F238E27FC236}">
+                <a16:creationId xmlns:a16="http://schemas.microsoft.com/office/drawing/2014/main" id="{3C0758D5-AC57-6F31-B599-B481D0B8D023}"/>
+              </a:ext>
+            </a:extLst>
+          </p:cNvPr>
+          <p:cNvSpPr>
+            <a:spLocks noGrp="1"/>
+          </p:cNvSpPr>
+          <p:nvPr>
+            <p:ph type="title"/>
+          </p:nvPr>
+        </p:nvSpPr>
+        <p:spPr/>
+        <p:txBody>
+          <a:bodyPr>
+            <a:noAutofit/>
+          </a:bodyPr>
+          <a:lstStyle/>
+          <a:p>
+            <a:r>
+              <a:rPr lang="en-US" sz="2800" dirty="0">
+                <a:latin typeface="Aptos" panose="020B0004020202020204" pitchFamily="34" charset="0"/>
+              </a:rPr>
+              <a:t>A study on Mobile Edge Computing (MEC)</a:t>
+            </a:r>
+            <a:endParaRPr lang="en-GB" sz="2800" dirty="0"/>
+          </a:p>
+        </p:txBody>
+      </p:sp>
+      <p:pic>
+        <p:nvPicPr>
+          <p:cNvPr id="6" name="Segnaposto contenuto 5">
+            <a:extLst>
+              <a:ext uri="{FF2B5EF4-FFF2-40B4-BE49-F238E27FC236}">
+                <a16:creationId xmlns:a16="http://schemas.microsoft.com/office/drawing/2014/main" id="{F20C8A2F-27C0-63F2-1EE9-FDC24AE04A39}"/>
+              </a:ext>
+            </a:extLst>
+          </p:cNvPr>
+          <p:cNvPicPr>
+            <a:picLocks noGrp="1" noChangeAspect="1"/>
+          </p:cNvPicPr>
+          <p:nvPr>
+            <p:ph idx="1"/>
+          </p:nvPr>
+        </p:nvPicPr>
+        <p:blipFill>
+          <a:blip r:embed="rId2"/>
+          <a:stretch>
+            <a:fillRect/>
+          </a:stretch>
+        </p:blipFill>
+        <p:spPr>
+          <a:xfrm>
+            <a:off x="27650" y="1897417"/>
+            <a:ext cx="4563568" cy="3154866"/>
+          </a:xfrm>
+        </p:spPr>
+      </p:pic>
+      <p:sp>
+        <p:nvSpPr>
+          <p:cNvPr id="4" name="Segnaposto numero diapositiva 3">
+            <a:extLst>
+              <a:ext uri="{FF2B5EF4-FFF2-40B4-BE49-F238E27FC236}">
+                <a16:creationId xmlns:a16="http://schemas.microsoft.com/office/drawing/2014/main" id="{F0585C01-1FBB-734F-7299-2D324FC21DBA}"/>
+              </a:ext>
+            </a:extLst>
+          </p:cNvPr>
+          <p:cNvSpPr>
+            <a:spLocks noGrp="1"/>
+          </p:cNvSpPr>
+          <p:nvPr>
+            <p:ph type="sldNum" sz="quarter" idx="4"/>
+          </p:nvPr>
+        </p:nvSpPr>
+        <p:spPr/>
+        <p:txBody>
+          <a:bodyPr/>
+          <a:lstStyle/>
+          <a:p>
+            <a:fld id="{4D021CEB-2F22-4EA1-9BAF-E3833982B82A}" type="slidenum">
+              <a:rPr lang="en-US" smtClean="0">
+                <a:latin typeface="Aptos" panose="020B0004020202020204" pitchFamily="34" charset="0"/>
+              </a:rPr>
+              <a:pPr/>
+              <a:t>9</a:t>
+            </a:fld>
+            <a:r>
+              <a:rPr lang="en-US" dirty="0">
+                <a:latin typeface="Aptos" panose="020B0004020202020204" pitchFamily="34" charset="0"/>
+              </a:rPr>
+              <a:t> of 17</a:t>
+            </a:r>
+          </a:p>
+        </p:txBody>
+      </p:sp>
+      <p:pic>
+        <p:nvPicPr>
+          <p:cNvPr id="8" name="Immagine 7">
+            <a:extLst>
+              <a:ext uri="{FF2B5EF4-FFF2-40B4-BE49-F238E27FC236}">
+                <a16:creationId xmlns:a16="http://schemas.microsoft.com/office/drawing/2014/main" id="{E6EF7038-2931-8DFA-BD91-A732BD81B15D}"/>
+              </a:ext>
+            </a:extLst>
+          </p:cNvPr>
+          <p:cNvPicPr>
+            <a:picLocks noChangeAspect="1"/>
+          </p:cNvPicPr>
+          <p:nvPr/>
+        </p:nvPicPr>
+        <p:blipFill>
+          <a:blip r:embed="rId3"/>
+          <a:stretch>
+            <a:fillRect/>
+          </a:stretch>
+        </p:blipFill>
+        <p:spPr>
+          <a:xfrm>
+            <a:off x="4591218" y="1885006"/>
+            <a:ext cx="4505527" cy="3305830"/>
+          </a:xfrm>
+          <a:prstGeom prst="rect">
+            <a:avLst/>
+          </a:prstGeom>
+        </p:spPr>
+      </p:pic>
+    </p:spTree>
+    <p:extLst>
+      <p:ext uri="{BB962C8B-B14F-4D97-AF65-F5344CB8AC3E}">
+        <p14:creationId xmlns:p14="http://schemas.microsoft.com/office/powerpoint/2010/main" val="3974262898"/>
       </p:ext>
     </p:extLst>
   </p:cSld>

</xml_diff>

<commit_message>
WNMA update + removed old files
</commit_message>
<xml_diff>
--- a/Wireless Networks for Mobile Applications/Project/Presentation/Presentation.pptx
+++ b/Wireless Networks for Mobile Applications/Project/Presentation/Presentation.pptx
@@ -211,7 +211,7 @@
           <a:p>
             <a:fld id="{0E4AAC6D-2322-45B9-8ECA-34DF280B0776}" type="datetimeFigureOut">
               <a:rPr lang="en-US" smtClean="0"/>
-              <a:t>2/2/2025</a:t>
+              <a:t>2/3/2025</a:t>
             </a:fld>
             <a:endParaRPr lang="en-US"/>
           </a:p>
@@ -2042,13 +2042,13 @@
           <a:lstStyle/>
           <a:p>
             <a:r>
-              <a:rPr lang="en-GB" sz="2400" b="1" dirty="0">
+              <a:rPr lang="en-GB" sz="2200" b="1" dirty="0">
                 <a:latin typeface="Aptos" panose="020B0004020202020204" pitchFamily="34" charset="0"/>
               </a:rPr>
               <a:t>Findings</a:t>
             </a:r>
             <a:r>
-              <a:rPr lang="en-GB" sz="2400" dirty="0">
+              <a:rPr lang="en-GB" sz="2200" dirty="0">
                 <a:latin typeface="Aptos" panose="020B0004020202020204" pitchFamily="34" charset="0"/>
               </a:rPr>
               <a:t>:</a:t>
@@ -2060,13 +2060,13 @@
               <a:buChar char="o"/>
             </a:pPr>
             <a:r>
-              <a:rPr lang="en-GB" b="1" u="sng" dirty="0">
+              <a:rPr lang="en-GB" sz="2200" b="1" u="sng" dirty="0">
                 <a:latin typeface="Aptos" panose="020B0004020202020204" pitchFamily="34" charset="0"/>
               </a:rPr>
               <a:t>Latency</a:t>
             </a:r>
             <a:r>
-              <a:rPr lang="en-GB" dirty="0">
+              <a:rPr lang="en-GB" sz="2200" dirty="0">
                 <a:latin typeface="Aptos" panose="020B0004020202020204" pitchFamily="34" charset="0"/>
               </a:rPr>
               <a:t>: Edge setup achieved network delay (ND) of &lt;20ms, outperforming cloud setups which showed &gt;50ms delay.</a:t>
@@ -2078,13 +2078,13 @@
               <a:buChar char="o"/>
             </a:pPr>
             <a:r>
-              <a:rPr lang="en-GB" b="1" u="sng" dirty="0">
+              <a:rPr lang="en-GB" sz="2200" b="1" u="sng" dirty="0">
                 <a:latin typeface="Aptos" panose="020B0004020202020204" pitchFamily="34" charset="0"/>
               </a:rPr>
               <a:t>Virtualization</a:t>
             </a:r>
             <a:r>
-              <a:rPr lang="en-GB" dirty="0">
+              <a:rPr lang="en-GB" sz="2200" dirty="0">
                 <a:latin typeface="Aptos" panose="020B0004020202020204" pitchFamily="34" charset="0"/>
               </a:rPr>
               <a:t>: Containers delivered near-bare-metal performance, while hypervisor virtualization incurred ~30% higher processing delay.</a:t>
@@ -2096,13 +2096,13 @@
               <a:buChar char="o"/>
             </a:pPr>
             <a:r>
-              <a:rPr lang="en-GB" b="1" u="sng" dirty="0">
+              <a:rPr lang="en-GB" sz="2200" b="1" u="sng" dirty="0">
                 <a:latin typeface="Aptos" panose="020B0004020202020204" pitchFamily="34" charset="0"/>
               </a:rPr>
               <a:t>Resolution</a:t>
             </a:r>
             <a:r>
-              <a:rPr lang="en-GB" dirty="0">
+              <a:rPr lang="en-GB" sz="2200" dirty="0">
                 <a:latin typeface="Aptos" panose="020B0004020202020204" pitchFamily="34" charset="0"/>
               </a:rPr>
               <a:t>: Full HD processing times at the edge were significantly better compared to centralized cloud setups.</a:t>
@@ -2110,13 +2110,13 @@
           </a:p>
           <a:p>
             <a:r>
-              <a:rPr lang="en-GB" sz="2600" b="1" dirty="0">
+              <a:rPr lang="en-GB" sz="2200" b="1" dirty="0">
                 <a:latin typeface="Aptos" panose="020B0004020202020204" pitchFamily="34" charset="0"/>
               </a:rPr>
               <a:t>Conclusion</a:t>
             </a:r>
             <a:r>
-              <a:rPr lang="en-GB" sz="2600" dirty="0">
+              <a:rPr lang="en-GB" sz="2200" dirty="0">
                 <a:latin typeface="Aptos" panose="020B0004020202020204" pitchFamily="34" charset="0"/>
               </a:rPr>
               <a:t>: Proximity of computational resources crucial to enhance the user experience.</a:t>
@@ -2303,8 +2303,8 @@
         </p:nvSpPr>
         <p:spPr>
           <a:xfrm>
-            <a:off x="1176718" y="5757863"/>
-            <a:ext cx="7003969" cy="338554"/>
+            <a:off x="1456016" y="5761471"/>
+            <a:ext cx="6225615" cy="338554"/>
           </a:xfrm>
           <a:prstGeom prst="rect">
             <a:avLst/>
@@ -2312,24 +2312,16 @@
           <a:noFill/>
         </p:spPr>
         <p:txBody>
-          <a:bodyPr wrap="none" rtlCol="0">
+          <a:bodyPr wrap="square" rtlCol="0">
             <a:spAutoFit/>
           </a:bodyPr>
           <a:lstStyle/>
           <a:p>
             <a:r>
-              <a:rPr lang="en-GB" sz="1600" b="1" dirty="0"/>
-              <a:t>Figure 1.</a:t>
-            </a:r>
-            <a:r>
-              <a:rPr lang="en-GB" sz="1600" dirty="0"/>
-              <a:t> </a:t>
-            </a:r>
-            <a:r>
               <a:rPr lang="en-US" sz="1600" b="0" i="0" u="none" strike="noStrike" baseline="0" dirty="0">
                 <a:latin typeface="ClassicoURW-Reg"/>
               </a:rPr>
-              <a:t>Architecture of an edge computing platform in IoT-based manufacturing.</a:t>
+              <a:t>Architecture of an edge computing platform in IoT-based manufacturing</a:t>
             </a:r>
             <a:endParaRPr lang="en-GB" sz="1600" dirty="0"/>
           </a:p>
@@ -2416,24 +2408,24 @@
         </p:nvSpPr>
         <p:spPr>
           <a:xfrm>
-            <a:off x="625960" y="1406413"/>
+            <a:off x="628650" y="1378704"/>
             <a:ext cx="7886700" cy="5086751"/>
           </a:xfrm>
         </p:spPr>
         <p:txBody>
           <a:bodyPr>
-            <a:normAutofit fontScale="92500" lnSpcReduction="10000"/>
+            <a:normAutofit lnSpcReduction="10000"/>
           </a:bodyPr>
           <a:lstStyle/>
           <a:p>
             <a:r>
-              <a:rPr lang="en-US" sz="2600" b="1" dirty="0">
+              <a:rPr lang="en-US" sz="2200" b="1" dirty="0">
                 <a:latin typeface="Aptos" panose="020B0004020202020204" pitchFamily="34" charset="0"/>
               </a:rPr>
               <a:t>Objective</a:t>
             </a:r>
             <a:r>
-              <a:rPr lang="en-US" sz="2600" dirty="0">
+              <a:rPr lang="en-US" sz="2200" dirty="0">
                 <a:latin typeface="Aptos" panose="020B0004020202020204" pitchFamily="34" charset="0"/>
               </a:rPr>
               <a:t>: Explores the integration of edge computing in IoT-based manufacturing to address latency, real-time analytics, and resource efficiency.</a:t>
@@ -2441,9 +2433,12 @@
           </a:p>
           <a:p>
             <a:pPr marL="0" indent="0">
+              <a:spcBef>
+                <a:spcPts val="0"/>
+              </a:spcBef>
               <a:buNone/>
             </a:pPr>
-            <a:endParaRPr lang="en-US" sz="2600" dirty="0">
+            <a:endParaRPr lang="en-US" sz="1400" dirty="0">
               <a:latin typeface="Aptos" panose="020B0004020202020204" pitchFamily="34" charset="0"/>
             </a:endParaRPr>
           </a:p>
@@ -2457,35 +2452,41 @@
               </a:spcAft>
             </a:pPr>
             <a:r>
-              <a:rPr lang="en-US" sz="2600" b="1" dirty="0">
+              <a:rPr lang="en-US" sz="2200" b="1" dirty="0">
                 <a:latin typeface="Aptos" panose="020B0004020202020204" pitchFamily="34" charset="0"/>
               </a:rPr>
               <a:t>Key Benefits</a:t>
             </a:r>
             <a:r>
-              <a:rPr lang="en-US" sz="2600" dirty="0">
+              <a:rPr lang="en-US" sz="2200" dirty="0">
                 <a:latin typeface="Aptos" panose="020B0004020202020204" pitchFamily="34" charset="0"/>
               </a:rPr>
               <a:t>:</a:t>
             </a:r>
           </a:p>
           <a:p>
-            <a:pPr lvl="1"/>
-            <a:r>
-              <a:rPr lang="en-US" b="1" dirty="0">
+            <a:pPr lvl="1">
+              <a:buFont typeface="Courier New" panose="02070309020205020404" pitchFamily="49" charset="0"/>
+              <a:buChar char="o"/>
+            </a:pPr>
+            <a:r>
+              <a:rPr lang="en-US" sz="2200" b="1" dirty="0">
                 <a:latin typeface="Aptos" panose="020B0004020202020204" pitchFamily="34" charset="0"/>
               </a:rPr>
               <a:t>Active Maintenance</a:t>
             </a:r>
             <a:r>
-              <a:rPr lang="en-US" dirty="0">
+              <a:rPr lang="en-US" sz="2200" dirty="0">
                 <a:latin typeface="Aptos" panose="020B0004020202020204" pitchFamily="34" charset="0"/>
               </a:rPr>
               <a:t>: </a:t>
             </a:r>
           </a:p>
           <a:p>
-            <a:pPr lvl="2"/>
+            <a:pPr lvl="2">
+              <a:buFont typeface="Wingdings" panose="05000000000000000000" pitchFamily="2" charset="2"/>
+              <a:buChar char="§"/>
+            </a:pPr>
             <a:r>
               <a:rPr lang="en-US" sz="2200" dirty="0">
                 <a:latin typeface="Aptos" panose="020B0004020202020204" pitchFamily="34" charset="0"/>
@@ -2498,6 +2499,8 @@
               <a:spcAft>
                 <a:spcPts val="500"/>
               </a:spcAft>
+              <a:buFont typeface="Wingdings" panose="05000000000000000000" pitchFamily="2" charset="2"/>
+              <a:buChar char="§"/>
             </a:pPr>
             <a:r>
               <a:rPr lang="en-US" sz="2200" dirty="0">
@@ -2507,7 +2510,10 @@
             </a:r>
           </a:p>
           <a:p>
-            <a:pPr lvl="1"/>
+            <a:pPr lvl="1">
+              <a:buFont typeface="Courier New" panose="02070309020205020404" pitchFamily="49" charset="0"/>
+              <a:buChar char="o"/>
+            </a:pPr>
             <a:r>
               <a:rPr lang="en-US" sz="2200" b="1" dirty="0">
                 <a:latin typeface="Aptos" panose="020B0004020202020204" pitchFamily="34" charset="0"/>
@@ -2516,7 +2522,10 @@
             </a:r>
           </a:p>
           <a:p>
-            <a:pPr lvl="2"/>
+            <a:pPr lvl="2">
+              <a:buFont typeface="Wingdings" panose="05000000000000000000" pitchFamily="2" charset="2"/>
+              <a:buChar char="§"/>
+            </a:pPr>
             <a:r>
               <a:rPr lang="en-US" sz="2200" dirty="0">
                 <a:latin typeface="Aptos" panose="020B0004020202020204" pitchFamily="34" charset="0"/>
@@ -2525,7 +2534,10 @@
             </a:r>
           </a:p>
           <a:p>
-            <a:pPr lvl="2"/>
+            <a:pPr lvl="2">
+              <a:buFont typeface="Wingdings" panose="05000000000000000000" pitchFamily="2" charset="2"/>
+              <a:buChar char="§"/>
+            </a:pPr>
             <a:r>
               <a:rPr lang="en-US" sz="2200" dirty="0">
                 <a:latin typeface="Aptos" panose="020B0004020202020204" pitchFamily="34" charset="0"/>
@@ -2654,25 +2666,28 @@
         <p:spPr/>
         <p:txBody>
           <a:bodyPr>
-            <a:normAutofit fontScale="92500" lnSpcReduction="10000"/>
+            <a:normAutofit fontScale="92500"/>
           </a:bodyPr>
           <a:lstStyle/>
           <a:p>
             <a:r>
-              <a:rPr lang="en-US" sz="2600" b="1" dirty="0">
+              <a:rPr lang="en-US" sz="2400" b="1" dirty="0">
                 <a:latin typeface="Aptos" panose="020B0004020202020204" pitchFamily="34" charset="0"/>
               </a:rPr>
               <a:t>Implementation Challenges</a:t>
             </a:r>
             <a:r>
-              <a:rPr lang="en-US" sz="2600" dirty="0">
+              <a:rPr lang="en-US" sz="2400" dirty="0">
                 <a:latin typeface="Aptos" panose="020B0004020202020204" pitchFamily="34" charset="0"/>
               </a:rPr>
               <a:t>:</a:t>
             </a:r>
           </a:p>
           <a:p>
-            <a:pPr lvl="1"/>
+            <a:pPr lvl="1">
+              <a:buFont typeface="Courier New" panose="02070309020205020404" pitchFamily="49" charset="0"/>
+              <a:buChar char="o"/>
+            </a:pPr>
             <a:r>
               <a:rPr lang="en-US" dirty="0">
                 <a:latin typeface="Aptos" panose="020B0004020202020204" pitchFamily="34" charset="0"/>
@@ -2681,21 +2696,15 @@
             </a:r>
           </a:p>
           <a:p>
-            <a:pPr lvl="1"/>
+            <a:pPr lvl="1">
+              <a:buFont typeface="Courier New" panose="02070309020205020404" pitchFamily="49" charset="0"/>
+              <a:buChar char="o"/>
+            </a:pPr>
             <a:r>
               <a:rPr lang="en-US" dirty="0">
                 <a:latin typeface="Aptos" panose="020B0004020202020204" pitchFamily="34" charset="0"/>
               </a:rPr>
               <a:t>Real-time processing for time-sensitive manufacturing tasks.</a:t>
-            </a:r>
-          </a:p>
-          <a:p>
-            <a:pPr lvl="1"/>
-            <a:r>
-              <a:rPr lang="en-US" dirty="0">
-                <a:latin typeface="Aptos" panose="020B0004020202020204" pitchFamily="34" charset="0"/>
-              </a:rPr>
-              <a:t>Integration with existing infrastructure while ensuring scalability.</a:t>
             </a:r>
           </a:p>
           <a:p>
@@ -2713,20 +2722,23 @@
               </a:spcBef>
             </a:pPr>
             <a:r>
-              <a:rPr lang="en-US" sz="2600" b="1" dirty="0">
+              <a:rPr lang="en-US" sz="2400" b="1" dirty="0">
                 <a:latin typeface="Aptos" panose="020B0004020202020204" pitchFamily="34" charset="0"/>
               </a:rPr>
               <a:t>Future Directions</a:t>
             </a:r>
             <a:r>
-              <a:rPr lang="en-US" sz="2600" dirty="0">
+              <a:rPr lang="en-US" sz="2400" dirty="0">
                 <a:latin typeface="Aptos" panose="020B0004020202020204" pitchFamily="34" charset="0"/>
               </a:rPr>
               <a:t>:</a:t>
             </a:r>
           </a:p>
           <a:p>
-            <a:pPr lvl="1"/>
+            <a:pPr lvl="1">
+              <a:buFont typeface="Courier New" panose="02070309020205020404" pitchFamily="49" charset="0"/>
+              <a:buChar char="o"/>
+            </a:pPr>
             <a:r>
               <a:rPr lang="en-US" dirty="0">
                 <a:latin typeface="Aptos" panose="020B0004020202020204" pitchFamily="34" charset="0"/>
@@ -2735,7 +2747,10 @@
             </a:r>
           </a:p>
           <a:p>
-            <a:pPr lvl="1"/>
+            <a:pPr lvl="1">
+              <a:buFont typeface="Courier New" panose="02070309020205020404" pitchFamily="49" charset="0"/>
+              <a:buChar char="o"/>
+            </a:pPr>
             <a:r>
               <a:rPr lang="en-US" dirty="0">
                 <a:latin typeface="Aptos" panose="020B0004020202020204" pitchFamily="34" charset="0"/>
@@ -2744,7 +2759,10 @@
             </a:r>
           </a:p>
           <a:p>
-            <a:pPr lvl="1"/>
+            <a:pPr lvl="1">
+              <a:buFont typeface="Courier New" panose="02070309020205020404" pitchFamily="49" charset="0"/>
+              <a:buChar char="o"/>
+            </a:pPr>
             <a:r>
               <a:rPr lang="en-US" dirty="0">
                 <a:latin typeface="Aptos" panose="020B0004020202020204" pitchFamily="34" charset="0"/>
@@ -4037,10 +4055,16 @@
               <a:buNone/>
             </a:pPr>
             <a:r>
+              <a:rPr lang="en-US" sz="2000" b="1" dirty="0">
+                <a:latin typeface="Aptos" panose="020B0004020202020204" pitchFamily="34" charset="0"/>
+              </a:rPr>
+              <a:t>Key features</a:t>
+            </a:r>
+            <a:r>
               <a:rPr lang="en-US" sz="2000" dirty="0">
                 <a:latin typeface="Aptos" panose="020B0004020202020204" pitchFamily="34" charset="0"/>
               </a:rPr>
-              <a:t>Key features:</a:t>
+              <a:t>:</a:t>
             </a:r>
           </a:p>
           <a:p>
@@ -4073,40 +4097,6 @@
                 <a:latin typeface="Aptos" panose="020B0004020202020204" pitchFamily="34" charset="0"/>
               </a:rPr>
               <a:t>Real-time processing </a:t>
-            </a:r>
-          </a:p>
-          <a:p>
-            <a:pPr marL="0" indent="0">
-              <a:buNone/>
-            </a:pPr>
-            <a:r>
-              <a:rPr lang="en-US" sz="2000" dirty="0">
-                <a:latin typeface="Aptos" panose="020B0004020202020204" pitchFamily="34" charset="0"/>
-              </a:rPr>
-              <a:t>    capabilities</a:t>
-            </a:r>
-          </a:p>
-          <a:p>
-            <a:pPr>
-              <a:buFont typeface="Arial" panose="020B0604020202020204" pitchFamily="34" charset="0"/>
-              <a:buChar char="•"/>
-            </a:pPr>
-            <a:r>
-              <a:rPr lang="en-US" sz="2000" dirty="0">
-                <a:latin typeface="Aptos" panose="020B0004020202020204" pitchFamily="34" charset="0"/>
-              </a:rPr>
-              <a:t>Enhanced energy </a:t>
-            </a:r>
-          </a:p>
-          <a:p>
-            <a:pPr marL="0" indent="0">
-              <a:buNone/>
-            </a:pPr>
-            <a:r>
-              <a:rPr lang="en-US" sz="2000" dirty="0">
-                <a:latin typeface="Aptos" panose="020B0004020202020204" pitchFamily="34" charset="0"/>
-              </a:rPr>
-              <a:t>   efficiency and data </a:t>
             </a:r>
           </a:p>
           <a:p>
@@ -4120,8 +4110,59 @@
               <a:rPr lang="en-US" sz="2000" dirty="0">
                 <a:latin typeface="Aptos" panose="020B0004020202020204" pitchFamily="34" charset="0"/>
               </a:rPr>
-              <a:t>   security</a:t>
-            </a:r>
+              <a:t>    capabilities</a:t>
+            </a:r>
+          </a:p>
+          <a:p>
+            <a:pPr>
+              <a:buFont typeface="Arial" panose="020B0604020202020204" pitchFamily="34" charset="0"/>
+              <a:buChar char="•"/>
+            </a:pPr>
+            <a:r>
+              <a:rPr lang="en-US" sz="2000" dirty="0">
+                <a:latin typeface="Aptos" panose="020B0004020202020204" pitchFamily="34" charset="0"/>
+              </a:rPr>
+              <a:t>Enhanced energy  </a:t>
+            </a:r>
+          </a:p>
+          <a:p>
+            <a:pPr marL="0" indent="0">
+              <a:spcBef>
+                <a:spcPts val="0"/>
+              </a:spcBef>
+              <a:buNone/>
+            </a:pPr>
+            <a:r>
+              <a:rPr lang="en-US" sz="2000" dirty="0">
+                <a:latin typeface="Aptos" panose="020B0004020202020204" pitchFamily="34" charset="0"/>
+              </a:rPr>
+              <a:t>    efficiency and data </a:t>
+            </a:r>
+          </a:p>
+          <a:p>
+            <a:pPr marL="0" indent="0">
+              <a:spcBef>
+                <a:spcPts val="0"/>
+              </a:spcBef>
+              <a:buNone/>
+            </a:pPr>
+            <a:r>
+              <a:rPr lang="en-US" sz="2000" dirty="0">
+                <a:latin typeface="Aptos" panose="020B0004020202020204" pitchFamily="34" charset="0"/>
+              </a:rPr>
+              <a:t>    security</a:t>
+            </a:r>
+          </a:p>
+          <a:p>
+            <a:pPr marL="0" indent="0">
+              <a:spcBef>
+                <a:spcPts val="0"/>
+              </a:spcBef>
+              <a:buNone/>
+            </a:pPr>
+            <a:endParaRPr lang="en-US" sz="2000" dirty="0">
+              <a:latin typeface="Aptos" panose="020B0004020202020204" pitchFamily="34" charset="0"/>
+            </a:endParaRPr>
           </a:p>
           <a:p>
             <a:pPr marL="0" indent="0">
@@ -4657,8 +4698,8 @@
         </p:nvSpPr>
         <p:spPr>
           <a:xfrm>
-            <a:off x="1163782" y="5624658"/>
-            <a:ext cx="5551071" cy="369332"/>
+            <a:off x="2240212" y="5757863"/>
+            <a:ext cx="4663575" cy="369332"/>
           </a:xfrm>
           <a:prstGeom prst="rect">
             <a:avLst/>
@@ -4666,28 +4707,16 @@
           <a:noFill/>
         </p:spPr>
         <p:txBody>
-          <a:bodyPr wrap="none" rtlCol="0">
+          <a:bodyPr wrap="square" rtlCol="0">
             <a:spAutoFit/>
           </a:bodyPr>
           <a:lstStyle/>
           <a:p>
             <a:r>
-              <a:rPr lang="en-GB" b="1" dirty="0">
-                <a:latin typeface="Aptos" panose="020B0004020202020204" pitchFamily="34" charset="0"/>
-              </a:rPr>
-              <a:t>Figure 2.</a:t>
-            </a:r>
-            <a:r>
-              <a:rPr lang="en-GB" dirty="0">
-                <a:latin typeface="Aptos" panose="020B0004020202020204" pitchFamily="34" charset="0"/>
-              </a:rPr>
-              <a:t> </a:t>
-            </a:r>
-            <a:r>
               <a:rPr lang="en-GB" sz="1800" b="0" i="0" u="none" strike="noStrike" baseline="0" dirty="0">
                 <a:latin typeface="Aptos" panose="020B0004020202020204" pitchFamily="34" charset="0"/>
               </a:rPr>
-              <a:t>Mobility-aware hierarchical MEC framework.</a:t>
+              <a:t>Mobility-aware hierarchical MEC framework</a:t>
             </a:r>
             <a:r>
               <a:rPr lang="en-GB" dirty="0">
@@ -4785,8 +4814,8 @@
         </p:blipFill>
         <p:spPr>
           <a:xfrm>
-            <a:off x="27650" y="1897417"/>
-            <a:ext cx="4563568" cy="3154866"/>
+            <a:off x="61093" y="2336152"/>
+            <a:ext cx="4508217" cy="3116601"/>
           </a:xfrm>
         </p:spPr>
       </p:pic>
@@ -4849,14 +4878,224 @@
         </p:blipFill>
         <p:spPr>
           <a:xfrm>
-            <a:off x="4591218" y="1885006"/>
-            <a:ext cx="4505527" cy="3305830"/>
+            <a:off x="4572000" y="2336152"/>
+            <a:ext cx="4415116" cy="3239493"/>
           </a:xfrm>
           <a:prstGeom prst="rect">
             <a:avLst/>
           </a:prstGeom>
         </p:spPr>
       </p:pic>
+      <p:sp>
+        <p:nvSpPr>
+          <p:cNvPr id="3" name="Segnaposto contenuto 2">
+            <a:extLst>
+              <a:ext uri="{FF2B5EF4-FFF2-40B4-BE49-F238E27FC236}">
+                <a16:creationId xmlns:a16="http://schemas.microsoft.com/office/drawing/2014/main" id="{FAA60BD0-4F37-7014-CD6C-FB5064D0A9C6}"/>
+              </a:ext>
+            </a:extLst>
+          </p:cNvPr>
+          <p:cNvSpPr txBox="1">
+            <a:spLocks/>
+          </p:cNvSpPr>
+          <p:nvPr/>
+        </p:nvSpPr>
+        <p:spPr>
+          <a:xfrm>
+            <a:off x="625960" y="1968039"/>
+            <a:ext cx="7886700" cy="368113"/>
+          </a:xfrm>
+          <a:prstGeom prst="rect">
+            <a:avLst/>
+          </a:prstGeom>
+        </p:spPr>
+        <p:txBody>
+          <a:bodyPr vert="horz" lIns="91440" tIns="45720" rIns="91440" bIns="45720" rtlCol="0">
+            <a:noAutofit/>
+          </a:bodyPr>
+          <a:lstStyle>
+            <a:lvl1pPr marL="228600" indent="-228600" algn="l" defTabSz="914400" rtl="0" eaLnBrk="1" latinLnBrk="0" hangingPunct="1">
+              <a:lnSpc>
+                <a:spcPct val="90000"/>
+              </a:lnSpc>
+              <a:spcBef>
+                <a:spcPts val="1000"/>
+              </a:spcBef>
+              <a:buFont typeface="Arial" panose="020B0604020202020204" pitchFamily="34" charset="0"/>
+              <a:buChar char="•"/>
+              <a:defRPr sz="2800" kern="1200">
+                <a:solidFill>
+                  <a:schemeClr val="tx1"/>
+                </a:solidFill>
+                <a:latin typeface="+mn-lt"/>
+                <a:ea typeface="+mn-ea"/>
+                <a:cs typeface="+mn-cs"/>
+              </a:defRPr>
+            </a:lvl1pPr>
+            <a:lvl2pPr marL="685800" indent="-228600" algn="l" defTabSz="914400" rtl="0" eaLnBrk="1" latinLnBrk="0" hangingPunct="1">
+              <a:lnSpc>
+                <a:spcPct val="90000"/>
+              </a:lnSpc>
+              <a:spcBef>
+                <a:spcPts val="500"/>
+              </a:spcBef>
+              <a:buFont typeface="Arial" panose="020B0604020202020204" pitchFamily="34" charset="0"/>
+              <a:buChar char="•"/>
+              <a:defRPr sz="2400" kern="1200">
+                <a:solidFill>
+                  <a:schemeClr val="tx1"/>
+                </a:solidFill>
+                <a:latin typeface="+mn-lt"/>
+                <a:ea typeface="+mn-ea"/>
+                <a:cs typeface="+mn-cs"/>
+              </a:defRPr>
+            </a:lvl2pPr>
+            <a:lvl3pPr marL="1143000" indent="-228600" algn="l" defTabSz="914400" rtl="0" eaLnBrk="1" latinLnBrk="0" hangingPunct="1">
+              <a:lnSpc>
+                <a:spcPct val="90000"/>
+              </a:lnSpc>
+              <a:spcBef>
+                <a:spcPts val="500"/>
+              </a:spcBef>
+              <a:buFont typeface="Arial" panose="020B0604020202020204" pitchFamily="34" charset="0"/>
+              <a:buChar char="•"/>
+              <a:defRPr sz="2000" kern="1200">
+                <a:solidFill>
+                  <a:schemeClr val="tx1"/>
+                </a:solidFill>
+                <a:latin typeface="+mn-lt"/>
+                <a:ea typeface="+mn-ea"/>
+                <a:cs typeface="+mn-cs"/>
+              </a:defRPr>
+            </a:lvl3pPr>
+            <a:lvl4pPr marL="1600200" indent="-228600" algn="l" defTabSz="914400" rtl="0" eaLnBrk="1" latinLnBrk="0" hangingPunct="1">
+              <a:lnSpc>
+                <a:spcPct val="90000"/>
+              </a:lnSpc>
+              <a:spcBef>
+                <a:spcPts val="500"/>
+              </a:spcBef>
+              <a:buFont typeface="Arial" panose="020B0604020202020204" pitchFamily="34" charset="0"/>
+              <a:buChar char="•"/>
+              <a:defRPr sz="1800" kern="1200">
+                <a:solidFill>
+                  <a:schemeClr val="tx1"/>
+                </a:solidFill>
+                <a:latin typeface="+mn-lt"/>
+                <a:ea typeface="+mn-ea"/>
+                <a:cs typeface="+mn-cs"/>
+              </a:defRPr>
+            </a:lvl4pPr>
+            <a:lvl5pPr marL="2057400" indent="-228600" algn="l" defTabSz="914400" rtl="0" eaLnBrk="1" latinLnBrk="0" hangingPunct="1">
+              <a:lnSpc>
+                <a:spcPct val="90000"/>
+              </a:lnSpc>
+              <a:spcBef>
+                <a:spcPts val="500"/>
+              </a:spcBef>
+              <a:buFont typeface="Arial" panose="020B0604020202020204" pitchFamily="34" charset="0"/>
+              <a:buChar char="•"/>
+              <a:defRPr sz="1800" kern="1200">
+                <a:solidFill>
+                  <a:schemeClr val="tx1"/>
+                </a:solidFill>
+                <a:latin typeface="+mn-lt"/>
+                <a:ea typeface="+mn-ea"/>
+                <a:cs typeface="+mn-cs"/>
+              </a:defRPr>
+            </a:lvl5pPr>
+            <a:lvl6pPr marL="2514600" indent="-228600" algn="l" defTabSz="914400" rtl="0" eaLnBrk="1" latinLnBrk="0" hangingPunct="1">
+              <a:lnSpc>
+                <a:spcPct val="90000"/>
+              </a:lnSpc>
+              <a:spcBef>
+                <a:spcPts val="500"/>
+              </a:spcBef>
+              <a:buFont typeface="Arial" panose="020B0604020202020204" pitchFamily="34" charset="0"/>
+              <a:buChar char="•"/>
+              <a:defRPr sz="1800" kern="1200">
+                <a:solidFill>
+                  <a:schemeClr val="tx1"/>
+                </a:solidFill>
+                <a:latin typeface="+mn-lt"/>
+                <a:ea typeface="+mn-ea"/>
+                <a:cs typeface="+mn-cs"/>
+              </a:defRPr>
+            </a:lvl6pPr>
+            <a:lvl7pPr marL="2971800" indent="-228600" algn="l" defTabSz="914400" rtl="0" eaLnBrk="1" latinLnBrk="0" hangingPunct="1">
+              <a:lnSpc>
+                <a:spcPct val="90000"/>
+              </a:lnSpc>
+              <a:spcBef>
+                <a:spcPts val="500"/>
+              </a:spcBef>
+              <a:buFont typeface="Arial" panose="020B0604020202020204" pitchFamily="34" charset="0"/>
+              <a:buChar char="•"/>
+              <a:defRPr sz="1800" kern="1200">
+                <a:solidFill>
+                  <a:schemeClr val="tx1"/>
+                </a:solidFill>
+                <a:latin typeface="+mn-lt"/>
+                <a:ea typeface="+mn-ea"/>
+                <a:cs typeface="+mn-cs"/>
+              </a:defRPr>
+            </a:lvl7pPr>
+            <a:lvl8pPr marL="3429000" indent="-228600" algn="l" defTabSz="914400" rtl="0" eaLnBrk="1" latinLnBrk="0" hangingPunct="1">
+              <a:lnSpc>
+                <a:spcPct val="90000"/>
+              </a:lnSpc>
+              <a:spcBef>
+                <a:spcPts val="500"/>
+              </a:spcBef>
+              <a:buFont typeface="Arial" panose="020B0604020202020204" pitchFamily="34" charset="0"/>
+              <a:buChar char="•"/>
+              <a:defRPr sz="1800" kern="1200">
+                <a:solidFill>
+                  <a:schemeClr val="tx1"/>
+                </a:solidFill>
+                <a:latin typeface="+mn-lt"/>
+                <a:ea typeface="+mn-ea"/>
+                <a:cs typeface="+mn-cs"/>
+              </a:defRPr>
+            </a:lvl8pPr>
+            <a:lvl9pPr marL="3886200" indent="-228600" algn="l" defTabSz="914400" rtl="0" eaLnBrk="1" latinLnBrk="0" hangingPunct="1">
+              <a:lnSpc>
+                <a:spcPct val="90000"/>
+              </a:lnSpc>
+              <a:spcBef>
+                <a:spcPts val="500"/>
+              </a:spcBef>
+              <a:buFont typeface="Arial" panose="020B0604020202020204" pitchFamily="34" charset="0"/>
+              <a:buChar char="•"/>
+              <a:defRPr sz="1800" kern="1200">
+                <a:solidFill>
+                  <a:schemeClr val="tx1"/>
+                </a:solidFill>
+                <a:latin typeface="+mn-lt"/>
+                <a:ea typeface="+mn-ea"/>
+                <a:cs typeface="+mn-cs"/>
+              </a:defRPr>
+            </a:lvl9pPr>
+          </a:lstStyle>
+          <a:p>
+            <a:pPr marL="0" indent="0">
+              <a:spcBef>
+                <a:spcPts val="0"/>
+              </a:spcBef>
+              <a:spcAft>
+                <a:spcPts val="1200"/>
+              </a:spcAft>
+              <a:buNone/>
+            </a:pPr>
+            <a:r>
+              <a:rPr lang="en-GB" sz="2200" b="1" dirty="0">
+                <a:latin typeface="Aptos" panose="020B0004020202020204" pitchFamily="34" charset="0"/>
+              </a:rPr>
+              <a:t>       Energy consumption                                   Latency reduction</a:t>
+            </a:r>
+          </a:p>
+        </p:txBody>
+      </p:sp>
     </p:spTree>
     <p:extLst>
       <p:ext uri="{BB962C8B-B14F-4D97-AF65-F5344CB8AC3E}">
@@ -4937,24 +5176,24 @@
         </p:nvSpPr>
         <p:spPr>
           <a:xfrm>
-            <a:off x="628650" y="1406413"/>
+            <a:off x="628650" y="1260419"/>
             <a:ext cx="7886700" cy="4958782"/>
           </a:xfrm>
         </p:spPr>
         <p:txBody>
           <a:bodyPr>
-            <a:normAutofit fontScale="85000" lnSpcReduction="10000"/>
+            <a:normAutofit/>
           </a:bodyPr>
           <a:lstStyle/>
           <a:p>
             <a:r>
-              <a:rPr lang="en-GB" b="1" dirty="0">
+              <a:rPr lang="en-GB" sz="2200" b="1" dirty="0">
                 <a:latin typeface="Aptos" panose="020B0004020202020204" pitchFamily="34" charset="0"/>
               </a:rPr>
               <a:t>Objective</a:t>
             </a:r>
             <a:r>
-              <a:rPr lang="en-GB" dirty="0">
+              <a:rPr lang="en-GB" sz="2200" dirty="0">
                 <a:latin typeface="Aptos" panose="020B0004020202020204" pitchFamily="34" charset="0"/>
               </a:rPr>
               <a:t>: Evaluate the impact of edge computing on latency in resource-demanding mobile gaming applications.</a:t>
@@ -4962,93 +5201,37 @@
           </a:p>
           <a:p>
             <a:r>
-              <a:rPr lang="en-GB" b="1" dirty="0">
-                <a:latin typeface="Aptos" panose="020B0004020202020204" pitchFamily="34" charset="0"/>
-              </a:rPr>
-              <a:t>Experimental Setup</a:t>
-            </a:r>
-            <a:r>
-              <a:rPr lang="en-GB" dirty="0">
+              <a:rPr lang="en-GB" sz="2200" b="1" dirty="0">
+                <a:latin typeface="Aptos" panose="020B0004020202020204" pitchFamily="34" charset="0"/>
+              </a:rPr>
+              <a:t>Comparison Scenarios</a:t>
+            </a:r>
+            <a:r>
+              <a:rPr lang="en-GB" sz="2200" dirty="0">
                 <a:latin typeface="Aptos" panose="020B0004020202020204" pitchFamily="34" charset="0"/>
               </a:rPr>
               <a:t>:</a:t>
             </a:r>
           </a:p>
           <a:p>
-            <a:pPr lvl="1"/>
-            <a:r>
-              <a:rPr lang="en-GB" dirty="0">
-                <a:latin typeface="Aptos" panose="020B0004020202020204" pitchFamily="34" charset="0"/>
-              </a:rPr>
-              <a:t>Platform: </a:t>
-            </a:r>
-            <a:r>
-              <a:rPr lang="en-GB" dirty="0" err="1">
-                <a:latin typeface="Aptos" panose="020B0004020202020204" pitchFamily="34" charset="0"/>
-              </a:rPr>
-              <a:t>GamingAnywhere</a:t>
-            </a:r>
-            <a:r>
-              <a:rPr lang="en-GB" dirty="0">
-                <a:latin typeface="Aptos" panose="020B0004020202020204" pitchFamily="34" charset="0"/>
-              </a:rPr>
-              <a:t>, an open-source cloud gaming framework.</a:t>
-            </a:r>
-          </a:p>
-          <a:p>
-            <a:pPr lvl="1"/>
-            <a:r>
-              <a:rPr lang="en-GB" dirty="0">
-                <a:latin typeface="Aptos" panose="020B0004020202020204" pitchFamily="34" charset="0"/>
-              </a:rPr>
-              <a:t>Client Device: Google Nexus 5 mobile phone.</a:t>
-            </a:r>
-          </a:p>
-          <a:p>
-            <a:pPr lvl="1"/>
-            <a:r>
-              <a:rPr lang="en-GB" dirty="0">
-                <a:latin typeface="Aptos" panose="020B0004020202020204" pitchFamily="34" charset="0"/>
-              </a:rPr>
-              <a:t>Server: Workstation with Intel Xeon E3-1230 CPU, 16GB RAM, and NVIDIA GPUs.</a:t>
-            </a:r>
-          </a:p>
-          <a:p>
-            <a:pPr lvl="1"/>
-            <a:r>
-              <a:rPr lang="en-GB" dirty="0">
-                <a:latin typeface="Aptos" panose="020B0004020202020204" pitchFamily="34" charset="0"/>
-              </a:rPr>
-              <a:t>Network Technologies: Wi-Fi and LTE.</a:t>
-            </a:r>
-          </a:p>
-          <a:p>
-            <a:r>
-              <a:rPr lang="en-GB" b="1" dirty="0">
-                <a:latin typeface="Aptos" panose="020B0004020202020204" pitchFamily="34" charset="0"/>
-              </a:rPr>
-              <a:t>Comparison Scenarios</a:t>
-            </a:r>
-            <a:r>
-              <a:rPr lang="en-GB" dirty="0">
-                <a:latin typeface="Aptos" panose="020B0004020202020204" pitchFamily="34" charset="0"/>
-              </a:rPr>
-              <a:t>:</a:t>
-            </a:r>
-          </a:p>
-          <a:p>
-            <a:pPr lvl="1"/>
-            <a:r>
-              <a:rPr lang="en-GB" dirty="0">
+            <a:pPr lvl="1">
+              <a:buFont typeface="Courier New" panose="02070309020205020404" pitchFamily="49" charset="0"/>
+              <a:buChar char="o"/>
+            </a:pPr>
+            <a:r>
+              <a:rPr lang="en-GB" sz="2000" dirty="0">
                 <a:latin typeface="Aptos" panose="020B0004020202020204" pitchFamily="34" charset="0"/>
               </a:rPr>
               <a:t>Local Edge Deployment: Server located at the network edge.</a:t>
             </a:r>
           </a:p>
           <a:p>
-            <a:pPr lvl="1"/>
-            <a:r>
-              <a:rPr lang="en-GB" dirty="0">
+            <a:pPr lvl="1">
+              <a:buFont typeface="Courier New" panose="02070309020205020404" pitchFamily="49" charset="0"/>
+              <a:buChar char="o"/>
+            </a:pPr>
+            <a:r>
+              <a:rPr lang="en-GB" sz="2000" dirty="0">
                 <a:latin typeface="Aptos" panose="020B0004020202020204" pitchFamily="34" charset="0"/>
               </a:rPr>
               <a:t>Specialized Cloud Infrastructure: Centralized cloud computing.</a:t>
@@ -5056,14 +5239,14 @@
           </a:p>
           <a:p>
             <a:r>
-              <a:rPr lang="en-US" b="1" dirty="0"/>
+              <a:rPr lang="en-US" sz="2200" b="1" dirty="0"/>
               <a:t>Key Metrics</a:t>
             </a:r>
             <a:r>
-              <a:rPr lang="en-US" dirty="0"/>
+              <a:rPr lang="en-US" sz="2200" dirty="0"/>
               <a:t>: Response delay, comprising processing delay (PD), network delay (ND), and playout delay (PD).</a:t>
             </a:r>
-            <a:endParaRPr lang="en-GB" dirty="0">
+            <a:endParaRPr lang="en-GB" sz="2200" dirty="0">
               <a:latin typeface="Aptos" panose="020B0004020202020204" pitchFamily="34" charset="0"/>
             </a:endParaRPr>
           </a:p>
@@ -5106,6 +5289,36 @@
           </a:p>
         </p:txBody>
       </p:sp>
+      <p:pic>
+        <p:nvPicPr>
+          <p:cNvPr id="9" name="Immagine 8">
+            <a:extLst>
+              <a:ext uri="{FF2B5EF4-FFF2-40B4-BE49-F238E27FC236}">
+                <a16:creationId xmlns:a16="http://schemas.microsoft.com/office/drawing/2014/main" id="{6E13902C-5699-5D03-32AB-7F96F098BCF3}"/>
+              </a:ext>
+            </a:extLst>
+          </p:cNvPr>
+          <p:cNvPicPr>
+            <a:picLocks noChangeAspect="1"/>
+          </p:cNvPicPr>
+          <p:nvPr/>
+        </p:nvPicPr>
+        <p:blipFill>
+          <a:blip r:embed="rId2"/>
+          <a:stretch>
+            <a:fillRect/>
+          </a:stretch>
+        </p:blipFill>
+        <p:spPr>
+          <a:xfrm>
+            <a:off x="1891334" y="3805758"/>
+            <a:ext cx="5361332" cy="2413443"/>
+          </a:xfrm>
+          <a:prstGeom prst="rect">
+            <a:avLst/>
+          </a:prstGeom>
+        </p:spPr>
+      </p:pic>
     </p:spTree>
     <p:extLst>
       <p:ext uri="{BB962C8B-B14F-4D97-AF65-F5344CB8AC3E}">

</xml_diff>

<commit_message>
WNMA project + OTA update
</commit_message>
<xml_diff>
--- a/Wireless Networks for Mobile Applications/Project/Presentation/Presentation.pptx
+++ b/Wireless Networks for Mobile Applications/Project/Presentation/Presentation.pptx
@@ -211,7 +211,7 @@
           <a:p>
             <a:fld id="{0E4AAC6D-2322-45B9-8ECA-34DF280B0776}" type="datetimeFigureOut">
               <a:rPr lang="en-US" smtClean="0"/>
-              <a:t>2/4/2025</a:t>
+              <a:t>2/9/2025</a:t>
             </a:fld>
             <a:endParaRPr lang="en-US"/>
           </a:p>
@@ -2071,7 +2071,19 @@
               <a:rPr lang="en-GB" sz="2200" dirty="0">
                 <a:latin typeface="Aptos" panose="020B0004020202020204" pitchFamily="34" charset="0"/>
               </a:rPr>
-              <a:t>: Full HD processing times at the edge were significantly better compared to centralized cloud setups.</a:t>
+              <a:t>: HD processing times below 70 </a:t>
+            </a:r>
+            <a:r>
+              <a:rPr lang="en-GB" sz="2200" dirty="0" err="1">
+                <a:latin typeface="Aptos" panose="020B0004020202020204" pitchFamily="34" charset="0"/>
+              </a:rPr>
+              <a:t>ms</a:t>
+            </a:r>
+            <a:r>
+              <a:rPr lang="en-GB" sz="2200" dirty="0">
+                <a:latin typeface="Aptos" panose="020B0004020202020204" pitchFamily="34" charset="0"/>
+              </a:rPr>
+              <a:t> with the edge setup even considering fast-paced interactions.</a:t>
             </a:r>
           </a:p>
           <a:p>
@@ -2269,8 +2281,8 @@
         </p:nvSpPr>
         <p:spPr>
           <a:xfrm>
-            <a:off x="1456016" y="5761471"/>
-            <a:ext cx="6225615" cy="338554"/>
+            <a:off x="1316366" y="5757863"/>
+            <a:ext cx="6504915" cy="338554"/>
           </a:xfrm>
           <a:prstGeom prst="rect">
             <a:avLst/>
@@ -2285,11 +2297,13 @@
           <a:p>
             <a:r>
               <a:rPr lang="en-US" sz="1600" b="0" i="0" u="none" strike="noStrike" baseline="0" dirty="0">
-                <a:latin typeface="ClassicoURW-Reg"/>
+                <a:latin typeface="Aptos" panose="020B0004020202020204" pitchFamily="34" charset="0"/>
               </a:rPr>
               <a:t>Architecture of an edge computing platform in IoT-based manufacturing</a:t>
             </a:r>
-            <a:endParaRPr lang="en-GB" sz="1600" dirty="0"/>
+            <a:endParaRPr lang="en-GB" sz="1600" dirty="0">
+              <a:latin typeface="Aptos" panose="020B0004020202020204" pitchFamily="34" charset="0"/>
+            </a:endParaRPr>
           </a:p>
         </p:txBody>
       </p:sp>
@@ -2380,7 +2394,7 @@
         </p:spPr>
         <p:txBody>
           <a:bodyPr>
-            <a:normAutofit lnSpcReduction="10000"/>
+            <a:normAutofit/>
           </a:bodyPr>
           <a:lstStyle/>
           <a:p>
@@ -2413,21 +2427,53 @@
               <a:spcBef>
                 <a:spcPts val="0"/>
               </a:spcBef>
+            </a:pPr>
+            <a:r>
+              <a:rPr lang="en-US" sz="2200" b="1" dirty="0">
+                <a:latin typeface="Aptos" panose="020B0004020202020204" pitchFamily="34" charset="0"/>
+              </a:rPr>
+              <a:t>Active Maintenance</a:t>
+            </a:r>
+            <a:r>
+              <a:rPr lang="en-US" sz="2200" dirty="0">
+                <a:latin typeface="Aptos" panose="020B0004020202020204" pitchFamily="34" charset="0"/>
+              </a:rPr>
+              <a:t>: </a:t>
+            </a:r>
+          </a:p>
+          <a:p>
+            <a:pPr lvl="1">
+              <a:buFont typeface="Courier New" panose="02070309020205020404" pitchFamily="49" charset="0"/>
+              <a:buChar char="o"/>
+            </a:pPr>
+            <a:r>
+              <a:rPr lang="en-US" sz="2200" dirty="0">
+                <a:latin typeface="Aptos" panose="020B0004020202020204" pitchFamily="34" charset="0"/>
+              </a:rPr>
+              <a:t>Enhanced responsiveness through localized processing.</a:t>
+            </a:r>
+          </a:p>
+          <a:p>
+            <a:pPr lvl="1">
               <a:spcAft>
                 <a:spcPts val="500"/>
               </a:spcAft>
-            </a:pPr>
+              <a:buFont typeface="Courier New" panose="02070309020205020404" pitchFamily="49" charset="0"/>
+              <a:buChar char="o"/>
+            </a:pPr>
+            <a:r>
+              <a:rPr lang="en-US" sz="2200" dirty="0">
+                <a:latin typeface="Aptos" panose="020B0004020202020204" pitchFamily="34" charset="0"/>
+              </a:rPr>
+              <a:t>Case study on candy packaging line showed a 60% reduction in network traffic (from 16-17 Mb/s to 5-6 Mb/s) with improved order handling efficiency.</a:t>
+            </a:r>
+          </a:p>
+          <a:p>
             <a:r>
               <a:rPr lang="en-US" sz="2200" b="1" dirty="0">
                 <a:latin typeface="Aptos" panose="020B0004020202020204" pitchFamily="34" charset="0"/>
               </a:rPr>
-              <a:t>Key Benefits</a:t>
-            </a:r>
-            <a:r>
-              <a:rPr lang="en-US" sz="2200" dirty="0">
-                <a:latin typeface="Aptos" panose="020B0004020202020204" pitchFamily="34" charset="0"/>
-              </a:rPr>
-              <a:t>:</a:t>
+              <a:t>Cloud-Edge Cooperation:</a:t>
             </a:r>
           </a:p>
           <a:p>
@@ -2436,73 +2482,16 @@
               <a:buChar char="o"/>
             </a:pPr>
             <a:r>
-              <a:rPr lang="en-US" sz="2200" b="1" dirty="0">
-                <a:latin typeface="Aptos" panose="020B0004020202020204" pitchFamily="34" charset="0"/>
-              </a:rPr>
-              <a:t>Active Maintenance</a:t>
-            </a:r>
-            <a:r>
               <a:rPr lang="en-US" sz="2200" dirty="0">
                 <a:latin typeface="Aptos" panose="020B0004020202020204" pitchFamily="34" charset="0"/>
               </a:rPr>
-              <a:t>: </a:t>
-            </a:r>
-          </a:p>
-          <a:p>
-            <a:pPr lvl="2">
-              <a:buFont typeface="Wingdings" panose="05000000000000000000" pitchFamily="2" charset="2"/>
-              <a:buChar char="§"/>
-            </a:pPr>
-            <a:r>
-              <a:rPr lang="en-US" sz="2200" dirty="0">
-                <a:latin typeface="Aptos" panose="020B0004020202020204" pitchFamily="34" charset="0"/>
-              </a:rPr>
-              <a:t>Enhanced responsiveness through localized processing.</a:t>
-            </a:r>
-          </a:p>
-          <a:p>
-            <a:pPr lvl="2">
-              <a:spcAft>
-                <a:spcPts val="500"/>
-              </a:spcAft>
-              <a:buFont typeface="Wingdings" panose="05000000000000000000" pitchFamily="2" charset="2"/>
-              <a:buChar char="§"/>
-            </a:pPr>
-            <a:r>
-              <a:rPr lang="en-US" sz="2200" dirty="0">
-                <a:latin typeface="Aptos" panose="020B0004020202020204" pitchFamily="34" charset="0"/>
-              </a:rPr>
-              <a:t>Case study on candy packaging line showed a 60% reduction in network traffic (from 16-17 Mb/s to 5-6 Mb/s) with improved order handling efficiency.</a:t>
+              <a:t>Cloud layers handle long-term data analysis, maintenance planning, and knowledge mining.</a:t>
             </a:r>
           </a:p>
           <a:p>
             <a:pPr lvl="1">
               <a:buFont typeface="Courier New" panose="02070309020205020404" pitchFamily="49" charset="0"/>
               <a:buChar char="o"/>
-            </a:pPr>
-            <a:r>
-              <a:rPr lang="en-US" sz="2200" b="1" dirty="0">
-                <a:latin typeface="Aptos" panose="020B0004020202020204" pitchFamily="34" charset="0"/>
-              </a:rPr>
-              <a:t>Cloud-Edge Cooperation:</a:t>
-            </a:r>
-          </a:p>
-          <a:p>
-            <a:pPr lvl="2">
-              <a:buFont typeface="Wingdings" panose="05000000000000000000" pitchFamily="2" charset="2"/>
-              <a:buChar char="§"/>
-            </a:pPr>
-            <a:r>
-              <a:rPr lang="en-US" sz="2200" dirty="0">
-                <a:latin typeface="Aptos" panose="020B0004020202020204" pitchFamily="34" charset="0"/>
-              </a:rPr>
-              <a:t>Cloud layers handle long-term data analysis, maintenance planning, and knowledge mining.</a:t>
-            </a:r>
-          </a:p>
-          <a:p>
-            <a:pPr lvl="2">
-              <a:buFont typeface="Wingdings" panose="05000000000000000000" pitchFamily="2" charset="2"/>
-              <a:buChar char="§"/>
             </a:pPr>
             <a:r>
               <a:rPr lang="en-US" sz="2200" dirty="0">
@@ -2632,18 +2621,18 @@
         <p:spPr/>
         <p:txBody>
           <a:bodyPr>
-            <a:normAutofit fontScale="92500"/>
+            <a:normAutofit/>
           </a:bodyPr>
           <a:lstStyle/>
           <a:p>
             <a:r>
-              <a:rPr lang="en-US" sz="2400" b="1" dirty="0">
+              <a:rPr lang="en-US" sz="2200" b="1" dirty="0">
                 <a:latin typeface="Aptos" panose="020B0004020202020204" pitchFamily="34" charset="0"/>
               </a:rPr>
               <a:t>Implementation Challenges</a:t>
             </a:r>
             <a:r>
-              <a:rPr lang="en-US" sz="2400" dirty="0">
+              <a:rPr lang="en-US" sz="2200" dirty="0">
                 <a:latin typeface="Aptos" panose="020B0004020202020204" pitchFamily="34" charset="0"/>
               </a:rPr>
               <a:t>:</a:t>
@@ -2655,7 +2644,7 @@
               <a:buChar char="o"/>
             </a:pPr>
             <a:r>
-              <a:rPr lang="en-US" dirty="0">
+              <a:rPr lang="en-US" sz="2200" dirty="0">
                 <a:latin typeface="Aptos" panose="020B0004020202020204" pitchFamily="34" charset="0"/>
               </a:rPr>
               <a:t>Protocol compatibility across legacy and modern systems.</a:t>
@@ -2667,7 +2656,7 @@
               <a:buChar char="o"/>
             </a:pPr>
             <a:r>
-              <a:rPr lang="en-US" dirty="0">
+              <a:rPr lang="en-US" sz="2200" dirty="0">
                 <a:latin typeface="Aptos" panose="020B0004020202020204" pitchFamily="34" charset="0"/>
               </a:rPr>
               <a:t>Real-time processing for time-sensitive manufacturing tasks.</a:t>
@@ -2677,7 +2666,7 @@
             <a:pPr marL="0" indent="0">
               <a:buNone/>
             </a:pPr>
-            <a:endParaRPr lang="en-US" sz="2600" dirty="0">
+            <a:endParaRPr lang="en-US" sz="1000" dirty="0">
               <a:latin typeface="Aptos" panose="020B0004020202020204" pitchFamily="34" charset="0"/>
             </a:endParaRPr>
           </a:p>
@@ -2688,13 +2677,13 @@
               </a:spcBef>
             </a:pPr>
             <a:r>
-              <a:rPr lang="en-US" sz="2400" b="1" dirty="0">
+              <a:rPr lang="en-US" sz="2200" b="1" dirty="0">
                 <a:latin typeface="Aptos" panose="020B0004020202020204" pitchFamily="34" charset="0"/>
               </a:rPr>
               <a:t>Future Directions</a:t>
             </a:r>
             <a:r>
-              <a:rPr lang="en-US" sz="2400" dirty="0">
+              <a:rPr lang="en-US" sz="2200" dirty="0">
                 <a:latin typeface="Aptos" panose="020B0004020202020204" pitchFamily="34" charset="0"/>
               </a:rPr>
               <a:t>:</a:t>
@@ -2706,7 +2695,7 @@
               <a:buChar char="o"/>
             </a:pPr>
             <a:r>
-              <a:rPr lang="en-US" dirty="0">
+              <a:rPr lang="en-US" sz="2200" dirty="0">
                 <a:latin typeface="Aptos" panose="020B0004020202020204" pitchFamily="34" charset="0"/>
               </a:rPr>
               <a:t>Evolution of digital twins for manufacturing optimization.</a:t>
@@ -2718,7 +2707,7 @@
               <a:buChar char="o"/>
             </a:pPr>
             <a:r>
-              <a:rPr lang="en-US" dirty="0">
+              <a:rPr lang="en-US" sz="2200" dirty="0">
                 <a:latin typeface="Aptos" panose="020B0004020202020204" pitchFamily="34" charset="0"/>
               </a:rPr>
               <a:t>Enhanced autonomous systems for process management.</a:t>
@@ -2730,7 +2719,7 @@
               <a:buChar char="o"/>
             </a:pPr>
             <a:r>
-              <a:rPr lang="en-US" dirty="0">
+              <a:rPr lang="en-US" sz="2200" dirty="0">
                 <a:latin typeface="Aptos" panose="020B0004020202020204" pitchFamily="34" charset="0"/>
               </a:rPr>
               <a:t>Continued development in network optimization for seamless edge-cloud integration.</a:t>
@@ -5210,7 +5199,7 @@
             </a:r>
             <a:r>
               <a:rPr lang="en-US" sz="2200" dirty="0"/>
-              <a:t>: Response delay, comprising processing delay (PD), network delay (ND), and playout delay (PD).</a:t>
+              <a:t>: Response delay, comprising processing delay (PD), network delay (ND), and playout delay (OD).</a:t>
             </a:r>
             <a:endParaRPr lang="en-GB" sz="2200" dirty="0">
               <a:latin typeface="Aptos" panose="020B0004020202020204" pitchFamily="34" charset="0"/>

</xml_diff>

<commit_message>
WNMA project presentation update
</commit_message>
<xml_diff>
--- a/Wireless Networks for Mobile Applications/Project/Presentation/Presentation.pptx
+++ b/Wireless Networks for Mobile Applications/Project/Presentation/Presentation.pptx
@@ -5,7 +5,7 @@
     <p:sldMasterId id="2147483660" r:id="rId1"/>
   </p:sldMasterIdLst>
   <p:notesMasterIdLst>
-    <p:notesMasterId r:id="rId17"/>
+    <p:notesMasterId r:id="rId15"/>
   </p:notesMasterIdLst>
   <p:sldIdLst>
     <p:sldId id="256" r:id="rId2"/>
@@ -13,16 +13,14 @@
     <p:sldId id="258" r:id="rId4"/>
     <p:sldId id="260" r:id="rId5"/>
     <p:sldId id="261" r:id="rId6"/>
-    <p:sldId id="262" r:id="rId7"/>
-    <p:sldId id="263" r:id="rId8"/>
-    <p:sldId id="268" r:id="rId9"/>
-    <p:sldId id="265" r:id="rId10"/>
-    <p:sldId id="269" r:id="rId11"/>
-    <p:sldId id="266" r:id="rId12"/>
-    <p:sldId id="271" r:id="rId13"/>
-    <p:sldId id="272" r:id="rId14"/>
-    <p:sldId id="267" r:id="rId15"/>
-    <p:sldId id="259" r:id="rId16"/>
+    <p:sldId id="263" r:id="rId7"/>
+    <p:sldId id="268" r:id="rId8"/>
+    <p:sldId id="265" r:id="rId9"/>
+    <p:sldId id="269" r:id="rId10"/>
+    <p:sldId id="266" r:id="rId11"/>
+    <p:sldId id="271" r:id="rId12"/>
+    <p:sldId id="267" r:id="rId13"/>
+    <p:sldId id="259" r:id="rId14"/>
   </p:sldIdLst>
   <p:sldSz cx="9144000" cy="6858000" type="screen4x3"/>
   <p:notesSz cx="6858000" cy="9144000"/>
@@ -211,7 +209,7 @@
           <a:p>
             <a:fld id="{0E4AAC6D-2322-45B9-8ECA-34DF280B0776}" type="datetimeFigureOut">
               <a:rPr lang="en-US" smtClean="0"/>
-              <a:t>2/9/2025</a:t>
+              <a:t>2/28/2025</a:t>
             </a:fld>
             <a:endParaRPr lang="en-US"/>
           </a:p>
@@ -1951,7 +1949,7 @@
           <p:cNvPr id="2" name="Titolo 1">
             <a:extLst>
               <a:ext uri="{FF2B5EF4-FFF2-40B4-BE49-F238E27FC236}">
-                <a16:creationId xmlns:a16="http://schemas.microsoft.com/office/drawing/2014/main" id="{102AE1BD-8965-72C6-927D-819BAF7F1F62}"/>
+                <a16:creationId xmlns:a16="http://schemas.microsoft.com/office/drawing/2014/main" id="{E3B721EA-B270-BE2B-2E86-9B3BEFC54178}"/>
               </a:ext>
             </a:extLst>
           </p:cNvPr>
@@ -1970,21 +1968,49 @@
           <a:lstStyle/>
           <a:p>
             <a:r>
-              <a:rPr lang="en-GB" sz="4000" dirty="0">
-                <a:latin typeface="Aptos" panose="020B0004020202020204" pitchFamily="34" charset="0"/>
-              </a:rPr>
-              <a:t>A study on mobile gaming</a:t>
-            </a:r>
-            <a:endParaRPr lang="en-GB" sz="4000" dirty="0"/>
-          </a:p>
-        </p:txBody>
-      </p:sp>
-      <p:sp>
-        <p:nvSpPr>
-          <p:cNvPr id="3" name="Segnaposto contenuto 2">
-            <a:extLst>
-              <a:ext uri="{FF2B5EF4-FFF2-40B4-BE49-F238E27FC236}">
-                <a16:creationId xmlns:a16="http://schemas.microsoft.com/office/drawing/2014/main" id="{0B672E95-C66D-804E-FB40-978D2F4DB097}"/>
+              <a:rPr lang="en-GB" sz="3200" dirty="0">
+                <a:latin typeface="Aptos" panose="020B0004020202020204" pitchFamily="34" charset="0"/>
+              </a:rPr>
+              <a:t>A study on industrial manufacturing</a:t>
+            </a:r>
+          </a:p>
+        </p:txBody>
+      </p:sp>
+      <p:pic>
+        <p:nvPicPr>
+          <p:cNvPr id="6" name="Segnaposto contenuto 5">
+            <a:extLst>
+              <a:ext uri="{FF2B5EF4-FFF2-40B4-BE49-F238E27FC236}">
+                <a16:creationId xmlns:a16="http://schemas.microsoft.com/office/drawing/2014/main" id="{5F53FEC9-B9A1-B604-1D28-07F1F968E1F5}"/>
+              </a:ext>
+            </a:extLst>
+          </p:cNvPr>
+          <p:cNvPicPr>
+            <a:picLocks noGrp="1" noChangeAspect="1"/>
+          </p:cNvPicPr>
+          <p:nvPr>
+            <p:ph idx="1"/>
+          </p:nvPr>
+        </p:nvPicPr>
+        <p:blipFill>
+          <a:blip r:embed="rId2"/>
+          <a:stretch>
+            <a:fillRect/>
+          </a:stretch>
+        </p:blipFill>
+        <p:spPr>
+          <a:xfrm>
+            <a:off x="1176718" y="1406525"/>
+            <a:ext cx="6784213" cy="4351338"/>
+          </a:xfrm>
+        </p:spPr>
+      </p:pic>
+      <p:sp>
+        <p:nvSpPr>
+          <p:cNvPr id="4" name="Segnaposto numero diapositiva 3">
+            <a:extLst>
+              <a:ext uri="{FF2B5EF4-FFF2-40B4-BE49-F238E27FC236}">
+                <a16:creationId xmlns:a16="http://schemas.microsoft.com/office/drawing/2014/main" id="{2D2E60A3-4BAF-0AC0-40E6-AA9A770621FF}"/>
               </a:ext>
             </a:extLst>
           </p:cNvPr>
@@ -1992,129 +2018,6 @@
             <a:spLocks noGrp="1"/>
           </p:cNvSpPr>
           <p:nvPr>
-            <p:ph idx="1"/>
-          </p:nvPr>
-        </p:nvSpPr>
-        <p:spPr>
-          <a:xfrm>
-            <a:off x="625959" y="1406413"/>
-            <a:ext cx="8046985" cy="4615696"/>
-          </a:xfrm>
-        </p:spPr>
-        <p:txBody>
-          <a:bodyPr>
-            <a:normAutofit/>
-          </a:bodyPr>
-          <a:lstStyle/>
-          <a:p>
-            <a:r>
-              <a:rPr lang="en-GB" sz="2200" b="1" dirty="0">
-                <a:latin typeface="Aptos" panose="020B0004020202020204" pitchFamily="34" charset="0"/>
-              </a:rPr>
-              <a:t>Findings</a:t>
-            </a:r>
-            <a:r>
-              <a:rPr lang="en-GB" sz="2200" dirty="0">
-                <a:latin typeface="Aptos" panose="020B0004020202020204" pitchFamily="34" charset="0"/>
-              </a:rPr>
-              <a:t>:</a:t>
-            </a:r>
-          </a:p>
-          <a:p>
-            <a:pPr lvl="1">
-              <a:buFont typeface="Courier New" panose="02070309020205020404" pitchFamily="49" charset="0"/>
-              <a:buChar char="o"/>
-            </a:pPr>
-            <a:r>
-              <a:rPr lang="en-GB" sz="2200" b="1" u="sng" dirty="0">
-                <a:latin typeface="Aptos" panose="020B0004020202020204" pitchFamily="34" charset="0"/>
-              </a:rPr>
-              <a:t>Latency</a:t>
-            </a:r>
-            <a:r>
-              <a:rPr lang="en-GB" sz="2200" dirty="0">
-                <a:latin typeface="Aptos" panose="020B0004020202020204" pitchFamily="34" charset="0"/>
-              </a:rPr>
-              <a:t>: Edge setup achieved network delay (ND) of &lt;20ms, outperforming cloud setups which showed &gt;50ms delay.</a:t>
-            </a:r>
-          </a:p>
-          <a:p>
-            <a:pPr lvl="1">
-              <a:buFont typeface="Courier New" panose="02070309020205020404" pitchFamily="49" charset="0"/>
-              <a:buChar char="o"/>
-            </a:pPr>
-            <a:r>
-              <a:rPr lang="en-GB" sz="2200" b="1" u="sng" dirty="0">
-                <a:latin typeface="Aptos" panose="020B0004020202020204" pitchFamily="34" charset="0"/>
-              </a:rPr>
-              <a:t>Virtualization</a:t>
-            </a:r>
-            <a:r>
-              <a:rPr lang="en-GB" sz="2200" dirty="0">
-                <a:latin typeface="Aptos" panose="020B0004020202020204" pitchFamily="34" charset="0"/>
-              </a:rPr>
-              <a:t>: Containers delivered near-bare-metal performance, while hypervisor virtualization incurred ~30% higher processing delay.</a:t>
-            </a:r>
-          </a:p>
-          <a:p>
-            <a:pPr lvl="1">
-              <a:buFont typeface="Courier New" panose="02070309020205020404" pitchFamily="49" charset="0"/>
-              <a:buChar char="o"/>
-            </a:pPr>
-            <a:r>
-              <a:rPr lang="en-GB" sz="2200" b="1" u="sng" dirty="0">
-                <a:latin typeface="Aptos" panose="020B0004020202020204" pitchFamily="34" charset="0"/>
-              </a:rPr>
-              <a:t>Resolution</a:t>
-            </a:r>
-            <a:r>
-              <a:rPr lang="en-GB" sz="2200" dirty="0">
-                <a:latin typeface="Aptos" panose="020B0004020202020204" pitchFamily="34" charset="0"/>
-              </a:rPr>
-              <a:t>: HD processing times below 70 </a:t>
-            </a:r>
-            <a:r>
-              <a:rPr lang="en-GB" sz="2200" dirty="0" err="1">
-                <a:latin typeface="Aptos" panose="020B0004020202020204" pitchFamily="34" charset="0"/>
-              </a:rPr>
-              <a:t>ms</a:t>
-            </a:r>
-            <a:r>
-              <a:rPr lang="en-GB" sz="2200" dirty="0">
-                <a:latin typeface="Aptos" panose="020B0004020202020204" pitchFamily="34" charset="0"/>
-              </a:rPr>
-              <a:t> with the edge setup even considering fast-paced interactions.</a:t>
-            </a:r>
-          </a:p>
-          <a:p>
-            <a:r>
-              <a:rPr lang="en-GB" sz="2200" b="1" dirty="0">
-                <a:latin typeface="Aptos" panose="020B0004020202020204" pitchFamily="34" charset="0"/>
-              </a:rPr>
-              <a:t>Conclusion</a:t>
-            </a:r>
-            <a:r>
-              <a:rPr lang="en-GB" sz="2200" dirty="0">
-                <a:latin typeface="Aptos" panose="020B0004020202020204" pitchFamily="34" charset="0"/>
-              </a:rPr>
-              <a:t>: Proximity of computational resources crucial to enhance the user experience.</a:t>
-            </a:r>
-          </a:p>
-        </p:txBody>
-      </p:sp>
-      <p:sp>
-        <p:nvSpPr>
-          <p:cNvPr id="4" name="Segnaposto numero diapositiva 3">
-            <a:extLst>
-              <a:ext uri="{FF2B5EF4-FFF2-40B4-BE49-F238E27FC236}">
-                <a16:creationId xmlns:a16="http://schemas.microsoft.com/office/drawing/2014/main" id="{6A42A948-B0AA-9936-C960-9A762B4A9493}"/>
-              </a:ext>
-            </a:extLst>
-          </p:cNvPr>
-          <p:cNvSpPr>
-            <a:spLocks noGrp="1"/>
-          </p:cNvSpPr>
-          <p:nvPr>
             <p:ph type="sldNum" sz="quarter" idx="4"/>
           </p:nvPr>
         </p:nvSpPr>
@@ -2134,15 +2037,55 @@
               <a:rPr lang="en-US" dirty="0">
                 <a:latin typeface="Aptos" panose="020B0004020202020204" pitchFamily="34" charset="0"/>
               </a:rPr>
-              <a:t> of 15</a:t>
-            </a:r>
+              <a:t> of 13</a:t>
+            </a:r>
+          </a:p>
+        </p:txBody>
+      </p:sp>
+      <p:sp>
+        <p:nvSpPr>
+          <p:cNvPr id="7" name="CasellaDiTesto 6">
+            <a:extLst>
+              <a:ext uri="{FF2B5EF4-FFF2-40B4-BE49-F238E27FC236}">
+                <a16:creationId xmlns:a16="http://schemas.microsoft.com/office/drawing/2014/main" id="{D3C5E2E2-527A-8364-EDB4-A01D644CC2DC}"/>
+              </a:ext>
+            </a:extLst>
+          </p:cNvPr>
+          <p:cNvSpPr txBox="1"/>
+          <p:nvPr/>
+        </p:nvSpPr>
+        <p:spPr>
+          <a:xfrm>
+            <a:off x="1316366" y="5757863"/>
+            <a:ext cx="6504915" cy="338554"/>
+          </a:xfrm>
+          <a:prstGeom prst="rect">
+            <a:avLst/>
+          </a:prstGeom>
+          <a:noFill/>
+        </p:spPr>
+        <p:txBody>
+          <a:bodyPr wrap="square" rtlCol="0">
+            <a:spAutoFit/>
+          </a:bodyPr>
+          <a:lstStyle/>
+          <a:p>
+            <a:r>
+              <a:rPr lang="en-US" sz="1600" b="0" i="0" u="none" strike="noStrike" baseline="0" dirty="0">
+                <a:latin typeface="Aptos" panose="020B0004020202020204" pitchFamily="34" charset="0"/>
+              </a:rPr>
+              <a:t>Architecture of an edge computing platform in IoT-based manufacturing</a:t>
+            </a:r>
+            <a:endParaRPr lang="en-GB" sz="1600" dirty="0">
+              <a:latin typeface="Aptos" panose="020B0004020202020204" pitchFamily="34" charset="0"/>
+            </a:endParaRPr>
           </a:p>
         </p:txBody>
       </p:sp>
     </p:spTree>
     <p:extLst>
       <p:ext uri="{BB962C8B-B14F-4D97-AF65-F5344CB8AC3E}">
-        <p14:creationId xmlns:p14="http://schemas.microsoft.com/office/powerpoint/2010/main" val="1807275355"/>
+        <p14:creationId xmlns:p14="http://schemas.microsoft.com/office/powerpoint/2010/main" val="1006485871"/>
       </p:ext>
     </p:extLst>
   </p:cSld>
@@ -2174,7 +2117,7 @@
           <p:cNvPr id="2" name="Titolo 1">
             <a:extLst>
               <a:ext uri="{FF2B5EF4-FFF2-40B4-BE49-F238E27FC236}">
-                <a16:creationId xmlns:a16="http://schemas.microsoft.com/office/drawing/2014/main" id="{E3B721EA-B270-BE2B-2E86-9B3BEFC54178}"/>
+                <a16:creationId xmlns:a16="http://schemas.microsoft.com/office/drawing/2014/main" id="{8891E5DE-E79A-D36F-968F-7BDF19573F5F}"/>
               </a:ext>
             </a:extLst>
           </p:cNvPr>
@@ -2186,6 +2129,44 @@
           </p:nvPr>
         </p:nvSpPr>
         <p:spPr/>
+        <p:txBody>
+          <a:bodyPr>
+            <a:noAutofit/>
+          </a:bodyPr>
+          <a:lstStyle/>
+          <a:p>
+            <a:r>
+              <a:rPr lang="en-GB" sz="3200" dirty="0">
+                <a:latin typeface="Aptos" panose="020B0004020202020204" pitchFamily="34" charset="0"/>
+              </a:rPr>
+              <a:t>A study on industrial manufacturing</a:t>
+            </a:r>
+            <a:endParaRPr lang="en-GB" sz="3200" dirty="0"/>
+          </a:p>
+        </p:txBody>
+      </p:sp>
+      <p:sp>
+        <p:nvSpPr>
+          <p:cNvPr id="3" name="Segnaposto contenuto 2">
+            <a:extLst>
+              <a:ext uri="{FF2B5EF4-FFF2-40B4-BE49-F238E27FC236}">
+                <a16:creationId xmlns:a16="http://schemas.microsoft.com/office/drawing/2014/main" id="{2D8B8093-924B-DC07-C84C-118159540135}"/>
+              </a:ext>
+            </a:extLst>
+          </p:cNvPr>
+          <p:cNvSpPr>
+            <a:spLocks noGrp="1"/>
+          </p:cNvSpPr>
+          <p:nvPr>
+            <p:ph idx="1"/>
+          </p:nvPr>
+        </p:nvSpPr>
+        <p:spPr>
+          <a:xfrm>
+            <a:off x="628650" y="1378704"/>
+            <a:ext cx="7886700" cy="5086751"/>
+          </a:xfrm>
+        </p:spPr>
         <p:txBody>
           <a:bodyPr>
             <a:normAutofit/>
@@ -2193,49 +2174,115 @@
           <a:lstStyle/>
           <a:p>
             <a:r>
-              <a:rPr lang="en-GB" sz="3200" dirty="0">
-                <a:latin typeface="Aptos" panose="020B0004020202020204" pitchFamily="34" charset="0"/>
-              </a:rPr>
-              <a:t>A study on industrial manufacturing</a:t>
-            </a:r>
-          </a:p>
-        </p:txBody>
-      </p:sp>
-      <p:pic>
-        <p:nvPicPr>
-          <p:cNvPr id="6" name="Segnaposto contenuto 5">
-            <a:extLst>
-              <a:ext uri="{FF2B5EF4-FFF2-40B4-BE49-F238E27FC236}">
-                <a16:creationId xmlns:a16="http://schemas.microsoft.com/office/drawing/2014/main" id="{5F53FEC9-B9A1-B604-1D28-07F1F968E1F5}"/>
-              </a:ext>
-            </a:extLst>
-          </p:cNvPr>
-          <p:cNvPicPr>
-            <a:picLocks noGrp="1" noChangeAspect="1"/>
-          </p:cNvPicPr>
-          <p:nvPr>
-            <p:ph idx="1"/>
-          </p:nvPr>
-        </p:nvPicPr>
-        <p:blipFill>
-          <a:blip r:embed="rId2"/>
-          <a:stretch>
-            <a:fillRect/>
-          </a:stretch>
-        </p:blipFill>
-        <p:spPr>
-          <a:xfrm>
-            <a:off x="1176718" y="1406525"/>
-            <a:ext cx="6784213" cy="4351338"/>
-          </a:xfrm>
-        </p:spPr>
-      </p:pic>
+              <a:rPr lang="en-US" sz="2200" b="1" dirty="0">
+                <a:latin typeface="Aptos" panose="020B0004020202020204" pitchFamily="34" charset="0"/>
+              </a:rPr>
+              <a:t>Objective</a:t>
+            </a:r>
+            <a:r>
+              <a:rPr lang="en-US" sz="2200" dirty="0">
+                <a:latin typeface="Aptos" panose="020B0004020202020204" pitchFamily="34" charset="0"/>
+              </a:rPr>
+              <a:t>: Explores the integration of edge computing in IoT-based manufacturing to address latency, real-time analytics, and resource efficiency.</a:t>
+            </a:r>
+          </a:p>
+          <a:p>
+            <a:pPr marL="0" indent="0">
+              <a:spcBef>
+                <a:spcPts val="0"/>
+              </a:spcBef>
+              <a:buNone/>
+            </a:pPr>
+            <a:endParaRPr lang="en-US" sz="1400" dirty="0">
+              <a:latin typeface="Aptos" panose="020B0004020202020204" pitchFamily="34" charset="0"/>
+            </a:endParaRPr>
+          </a:p>
+          <a:p>
+            <a:pPr>
+              <a:spcBef>
+                <a:spcPts val="0"/>
+              </a:spcBef>
+            </a:pPr>
+            <a:r>
+              <a:rPr lang="en-US" sz="2200" b="1" dirty="0">
+                <a:latin typeface="Aptos" panose="020B0004020202020204" pitchFamily="34" charset="0"/>
+              </a:rPr>
+              <a:t>Active Maintenance</a:t>
+            </a:r>
+            <a:r>
+              <a:rPr lang="en-US" sz="2200" dirty="0">
+                <a:latin typeface="Aptos" panose="020B0004020202020204" pitchFamily="34" charset="0"/>
+              </a:rPr>
+              <a:t>: </a:t>
+            </a:r>
+          </a:p>
+          <a:p>
+            <a:pPr lvl="1">
+              <a:buFont typeface="Courier New" panose="02070309020205020404" pitchFamily="49" charset="0"/>
+              <a:buChar char="o"/>
+            </a:pPr>
+            <a:r>
+              <a:rPr lang="en-US" sz="2200" dirty="0">
+                <a:latin typeface="Aptos" panose="020B0004020202020204" pitchFamily="34" charset="0"/>
+              </a:rPr>
+              <a:t>Enhanced responsiveness through localized processing.</a:t>
+            </a:r>
+          </a:p>
+          <a:p>
+            <a:pPr lvl="1">
+              <a:spcAft>
+                <a:spcPts val="500"/>
+              </a:spcAft>
+              <a:buFont typeface="Courier New" panose="02070309020205020404" pitchFamily="49" charset="0"/>
+              <a:buChar char="o"/>
+            </a:pPr>
+            <a:r>
+              <a:rPr lang="en-US" sz="2200" dirty="0">
+                <a:latin typeface="Aptos" panose="020B0004020202020204" pitchFamily="34" charset="0"/>
+              </a:rPr>
+              <a:t>Case study on candy packaging line showed a 60% reduction in network traffic (from 16-17 Mb/s to 5-6 Mb/s) and an overall improvement on production efficiency.</a:t>
+            </a:r>
+          </a:p>
+          <a:p>
+            <a:r>
+              <a:rPr lang="en-US" sz="2200" b="1" dirty="0">
+                <a:latin typeface="Aptos" panose="020B0004020202020204" pitchFamily="34" charset="0"/>
+              </a:rPr>
+              <a:t>Cloud-Edge Cooperation:</a:t>
+            </a:r>
+          </a:p>
+          <a:p>
+            <a:pPr lvl="1">
+              <a:buFont typeface="Courier New" panose="02070309020205020404" pitchFamily="49" charset="0"/>
+              <a:buChar char="o"/>
+            </a:pPr>
+            <a:r>
+              <a:rPr lang="en-US" sz="2200" dirty="0">
+                <a:latin typeface="Aptos" panose="020B0004020202020204" pitchFamily="34" charset="0"/>
+              </a:rPr>
+              <a:t>Cloud layers handle long-term data analysis, maintenance planning, and knowledge mining.</a:t>
+            </a:r>
+          </a:p>
+          <a:p>
+            <a:pPr lvl="1">
+              <a:buFont typeface="Courier New" panose="02070309020205020404" pitchFamily="49" charset="0"/>
+              <a:buChar char="o"/>
+            </a:pPr>
+            <a:r>
+              <a:rPr lang="en-US" sz="2200" dirty="0">
+                <a:latin typeface="Aptos" panose="020B0004020202020204" pitchFamily="34" charset="0"/>
+              </a:rPr>
+              <a:t>Edge layers focus on real-time processing, security, and immediate business logic execution.</a:t>
+            </a:r>
+          </a:p>
+        </p:txBody>
+      </p:sp>
       <p:sp>
         <p:nvSpPr>
           <p:cNvPr id="4" name="Segnaposto numero diapositiva 3">
             <a:extLst>
               <a:ext uri="{FF2B5EF4-FFF2-40B4-BE49-F238E27FC236}">
-                <a16:creationId xmlns:a16="http://schemas.microsoft.com/office/drawing/2014/main" id="{2D2E60A3-4BAF-0AC0-40E6-AA9A770621FF}"/>
+                <a16:creationId xmlns:a16="http://schemas.microsoft.com/office/drawing/2014/main" id="{F635F4B9-8804-713C-2351-DDD3E3E65414}"/>
               </a:ext>
             </a:extLst>
           </p:cNvPr>
@@ -2262,55 +2309,15 @@
               <a:rPr lang="en-US" dirty="0">
                 <a:latin typeface="Aptos" panose="020B0004020202020204" pitchFamily="34" charset="0"/>
               </a:rPr>
-              <a:t> of 15</a:t>
-            </a:r>
-          </a:p>
-        </p:txBody>
-      </p:sp>
-      <p:sp>
-        <p:nvSpPr>
-          <p:cNvPr id="7" name="CasellaDiTesto 6">
-            <a:extLst>
-              <a:ext uri="{FF2B5EF4-FFF2-40B4-BE49-F238E27FC236}">
-                <a16:creationId xmlns:a16="http://schemas.microsoft.com/office/drawing/2014/main" id="{D3C5E2E2-527A-8364-EDB4-A01D644CC2DC}"/>
-              </a:ext>
-            </a:extLst>
-          </p:cNvPr>
-          <p:cNvSpPr txBox="1"/>
-          <p:nvPr/>
-        </p:nvSpPr>
-        <p:spPr>
-          <a:xfrm>
-            <a:off x="1316366" y="5757863"/>
-            <a:ext cx="6504915" cy="338554"/>
-          </a:xfrm>
-          <a:prstGeom prst="rect">
-            <a:avLst/>
-          </a:prstGeom>
-          <a:noFill/>
-        </p:spPr>
-        <p:txBody>
-          <a:bodyPr wrap="square" rtlCol="0">
-            <a:spAutoFit/>
-          </a:bodyPr>
-          <a:lstStyle/>
-          <a:p>
-            <a:r>
-              <a:rPr lang="en-US" sz="1600" b="0" i="0" u="none" strike="noStrike" baseline="0" dirty="0">
-                <a:latin typeface="Aptos" panose="020B0004020202020204" pitchFamily="34" charset="0"/>
-              </a:rPr>
-              <a:t>Architecture of an edge computing platform in IoT-based manufacturing</a:t>
-            </a:r>
-            <a:endParaRPr lang="en-GB" sz="1600" dirty="0">
-              <a:latin typeface="Aptos" panose="020B0004020202020204" pitchFamily="34" charset="0"/>
-            </a:endParaRPr>
+              <a:t> of 13</a:t>
+            </a:r>
           </a:p>
         </p:txBody>
       </p:sp>
     </p:spTree>
     <p:extLst>
       <p:ext uri="{BB962C8B-B14F-4D97-AF65-F5344CB8AC3E}">
-        <p14:creationId xmlns:p14="http://schemas.microsoft.com/office/powerpoint/2010/main" val="1006485871"/>
+        <p14:creationId xmlns:p14="http://schemas.microsoft.com/office/powerpoint/2010/main" val="603930834"/>
       </p:ext>
     </p:extLst>
   </p:cSld>
@@ -2342,7 +2349,7 @@
           <p:cNvPr id="2" name="Titolo 1">
             <a:extLst>
               <a:ext uri="{FF2B5EF4-FFF2-40B4-BE49-F238E27FC236}">
-                <a16:creationId xmlns:a16="http://schemas.microsoft.com/office/drawing/2014/main" id="{8891E5DE-E79A-D36F-968F-7BDF19573F5F}"/>
+                <a16:creationId xmlns:a16="http://schemas.microsoft.com/office/drawing/2014/main" id="{23467997-24D6-9219-4C34-5DD0FF2F2F1C}"/>
               </a:ext>
             </a:extLst>
           </p:cNvPr>
@@ -2354,44 +2361,6 @@
           </p:nvPr>
         </p:nvSpPr>
         <p:spPr/>
-        <p:txBody>
-          <a:bodyPr>
-            <a:noAutofit/>
-          </a:bodyPr>
-          <a:lstStyle/>
-          <a:p>
-            <a:r>
-              <a:rPr lang="en-GB" sz="3200" dirty="0">
-                <a:latin typeface="Aptos" panose="020B0004020202020204" pitchFamily="34" charset="0"/>
-              </a:rPr>
-              <a:t>A study on industrial manufacturing</a:t>
-            </a:r>
-            <a:endParaRPr lang="en-GB" sz="3200" dirty="0"/>
-          </a:p>
-        </p:txBody>
-      </p:sp>
-      <p:sp>
-        <p:nvSpPr>
-          <p:cNvPr id="3" name="Segnaposto contenuto 2">
-            <a:extLst>
-              <a:ext uri="{FF2B5EF4-FFF2-40B4-BE49-F238E27FC236}">
-                <a16:creationId xmlns:a16="http://schemas.microsoft.com/office/drawing/2014/main" id="{2D8B8093-924B-DC07-C84C-118159540135}"/>
-              </a:ext>
-            </a:extLst>
-          </p:cNvPr>
-          <p:cNvSpPr>
-            <a:spLocks noGrp="1"/>
-          </p:cNvSpPr>
-          <p:nvPr>
-            <p:ph idx="1"/>
-          </p:nvPr>
-        </p:nvSpPr>
-        <p:spPr>
-          <a:xfrm>
-            <a:off x="628650" y="1378704"/>
-            <a:ext cx="7886700" cy="5086751"/>
-          </a:xfrm>
-        </p:spPr>
         <p:txBody>
           <a:bodyPr>
             <a:normAutofit/>
@@ -2399,105 +2368,144 @@
           <a:lstStyle/>
           <a:p>
             <a:r>
-              <a:rPr lang="en-US" sz="2200" b="1" dirty="0">
-                <a:latin typeface="Aptos" panose="020B0004020202020204" pitchFamily="34" charset="0"/>
-              </a:rPr>
-              <a:t>Objective</a:t>
-            </a:r>
-            <a:r>
-              <a:rPr lang="en-US" sz="2200" dirty="0">
-                <a:latin typeface="Aptos" panose="020B0004020202020204" pitchFamily="34" charset="0"/>
-              </a:rPr>
-              <a:t>: Explores the integration of edge computing in IoT-based manufacturing to address latency, real-time analytics, and resource efficiency.</a:t>
-            </a:r>
-          </a:p>
-          <a:p>
-            <a:pPr marL="0" indent="0">
-              <a:spcBef>
-                <a:spcPts val="0"/>
-              </a:spcBef>
-              <a:buNone/>
-            </a:pPr>
-            <a:endParaRPr lang="en-US" sz="1400" dirty="0">
-              <a:latin typeface="Aptos" panose="020B0004020202020204" pitchFamily="34" charset="0"/>
-            </a:endParaRPr>
-          </a:p>
+              <a:rPr lang="en-GB" sz="4000" dirty="0">
+                <a:latin typeface="Aptos" panose="020B0004020202020204" pitchFamily="34" charset="0"/>
+              </a:rPr>
+              <a:t>Open research challenges</a:t>
+            </a:r>
+          </a:p>
+        </p:txBody>
+      </p:sp>
+      <p:sp>
+        <p:nvSpPr>
+          <p:cNvPr id="3" name="Segnaposto contenuto 2">
+            <a:extLst>
+              <a:ext uri="{FF2B5EF4-FFF2-40B4-BE49-F238E27FC236}">
+                <a16:creationId xmlns:a16="http://schemas.microsoft.com/office/drawing/2014/main" id="{EFB312F5-F3FA-6418-1A1A-047A96AD87C1}"/>
+              </a:ext>
+            </a:extLst>
+          </p:cNvPr>
+          <p:cNvSpPr>
+            <a:spLocks noGrp="1"/>
+          </p:cNvSpPr>
+          <p:nvPr>
+            <p:ph idx="1"/>
+          </p:nvPr>
+        </p:nvSpPr>
+        <p:spPr/>
+        <p:txBody>
+          <a:bodyPr>
+            <a:normAutofit/>
+          </a:bodyPr>
+          <a:lstStyle/>
           <a:p>
             <a:pPr>
               <a:spcBef>
                 <a:spcPts val="0"/>
               </a:spcBef>
+              <a:spcAft>
+                <a:spcPts val="1200"/>
+              </a:spcAft>
             </a:pPr>
             <a:r>
-              <a:rPr lang="en-US" sz="2200" b="1" dirty="0">
-                <a:latin typeface="Aptos" panose="020B0004020202020204" pitchFamily="34" charset="0"/>
-              </a:rPr>
-              <a:t>Active Maintenance</a:t>
-            </a:r>
-            <a:r>
-              <a:rPr lang="en-US" sz="2200" dirty="0">
-                <a:latin typeface="Aptos" panose="020B0004020202020204" pitchFamily="34" charset="0"/>
-              </a:rPr>
-              <a:t>: </a:t>
-            </a:r>
-          </a:p>
-          <a:p>
-            <a:pPr lvl="1">
-              <a:buFont typeface="Courier New" panose="02070309020205020404" pitchFamily="49" charset="0"/>
-              <a:buChar char="o"/>
+              <a:rPr lang="en-GB" sz="2400" b="1" dirty="0">
+                <a:latin typeface="Aptos" panose="020B0004020202020204" pitchFamily="34" charset="0"/>
+              </a:rPr>
+              <a:t>Heterogeneity</a:t>
+            </a:r>
+            <a:r>
+              <a:rPr lang="en-GB" sz="2400" dirty="0">
+                <a:latin typeface="Aptos" panose="020B0004020202020204" pitchFamily="34" charset="0"/>
+              </a:rPr>
+              <a:t>: Need for standardized programming models for diverse devices.</a:t>
+            </a:r>
+          </a:p>
+          <a:p>
+            <a:pPr>
+              <a:spcBef>
+                <a:spcPts val="0"/>
+              </a:spcBef>
+              <a:spcAft>
+                <a:spcPts val="1200"/>
+              </a:spcAft>
             </a:pPr>
             <a:r>
-              <a:rPr lang="en-US" sz="2200" dirty="0">
-                <a:latin typeface="Aptos" panose="020B0004020202020204" pitchFamily="34" charset="0"/>
-              </a:rPr>
-              <a:t>Enhanced responsiveness through localized processing.</a:t>
-            </a:r>
-          </a:p>
-          <a:p>
-            <a:pPr lvl="1">
+              <a:rPr lang="en-GB" sz="2400" b="1" dirty="0">
+                <a:latin typeface="Aptos" panose="020B0004020202020204" pitchFamily="34" charset="0"/>
+              </a:rPr>
+              <a:t>Resource Management</a:t>
+            </a:r>
+            <a:r>
+              <a:rPr lang="en-GB" sz="2400" dirty="0">
+                <a:latin typeface="Aptos" panose="020B0004020202020204" pitchFamily="34" charset="0"/>
+              </a:rPr>
+              <a:t>: Efficient allocation in dynamic, constrained environments.</a:t>
+            </a:r>
+          </a:p>
+          <a:p>
+            <a:pPr>
+              <a:spcBef>
+                <a:spcPts val="0"/>
+              </a:spcBef>
               <a:spcAft>
-                <a:spcPts val="500"/>
+                <a:spcPts val="1200"/>
               </a:spcAft>
-              <a:buFont typeface="Courier New" panose="02070309020205020404" pitchFamily="49" charset="0"/>
-              <a:buChar char="o"/>
             </a:pPr>
             <a:r>
-              <a:rPr lang="en-US" sz="2200" dirty="0">
-                <a:latin typeface="Aptos" panose="020B0004020202020204" pitchFamily="34" charset="0"/>
-              </a:rPr>
-              <a:t>Case study on candy packaging line showed a 60% reduction in network traffic (from 16-17 Mb/s to 5-6 Mb/s) with improved order handling efficiency.</a:t>
-            </a:r>
-          </a:p>
-          <a:p>
-            <a:r>
-              <a:rPr lang="en-US" sz="2200" b="1" dirty="0">
-                <a:latin typeface="Aptos" panose="020B0004020202020204" pitchFamily="34" charset="0"/>
-              </a:rPr>
-              <a:t>Cloud-Edge Cooperation:</a:t>
-            </a:r>
-          </a:p>
-          <a:p>
-            <a:pPr lvl="1">
-              <a:buFont typeface="Courier New" panose="02070309020205020404" pitchFamily="49" charset="0"/>
-              <a:buChar char="o"/>
+              <a:rPr lang="en-GB" sz="2400" b="1" dirty="0">
+                <a:latin typeface="Aptos" panose="020B0004020202020204" pitchFamily="34" charset="0"/>
+              </a:rPr>
+              <a:t>Security &amp; Privacy</a:t>
+            </a:r>
+            <a:r>
+              <a:rPr lang="en-GB" sz="2400" dirty="0">
+                <a:latin typeface="Aptos" panose="020B0004020202020204" pitchFamily="34" charset="0"/>
+              </a:rPr>
+              <a:t>: Safeguarding sensitive data against evolving threats.</a:t>
+            </a:r>
+          </a:p>
+          <a:p>
+            <a:pPr>
+              <a:spcBef>
+                <a:spcPts val="0"/>
+              </a:spcBef>
+              <a:spcAft>
+                <a:spcPts val="1200"/>
+              </a:spcAft>
             </a:pPr>
             <a:r>
-              <a:rPr lang="en-US" sz="2200" dirty="0">
-                <a:latin typeface="Aptos" panose="020B0004020202020204" pitchFamily="34" charset="0"/>
-              </a:rPr>
-              <a:t>Cloud layers handle long-term data analysis, maintenance planning, and knowledge mining.</a:t>
-            </a:r>
-          </a:p>
-          <a:p>
-            <a:pPr lvl="1">
-              <a:buFont typeface="Courier New" panose="02070309020205020404" pitchFamily="49" charset="0"/>
-              <a:buChar char="o"/>
+              <a:rPr lang="en-GB" sz="2400" b="1" dirty="0">
+                <a:latin typeface="Aptos" panose="020B0004020202020204" pitchFamily="34" charset="0"/>
+              </a:rPr>
+              <a:t>Data Handling</a:t>
+            </a:r>
+            <a:r>
+              <a:rPr lang="en-GB" sz="2400" dirty="0">
+                <a:latin typeface="Aptos" panose="020B0004020202020204" pitchFamily="34" charset="0"/>
+              </a:rPr>
+              <a:t>: Efficient preprocessing of large IoT data volumes.</a:t>
+            </a:r>
+          </a:p>
+          <a:p>
+            <a:pPr>
+              <a:spcBef>
+                <a:spcPts val="0"/>
+              </a:spcBef>
+              <a:spcAft>
+                <a:spcPts val="1200"/>
+              </a:spcAft>
             </a:pPr>
             <a:r>
-              <a:rPr lang="en-US" sz="2200" dirty="0">
-                <a:latin typeface="Aptos" panose="020B0004020202020204" pitchFamily="34" charset="0"/>
-              </a:rPr>
-              <a:t>Edge layers focus on real-time processing, security, and immediate business logic execution.</a:t>
+              <a:rPr lang="en-GB" sz="2400" b="1" dirty="0">
+                <a:latin typeface="Aptos" panose="020B0004020202020204" pitchFamily="34" charset="0"/>
+              </a:rPr>
+              <a:t>System Reliability</a:t>
+            </a:r>
+            <a:r>
+              <a:rPr lang="en-GB" sz="2400" dirty="0">
+                <a:latin typeface="Aptos" panose="020B0004020202020204" pitchFamily="34" charset="0"/>
+              </a:rPr>
+              <a:t>: Ensuring consistent and scalable service delivery.</a:t>
             </a:r>
           </a:p>
         </p:txBody>
@@ -2507,7 +2515,7 @@
           <p:cNvPr id="4" name="Segnaposto numero diapositiva 3">
             <a:extLst>
               <a:ext uri="{FF2B5EF4-FFF2-40B4-BE49-F238E27FC236}">
-                <a16:creationId xmlns:a16="http://schemas.microsoft.com/office/drawing/2014/main" id="{F635F4B9-8804-713C-2351-DDD3E3E65414}"/>
+                <a16:creationId xmlns:a16="http://schemas.microsoft.com/office/drawing/2014/main" id="{DF3CA20F-B7C9-BDD3-32A8-A152F5421B97}"/>
               </a:ext>
             </a:extLst>
           </p:cNvPr>
@@ -2534,7 +2542,7 @@
               <a:rPr lang="en-US" dirty="0">
                 <a:latin typeface="Aptos" panose="020B0004020202020204" pitchFamily="34" charset="0"/>
               </a:rPr>
-              <a:t> of 15</a:t>
+              <a:t> of 13</a:t>
             </a:r>
           </a:p>
         </p:txBody>
@@ -2542,7 +2550,7 @@
     </p:spTree>
     <p:extLst>
       <p:ext uri="{BB962C8B-B14F-4D97-AF65-F5344CB8AC3E}">
-        <p14:creationId xmlns:p14="http://schemas.microsoft.com/office/powerpoint/2010/main" val="603930834"/>
+        <p14:creationId xmlns:p14="http://schemas.microsoft.com/office/powerpoint/2010/main" val="2873740538"/>
       </p:ext>
     </p:extLst>
   </p:cSld>
@@ -2574,464 +2582,6 @@
           <p:cNvPr id="2" name="Titolo 1">
             <a:extLst>
               <a:ext uri="{FF2B5EF4-FFF2-40B4-BE49-F238E27FC236}">
-                <a16:creationId xmlns:a16="http://schemas.microsoft.com/office/drawing/2014/main" id="{2980EA28-02EE-F6D2-E793-887462C9F947}"/>
-              </a:ext>
-            </a:extLst>
-          </p:cNvPr>
-          <p:cNvSpPr>
-            <a:spLocks noGrp="1"/>
-          </p:cNvSpPr>
-          <p:nvPr>
-            <p:ph type="title"/>
-          </p:nvPr>
-        </p:nvSpPr>
-        <p:spPr/>
-        <p:txBody>
-          <a:bodyPr>
-            <a:noAutofit/>
-          </a:bodyPr>
-          <a:lstStyle/>
-          <a:p>
-            <a:r>
-              <a:rPr lang="en-GB" sz="3200" dirty="0">
-                <a:latin typeface="Aptos" panose="020B0004020202020204" pitchFamily="34" charset="0"/>
-              </a:rPr>
-              <a:t>A study on industrial manufacturing</a:t>
-            </a:r>
-            <a:endParaRPr lang="en-GB" sz="3200" dirty="0"/>
-          </a:p>
-        </p:txBody>
-      </p:sp>
-      <p:sp>
-        <p:nvSpPr>
-          <p:cNvPr id="3" name="Segnaposto contenuto 2">
-            <a:extLst>
-              <a:ext uri="{FF2B5EF4-FFF2-40B4-BE49-F238E27FC236}">
-                <a16:creationId xmlns:a16="http://schemas.microsoft.com/office/drawing/2014/main" id="{AD97894B-F558-F503-F923-9630FE58119A}"/>
-              </a:ext>
-            </a:extLst>
-          </p:cNvPr>
-          <p:cNvSpPr>
-            <a:spLocks noGrp="1"/>
-          </p:cNvSpPr>
-          <p:nvPr>
-            <p:ph idx="1"/>
-          </p:nvPr>
-        </p:nvSpPr>
-        <p:spPr/>
-        <p:txBody>
-          <a:bodyPr>
-            <a:normAutofit/>
-          </a:bodyPr>
-          <a:lstStyle/>
-          <a:p>
-            <a:r>
-              <a:rPr lang="en-US" sz="2200" b="1" dirty="0">
-                <a:latin typeface="Aptos" panose="020B0004020202020204" pitchFamily="34" charset="0"/>
-              </a:rPr>
-              <a:t>Implementation Challenges</a:t>
-            </a:r>
-            <a:r>
-              <a:rPr lang="en-US" sz="2200" dirty="0">
-                <a:latin typeface="Aptos" panose="020B0004020202020204" pitchFamily="34" charset="0"/>
-              </a:rPr>
-              <a:t>:</a:t>
-            </a:r>
-          </a:p>
-          <a:p>
-            <a:pPr lvl="1">
-              <a:buFont typeface="Courier New" panose="02070309020205020404" pitchFamily="49" charset="0"/>
-              <a:buChar char="o"/>
-            </a:pPr>
-            <a:r>
-              <a:rPr lang="en-US" sz="2200" dirty="0">
-                <a:latin typeface="Aptos" panose="020B0004020202020204" pitchFamily="34" charset="0"/>
-              </a:rPr>
-              <a:t>Protocol compatibility across legacy and modern systems.</a:t>
-            </a:r>
-          </a:p>
-          <a:p>
-            <a:pPr lvl="1">
-              <a:buFont typeface="Courier New" panose="02070309020205020404" pitchFamily="49" charset="0"/>
-              <a:buChar char="o"/>
-            </a:pPr>
-            <a:r>
-              <a:rPr lang="en-US" sz="2200" dirty="0">
-                <a:latin typeface="Aptos" panose="020B0004020202020204" pitchFamily="34" charset="0"/>
-              </a:rPr>
-              <a:t>Real-time processing for time-sensitive manufacturing tasks.</a:t>
-            </a:r>
-          </a:p>
-          <a:p>
-            <a:pPr marL="0" indent="0">
-              <a:buNone/>
-            </a:pPr>
-            <a:endParaRPr lang="en-US" sz="1000" dirty="0">
-              <a:latin typeface="Aptos" panose="020B0004020202020204" pitchFamily="34" charset="0"/>
-            </a:endParaRPr>
-          </a:p>
-          <a:p>
-            <a:pPr>
-              <a:spcBef>
-                <a:spcPts val="0"/>
-              </a:spcBef>
-            </a:pPr>
-            <a:r>
-              <a:rPr lang="en-US" sz="2200" b="1" dirty="0">
-                <a:latin typeface="Aptos" panose="020B0004020202020204" pitchFamily="34" charset="0"/>
-              </a:rPr>
-              <a:t>Future Directions</a:t>
-            </a:r>
-            <a:r>
-              <a:rPr lang="en-US" sz="2200" dirty="0">
-                <a:latin typeface="Aptos" panose="020B0004020202020204" pitchFamily="34" charset="0"/>
-              </a:rPr>
-              <a:t>:</a:t>
-            </a:r>
-          </a:p>
-          <a:p>
-            <a:pPr lvl="1">
-              <a:buFont typeface="Courier New" panose="02070309020205020404" pitchFamily="49" charset="0"/>
-              <a:buChar char="o"/>
-            </a:pPr>
-            <a:r>
-              <a:rPr lang="en-US" sz="2200" dirty="0">
-                <a:latin typeface="Aptos" panose="020B0004020202020204" pitchFamily="34" charset="0"/>
-              </a:rPr>
-              <a:t>Evolution of digital twins for manufacturing optimization.</a:t>
-            </a:r>
-          </a:p>
-          <a:p>
-            <a:pPr lvl="1">
-              <a:buFont typeface="Courier New" panose="02070309020205020404" pitchFamily="49" charset="0"/>
-              <a:buChar char="o"/>
-            </a:pPr>
-            <a:r>
-              <a:rPr lang="en-US" sz="2200" dirty="0">
-                <a:latin typeface="Aptos" panose="020B0004020202020204" pitchFamily="34" charset="0"/>
-              </a:rPr>
-              <a:t>Enhanced autonomous systems for process management.</a:t>
-            </a:r>
-          </a:p>
-          <a:p>
-            <a:pPr lvl="1">
-              <a:buFont typeface="Courier New" panose="02070309020205020404" pitchFamily="49" charset="0"/>
-              <a:buChar char="o"/>
-            </a:pPr>
-            <a:r>
-              <a:rPr lang="en-US" sz="2200" dirty="0">
-                <a:latin typeface="Aptos" panose="020B0004020202020204" pitchFamily="34" charset="0"/>
-              </a:rPr>
-              <a:t>Continued development in network optimization for seamless edge-cloud integration.</a:t>
-            </a:r>
-          </a:p>
-        </p:txBody>
-      </p:sp>
-      <p:sp>
-        <p:nvSpPr>
-          <p:cNvPr id="4" name="Segnaposto numero diapositiva 3">
-            <a:extLst>
-              <a:ext uri="{FF2B5EF4-FFF2-40B4-BE49-F238E27FC236}">
-                <a16:creationId xmlns:a16="http://schemas.microsoft.com/office/drawing/2014/main" id="{686C7AC6-3E22-BAA5-F0D8-536507D50E13}"/>
-              </a:ext>
-            </a:extLst>
-          </p:cNvPr>
-          <p:cNvSpPr>
-            <a:spLocks noGrp="1"/>
-          </p:cNvSpPr>
-          <p:nvPr>
-            <p:ph type="sldNum" sz="quarter" idx="4"/>
-          </p:nvPr>
-        </p:nvSpPr>
-        <p:spPr/>
-        <p:txBody>
-          <a:bodyPr/>
-          <a:lstStyle/>
-          <a:p>
-            <a:fld id="{4D021CEB-2F22-4EA1-9BAF-E3833982B82A}" type="slidenum">
-              <a:rPr lang="en-US" smtClean="0">
-                <a:latin typeface="Aptos" panose="020B0004020202020204" pitchFamily="34" charset="0"/>
-              </a:rPr>
-              <a:pPr/>
-              <a:t>13</a:t>
-            </a:fld>
-            <a:r>
-              <a:rPr lang="en-US" dirty="0">
-                <a:latin typeface="Aptos" panose="020B0004020202020204" pitchFamily="34" charset="0"/>
-              </a:rPr>
-              <a:t> of 15</a:t>
-            </a:r>
-          </a:p>
-        </p:txBody>
-      </p:sp>
-    </p:spTree>
-    <p:extLst>
-      <p:ext uri="{BB962C8B-B14F-4D97-AF65-F5344CB8AC3E}">
-        <p14:creationId xmlns:p14="http://schemas.microsoft.com/office/powerpoint/2010/main" val="1581828518"/>
-      </p:ext>
-    </p:extLst>
-  </p:cSld>
-  <p:clrMapOvr>
-    <a:masterClrMapping/>
-  </p:clrMapOvr>
-</p:sld>
-</file>
-
-<file path=ppt/slides/slide14.xml><?xml version="1.0" encoding="utf-8"?>
-<p:sld xmlns:a="http://schemas.openxmlformats.org/drawingml/2006/main" xmlns:r="http://schemas.openxmlformats.org/officeDocument/2006/relationships" xmlns:p="http://schemas.openxmlformats.org/presentationml/2006/main">
-  <p:cSld>
-    <p:spTree>
-      <p:nvGrpSpPr>
-        <p:cNvPr id="1" name=""/>
-        <p:cNvGrpSpPr/>
-        <p:nvPr/>
-      </p:nvGrpSpPr>
-      <p:grpSpPr>
-        <a:xfrm>
-          <a:off x="0" y="0"/>
-          <a:ext cx="0" cy="0"/>
-          <a:chOff x="0" y="0"/>
-          <a:chExt cx="0" cy="0"/>
-        </a:xfrm>
-      </p:grpSpPr>
-      <p:sp>
-        <p:nvSpPr>
-          <p:cNvPr id="2" name="Titolo 1">
-            <a:extLst>
-              <a:ext uri="{FF2B5EF4-FFF2-40B4-BE49-F238E27FC236}">
-                <a16:creationId xmlns:a16="http://schemas.microsoft.com/office/drawing/2014/main" id="{23467997-24D6-9219-4C34-5DD0FF2F2F1C}"/>
-              </a:ext>
-            </a:extLst>
-          </p:cNvPr>
-          <p:cNvSpPr>
-            <a:spLocks noGrp="1"/>
-          </p:cNvSpPr>
-          <p:nvPr>
-            <p:ph type="title"/>
-          </p:nvPr>
-        </p:nvSpPr>
-        <p:spPr/>
-        <p:txBody>
-          <a:bodyPr>
-            <a:normAutofit/>
-          </a:bodyPr>
-          <a:lstStyle/>
-          <a:p>
-            <a:r>
-              <a:rPr lang="en-GB" sz="4000" dirty="0">
-                <a:latin typeface="Aptos" panose="020B0004020202020204" pitchFamily="34" charset="0"/>
-              </a:rPr>
-              <a:t>Open research challenges</a:t>
-            </a:r>
-          </a:p>
-        </p:txBody>
-      </p:sp>
-      <p:sp>
-        <p:nvSpPr>
-          <p:cNvPr id="3" name="Segnaposto contenuto 2">
-            <a:extLst>
-              <a:ext uri="{FF2B5EF4-FFF2-40B4-BE49-F238E27FC236}">
-                <a16:creationId xmlns:a16="http://schemas.microsoft.com/office/drawing/2014/main" id="{EFB312F5-F3FA-6418-1A1A-047A96AD87C1}"/>
-              </a:ext>
-            </a:extLst>
-          </p:cNvPr>
-          <p:cNvSpPr>
-            <a:spLocks noGrp="1"/>
-          </p:cNvSpPr>
-          <p:nvPr>
-            <p:ph idx="1"/>
-          </p:nvPr>
-        </p:nvSpPr>
-        <p:spPr/>
-        <p:txBody>
-          <a:bodyPr>
-            <a:normAutofit/>
-          </a:bodyPr>
-          <a:lstStyle/>
-          <a:p>
-            <a:pPr>
-              <a:spcBef>
-                <a:spcPts val="0"/>
-              </a:spcBef>
-              <a:spcAft>
-                <a:spcPts val="1200"/>
-              </a:spcAft>
-            </a:pPr>
-            <a:r>
-              <a:rPr lang="en-GB" sz="2400" b="1" dirty="0">
-                <a:latin typeface="Aptos" panose="020B0004020202020204" pitchFamily="34" charset="0"/>
-              </a:rPr>
-              <a:t>Heterogeneity</a:t>
-            </a:r>
-            <a:r>
-              <a:rPr lang="en-GB" sz="2400" dirty="0">
-                <a:latin typeface="Aptos" panose="020B0004020202020204" pitchFamily="34" charset="0"/>
-              </a:rPr>
-              <a:t>: Need for standardized programming models for diverse devices.</a:t>
-            </a:r>
-          </a:p>
-          <a:p>
-            <a:pPr>
-              <a:spcBef>
-                <a:spcPts val="0"/>
-              </a:spcBef>
-              <a:spcAft>
-                <a:spcPts val="1200"/>
-              </a:spcAft>
-            </a:pPr>
-            <a:r>
-              <a:rPr lang="en-GB" sz="2400" b="1" dirty="0">
-                <a:latin typeface="Aptos" panose="020B0004020202020204" pitchFamily="34" charset="0"/>
-              </a:rPr>
-              <a:t>Resource Management</a:t>
-            </a:r>
-            <a:r>
-              <a:rPr lang="en-GB" sz="2400" dirty="0">
-                <a:latin typeface="Aptos" panose="020B0004020202020204" pitchFamily="34" charset="0"/>
-              </a:rPr>
-              <a:t>: Efficient allocation in dynamic, constrained environments.</a:t>
-            </a:r>
-          </a:p>
-          <a:p>
-            <a:pPr>
-              <a:spcBef>
-                <a:spcPts val="0"/>
-              </a:spcBef>
-              <a:spcAft>
-                <a:spcPts val="1200"/>
-              </a:spcAft>
-            </a:pPr>
-            <a:r>
-              <a:rPr lang="en-GB" sz="2400" b="1" dirty="0">
-                <a:latin typeface="Aptos" panose="020B0004020202020204" pitchFamily="34" charset="0"/>
-              </a:rPr>
-              <a:t>Security &amp; Privacy</a:t>
-            </a:r>
-            <a:r>
-              <a:rPr lang="en-GB" sz="2400" dirty="0">
-                <a:latin typeface="Aptos" panose="020B0004020202020204" pitchFamily="34" charset="0"/>
-              </a:rPr>
-              <a:t>: Safeguarding sensitive data against evolving threats.</a:t>
-            </a:r>
-          </a:p>
-          <a:p>
-            <a:pPr>
-              <a:spcBef>
-                <a:spcPts val="0"/>
-              </a:spcBef>
-              <a:spcAft>
-                <a:spcPts val="1200"/>
-              </a:spcAft>
-            </a:pPr>
-            <a:r>
-              <a:rPr lang="en-GB" sz="2400" b="1" dirty="0">
-                <a:latin typeface="Aptos" panose="020B0004020202020204" pitchFamily="34" charset="0"/>
-              </a:rPr>
-              <a:t>Data Handling</a:t>
-            </a:r>
-            <a:r>
-              <a:rPr lang="en-GB" sz="2400" dirty="0">
-                <a:latin typeface="Aptos" panose="020B0004020202020204" pitchFamily="34" charset="0"/>
-              </a:rPr>
-              <a:t>: Efficient preprocessing of large IoT data volumes.</a:t>
-            </a:r>
-          </a:p>
-          <a:p>
-            <a:pPr>
-              <a:spcBef>
-                <a:spcPts val="0"/>
-              </a:spcBef>
-              <a:spcAft>
-                <a:spcPts val="1200"/>
-              </a:spcAft>
-            </a:pPr>
-            <a:r>
-              <a:rPr lang="en-GB" sz="2400" b="1" dirty="0">
-                <a:latin typeface="Aptos" panose="020B0004020202020204" pitchFamily="34" charset="0"/>
-              </a:rPr>
-              <a:t>System Reliability</a:t>
-            </a:r>
-            <a:r>
-              <a:rPr lang="en-GB" sz="2400" dirty="0">
-                <a:latin typeface="Aptos" panose="020B0004020202020204" pitchFamily="34" charset="0"/>
-              </a:rPr>
-              <a:t>: Ensuring consistent and scalable service delivery.</a:t>
-            </a:r>
-          </a:p>
-        </p:txBody>
-      </p:sp>
-      <p:sp>
-        <p:nvSpPr>
-          <p:cNvPr id="4" name="Segnaposto numero diapositiva 3">
-            <a:extLst>
-              <a:ext uri="{FF2B5EF4-FFF2-40B4-BE49-F238E27FC236}">
-                <a16:creationId xmlns:a16="http://schemas.microsoft.com/office/drawing/2014/main" id="{DF3CA20F-B7C9-BDD3-32A8-A152F5421B97}"/>
-              </a:ext>
-            </a:extLst>
-          </p:cNvPr>
-          <p:cNvSpPr>
-            <a:spLocks noGrp="1"/>
-          </p:cNvSpPr>
-          <p:nvPr>
-            <p:ph type="sldNum" sz="quarter" idx="4"/>
-          </p:nvPr>
-        </p:nvSpPr>
-        <p:spPr/>
-        <p:txBody>
-          <a:bodyPr/>
-          <a:lstStyle/>
-          <a:p>
-            <a:fld id="{4D021CEB-2F22-4EA1-9BAF-E3833982B82A}" type="slidenum">
-              <a:rPr lang="en-US" smtClean="0">
-                <a:latin typeface="Aptos" panose="020B0004020202020204" pitchFamily="34" charset="0"/>
-              </a:rPr>
-              <a:pPr/>
-              <a:t>14</a:t>
-            </a:fld>
-            <a:r>
-              <a:rPr lang="en-US" dirty="0">
-                <a:latin typeface="Aptos" panose="020B0004020202020204" pitchFamily="34" charset="0"/>
-              </a:rPr>
-              <a:t> of 15</a:t>
-            </a:r>
-          </a:p>
-        </p:txBody>
-      </p:sp>
-    </p:spTree>
-    <p:extLst>
-      <p:ext uri="{BB962C8B-B14F-4D97-AF65-F5344CB8AC3E}">
-        <p14:creationId xmlns:p14="http://schemas.microsoft.com/office/powerpoint/2010/main" val="2873740538"/>
-      </p:ext>
-    </p:extLst>
-  </p:cSld>
-  <p:clrMapOvr>
-    <a:masterClrMapping/>
-  </p:clrMapOvr>
-</p:sld>
-</file>
-
-<file path=ppt/slides/slide15.xml><?xml version="1.0" encoding="utf-8"?>
-<p:sld xmlns:a="http://schemas.openxmlformats.org/drawingml/2006/main" xmlns:r="http://schemas.openxmlformats.org/officeDocument/2006/relationships" xmlns:p="http://schemas.openxmlformats.org/presentationml/2006/main">
-  <p:cSld>
-    <p:spTree>
-      <p:nvGrpSpPr>
-        <p:cNvPr id="1" name=""/>
-        <p:cNvGrpSpPr/>
-        <p:nvPr/>
-      </p:nvGrpSpPr>
-      <p:grpSpPr>
-        <a:xfrm>
-          <a:off x="0" y="0"/>
-          <a:ext cx="0" cy="0"/>
-          <a:chOff x="0" y="0"/>
-          <a:chExt cx="0" cy="0"/>
-        </a:xfrm>
-      </p:grpSpPr>
-      <p:sp>
-        <p:nvSpPr>
-          <p:cNvPr id="2" name="Titolo 1">
-            <a:extLst>
-              <a:ext uri="{FF2B5EF4-FFF2-40B4-BE49-F238E27FC236}">
                 <a16:creationId xmlns:a16="http://schemas.microsoft.com/office/drawing/2014/main" id="{0A6750C6-4999-0C92-A764-27A4B6F7236C}"/>
               </a:ext>
             </a:extLst>
@@ -3313,13 +2863,13 @@
                 <a:latin typeface="Aptos" panose="020B0004020202020204" pitchFamily="34" charset="0"/>
               </a:rPr>
               <a:pPr/>
-              <a:t>15</a:t>
+              <a:t>13</a:t>
             </a:fld>
             <a:r>
               <a:rPr lang="en-US" dirty="0">
                 <a:latin typeface="Aptos" panose="020B0004020202020204" pitchFamily="34" charset="0"/>
               </a:rPr>
-              <a:t> of 15</a:t>
+              <a:t> of 13</a:t>
             </a:r>
           </a:p>
         </p:txBody>
@@ -3417,7 +2967,7 @@
               <a:rPr lang="en-US" sz="2600" dirty="0">
                 <a:latin typeface="Aptos" panose="020B0004020202020204" pitchFamily="34" charset="0"/>
               </a:rPr>
-              <a:t>Internet of Things</a:t>
+              <a:t>IoT data flow</a:t>
             </a:r>
           </a:p>
           <a:p>
@@ -3453,7 +3003,34 @@
               <a:rPr lang="en-US" sz="2600" dirty="0">
                 <a:latin typeface="Aptos" panose="020B0004020202020204" pitchFamily="34" charset="0"/>
               </a:rPr>
-              <a:t>Computing paradigms</a:t>
+              <a:t>Case studies </a:t>
+            </a:r>
+          </a:p>
+          <a:p>
+            <a:pPr lvl="1"/>
+            <a:r>
+              <a:rPr lang="en-US" sz="2600" dirty="0">
+                <a:latin typeface="Aptos" panose="020B0004020202020204" pitchFamily="34" charset="0"/>
+              </a:rPr>
+              <a:t>Mobile Edge Computing (MEC)</a:t>
+            </a:r>
+          </a:p>
+          <a:p>
+            <a:pPr lvl="1"/>
+            <a:r>
+              <a:rPr lang="en-US" sz="2600" dirty="0">
+                <a:latin typeface="Aptos" panose="020B0004020202020204" pitchFamily="34" charset="0"/>
+              </a:rPr>
+              <a:t>Mobile Gaming </a:t>
+            </a:r>
+          </a:p>
+          <a:p>
+            <a:pPr lvl="1"/>
+            <a:r>
+              <a:rPr lang="en-US" sz="2600" dirty="0">
+                <a:latin typeface="Aptos" panose="020B0004020202020204" pitchFamily="34" charset="0"/>
+              </a:rPr>
+              <a:t>Industrial Manufacturing</a:t>
             </a:r>
           </a:p>
           <a:p>
@@ -3465,45 +3042,6 @@
               <a:rPr lang="en-US" sz="2600" dirty="0">
                 <a:latin typeface="Aptos" panose="020B0004020202020204" pitchFamily="34" charset="0"/>
               </a:rPr>
-              <a:t>Case studies </a:t>
-            </a:r>
-          </a:p>
-          <a:p>
-            <a:pPr lvl="1"/>
-            <a:r>
-              <a:rPr lang="en-US" sz="2600" dirty="0">
-                <a:latin typeface="Aptos" panose="020B0004020202020204" pitchFamily="34" charset="0"/>
-              </a:rPr>
-              <a:t>Mobile Edge Computing (MEC)</a:t>
-            </a:r>
-          </a:p>
-          <a:p>
-            <a:pPr lvl="1"/>
-            <a:r>
-              <a:rPr lang="en-US" sz="2600" dirty="0">
-                <a:latin typeface="Aptos" panose="020B0004020202020204" pitchFamily="34" charset="0"/>
-              </a:rPr>
-              <a:t>Mobile Gaming </a:t>
-            </a:r>
-          </a:p>
-          <a:p>
-            <a:pPr lvl="1"/>
-            <a:r>
-              <a:rPr lang="en-US" sz="2600" dirty="0">
-                <a:latin typeface="Aptos" panose="020B0004020202020204" pitchFamily="34" charset="0"/>
-              </a:rPr>
-              <a:t>Industrial Manufacturing</a:t>
-            </a:r>
-          </a:p>
-          <a:p>
-            <a:pPr marL="514350" indent="-514350">
-              <a:buFont typeface="+mj-lt"/>
-              <a:buAutoNum type="arabicPeriod"/>
-            </a:pPr>
-            <a:r>
-              <a:rPr lang="en-US" sz="2600" dirty="0">
-                <a:latin typeface="Aptos" panose="020B0004020202020204" pitchFamily="34" charset="0"/>
-              </a:rPr>
               <a:t>Open research challenges</a:t>
             </a:r>
           </a:p>
@@ -3541,7 +3079,7 @@
               <a:rPr lang="en-US" dirty="0">
                 <a:latin typeface="Aptos" panose="020B0004020202020204" pitchFamily="34" charset="0"/>
               </a:rPr>
-              <a:t> of 15</a:t>
+              <a:t> of 13</a:t>
             </a:r>
           </a:p>
         </p:txBody>
@@ -3603,7 +3141,7 @@
               <a:rPr lang="en-US" sz="4000" dirty="0">
                 <a:latin typeface="Aptos" panose="020B0004020202020204" pitchFamily="34" charset="0"/>
               </a:rPr>
-              <a:t>Internet of Things</a:t>
+              <a:t>IoT data flow</a:t>
             </a:r>
             <a:endParaRPr lang="en-GB" sz="4000" dirty="0">
               <a:latin typeface="Aptos" panose="020B0004020202020204" pitchFamily="34" charset="0"/>
@@ -3643,58 +3181,38 @@
               <a:rPr lang="en-US" dirty="0">
                 <a:latin typeface="Aptos" panose="020B0004020202020204" pitchFamily="34" charset="0"/>
               </a:rPr>
-              <a:t> of 15</a:t>
+              <a:t> of 13</a:t>
             </a:r>
           </a:p>
         </p:txBody>
       </p:sp>
       <p:pic>
         <p:nvPicPr>
-          <p:cNvPr id="1032" name="Picture 8" descr="IoT and Predictive Analytics: Fog and Edge Computing for Industries versus  Cloud (19.1.2018) - LeanBI">
-            <a:extLst>
-              <a:ext uri="{FF2B5EF4-FFF2-40B4-BE49-F238E27FC236}">
-                <a16:creationId xmlns:a16="http://schemas.microsoft.com/office/drawing/2014/main" id="{D2F44622-F073-C114-9E3F-CCE542B1B12D}"/>
+          <p:cNvPr id="8" name="Segnaposto contenuto 7" descr="Immagine che contiene testo, schermata, diagramma, grafica&#10;&#10;Il contenuto generato dall'IA potrebbe non essere corretto.">
+            <a:extLst>
+              <a:ext uri="{FF2B5EF4-FFF2-40B4-BE49-F238E27FC236}">
+                <a16:creationId xmlns:a16="http://schemas.microsoft.com/office/drawing/2014/main" id="{5803E822-227B-AB84-BE21-7678D170A431}"/>
               </a:ext>
             </a:extLst>
           </p:cNvPr>
           <p:cNvPicPr>
-            <a:picLocks noGrp="1" noChangeAspect="1" noChangeArrowheads="1"/>
+            <a:picLocks noGrp="1" noChangeAspect="1"/>
           </p:cNvPicPr>
           <p:nvPr>
             <p:ph idx="1"/>
           </p:nvPr>
         </p:nvPicPr>
         <p:blipFill>
-          <a:blip r:embed="rId2">
-            <a:extLst>
-              <a:ext uri="{28A0092B-C50C-407E-A947-70E740481C1C}">
-                <a14:useLocalDpi xmlns:a14="http://schemas.microsoft.com/office/drawing/2010/main" val="0"/>
-              </a:ext>
-            </a:extLst>
-          </a:blip>
-          <a:srcRect/>
+          <a:blip r:embed="rId2"/>
           <a:stretch>
             <a:fillRect/>
           </a:stretch>
         </p:blipFill>
-        <p:spPr bwMode="auto">
+        <p:spPr>
           <a:xfrm>
-            <a:off x="352862" y="1320850"/>
-            <a:ext cx="8438275" cy="4216300"/>
+            <a:off x="445602" y="1702961"/>
+            <a:ext cx="8252796" cy="3452077"/>
           </a:xfrm>
-          <a:prstGeom prst="rect">
-            <a:avLst/>
-          </a:prstGeom>
-          <a:noFill/>
-          <a:extLst>
-            <a:ext uri="{909E8E84-426E-40DD-AFC4-6F175D3DCCD1}">
-              <a14:hiddenFill xmlns:a14="http://schemas.microsoft.com/office/drawing/2010/main">
-                <a:solidFill>
-                  <a:srgbClr val="FFFFFF"/>
-                </a:solidFill>
-              </a14:hiddenFill>
-            </a:ext>
-          </a:extLst>
         </p:spPr>
       </p:pic>
     </p:spTree>
@@ -3795,14 +3313,17 @@
               <a:rPr lang="en-US" sz="2400" b="1" dirty="0">
                 <a:latin typeface="Aptos" panose="020B0004020202020204" pitchFamily="34" charset="0"/>
               </a:rPr>
-              <a:t>Network Bandwidth</a:t>
+              <a:t>Communication Latency</a:t>
             </a:r>
             <a:r>
               <a:rPr lang="en-US" sz="2400" dirty="0">
                 <a:latin typeface="Aptos" panose="020B0004020202020204" pitchFamily="34" charset="0"/>
               </a:rPr>
-              <a:t>: Sending large volume of data to centralized cloud servers may lead to network congestion.</a:t>
-            </a:r>
+              <a:t>: The physical distance from the servers introduces substantial processing delays.</a:t>
+            </a:r>
+            <a:endParaRPr lang="en-US" sz="2400" b="1" dirty="0">
+              <a:latin typeface="Aptos" panose="020B0004020202020204" pitchFamily="34" charset="0"/>
+            </a:endParaRPr>
           </a:p>
           <a:p>
             <a:pPr algn="just">
@@ -3817,17 +3338,14 @@
               <a:rPr lang="en-US" sz="2400" b="1" dirty="0">
                 <a:latin typeface="Aptos" panose="020B0004020202020204" pitchFamily="34" charset="0"/>
               </a:rPr>
-              <a:t>Communication Latency</a:t>
+              <a:t>Network Bandwidth</a:t>
             </a:r>
             <a:r>
               <a:rPr lang="en-US" sz="2400" dirty="0">
                 <a:latin typeface="Aptos" panose="020B0004020202020204" pitchFamily="34" charset="0"/>
               </a:rPr>
-              <a:t>: The physical distance from the servers introduces substantial processing delays.</a:t>
-            </a:r>
-            <a:endParaRPr lang="en-US" sz="2400" b="1" dirty="0">
-              <a:latin typeface="Aptos" panose="020B0004020202020204" pitchFamily="34" charset="0"/>
-            </a:endParaRPr>
+              <a:t>: Sending large volume of data to centralized cloud servers may lead to network congestion.</a:t>
+            </a:r>
           </a:p>
           <a:p>
             <a:pPr algn="just">
@@ -3910,7 +3428,7 @@
               <a:rPr lang="en-US" dirty="0">
                 <a:latin typeface="Aptos" panose="020B0004020202020204" pitchFamily="34" charset="0"/>
               </a:rPr>
-              <a:t> of 15</a:t>
+              <a:t> of 13</a:t>
             </a:r>
           </a:p>
         </p:txBody>
@@ -4155,7 +3673,7 @@
               <a:rPr lang="en-US" sz="2000" dirty="0">
                 <a:latin typeface="Aptos" panose="020B0004020202020204" pitchFamily="34" charset="0"/>
               </a:rPr>
-              <a:t>: healthcare, video surveillance, industrial manufacturing, etc.</a:t>
+              <a:t>: healthcare, industrial manufacturing, video surveillance, etc.</a:t>
             </a:r>
           </a:p>
           <a:p>
@@ -4197,7 +3715,7 @@
               <a:rPr lang="en-US" dirty="0">
                 <a:latin typeface="Aptos" panose="020B0004020202020204" pitchFamily="34" charset="0"/>
               </a:rPr>
-              <a:t> of 15</a:t>
+              <a:t> of 13</a:t>
             </a:r>
           </a:p>
         </p:txBody>
@@ -4273,7 +3791,7 @@
           <p:cNvPr id="2" name="Titolo 1">
             <a:extLst>
               <a:ext uri="{FF2B5EF4-FFF2-40B4-BE49-F238E27FC236}">
-                <a16:creationId xmlns:a16="http://schemas.microsoft.com/office/drawing/2014/main" id="{84DB7B71-3E49-A59F-EA57-8E547D677822}"/>
+                <a16:creationId xmlns:a16="http://schemas.microsoft.com/office/drawing/2014/main" id="{FCB36F05-2DB2-EB71-8E5E-742A11CEE5B0}"/>
               </a:ext>
             </a:extLst>
           </p:cNvPr>
@@ -4285,200 +3803,57 @@
           </p:nvPr>
         </p:nvSpPr>
         <p:spPr/>
-        <p:txBody>
-          <a:bodyPr>
-            <a:normAutofit/>
-          </a:bodyPr>
-          <a:lstStyle/>
-          <a:p>
-            <a:r>
-              <a:rPr lang="en-GB" sz="4000" dirty="0">
-                <a:latin typeface="Aptos" panose="020B0004020202020204" pitchFamily="34" charset="0"/>
-              </a:rPr>
-              <a:t>Computing paradigms</a:t>
-            </a:r>
-          </a:p>
-        </p:txBody>
-      </p:sp>
-      <p:sp>
-        <p:nvSpPr>
-          <p:cNvPr id="3" name="Segnaposto contenuto 2">
-            <a:extLst>
-              <a:ext uri="{FF2B5EF4-FFF2-40B4-BE49-F238E27FC236}">
-                <a16:creationId xmlns:a16="http://schemas.microsoft.com/office/drawing/2014/main" id="{8D81842C-9091-6508-DA02-0FE1376D96AB}"/>
-              </a:ext>
-            </a:extLst>
-          </p:cNvPr>
-          <p:cNvSpPr>
-            <a:spLocks noGrp="1"/>
-          </p:cNvSpPr>
-          <p:nvPr>
-            <p:ph idx="1"/>
-          </p:nvPr>
-        </p:nvSpPr>
-        <p:spPr>
-          <a:xfrm>
-            <a:off x="625960" y="1406412"/>
-            <a:ext cx="7886700" cy="4883551"/>
-          </a:xfrm>
-        </p:spPr>
         <p:txBody>
           <a:bodyPr>
             <a:noAutofit/>
           </a:bodyPr>
           <a:lstStyle/>
           <a:p>
-            <a:pPr>
-              <a:spcBef>
-                <a:spcPts val="0"/>
-              </a:spcBef>
-              <a:spcAft>
-                <a:spcPts val="1200"/>
-              </a:spcAft>
-            </a:pPr>
-            <a:r>
-              <a:rPr lang="en-US" sz="2200" b="1" dirty="0">
-                <a:latin typeface="Aptos" panose="020B0004020202020204" pitchFamily="34" charset="0"/>
-              </a:rPr>
-              <a:t>Centralized Cloud Computing</a:t>
-            </a:r>
-            <a:r>
-              <a:rPr lang="en-US" sz="2200" dirty="0">
-                <a:latin typeface="Aptos" panose="020B0004020202020204" pitchFamily="34" charset="0"/>
-              </a:rPr>
-              <a:t>:  Processes all data in remote servers.</a:t>
-            </a:r>
-          </a:p>
-          <a:p>
-            <a:pPr>
-              <a:spcBef>
-                <a:spcPts val="0"/>
-              </a:spcBef>
-              <a:spcAft>
-                <a:spcPts val="1200"/>
-              </a:spcAft>
-            </a:pPr>
-            <a:r>
-              <a:rPr lang="en-US" sz="2200" b="1" dirty="0">
-                <a:latin typeface="Aptos" panose="020B0004020202020204" pitchFamily="34" charset="0"/>
-              </a:rPr>
-              <a:t>Fog Computing</a:t>
-            </a:r>
-            <a:r>
-              <a:rPr lang="en-US" sz="2200" dirty="0">
-                <a:latin typeface="Aptos" panose="020B0004020202020204" pitchFamily="34" charset="0"/>
-              </a:rPr>
-              <a:t>: Localized processing on network devices like routers.</a:t>
-            </a:r>
-            <a:endParaRPr lang="en-US" sz="2200" b="1" dirty="0">
-              <a:latin typeface="Aptos" panose="020B0004020202020204" pitchFamily="34" charset="0"/>
-            </a:endParaRPr>
-          </a:p>
-          <a:p>
-            <a:pPr>
-              <a:spcBef>
-                <a:spcPts val="0"/>
-              </a:spcBef>
-              <a:spcAft>
-                <a:spcPts val="1200"/>
-              </a:spcAft>
-            </a:pPr>
-            <a:r>
-              <a:rPr lang="en-US" sz="2200" b="1" dirty="0">
-                <a:latin typeface="Aptos" panose="020B0004020202020204" pitchFamily="34" charset="0"/>
-              </a:rPr>
-              <a:t>Cloudlet Computing</a:t>
-            </a:r>
-            <a:r>
-              <a:rPr lang="en-US" sz="2200" dirty="0">
-                <a:latin typeface="Aptos" panose="020B0004020202020204" pitchFamily="34" charset="0"/>
-              </a:rPr>
-              <a:t>: Small servers near IoT devices for low-latency tasks.</a:t>
-            </a:r>
-          </a:p>
-          <a:p>
-            <a:pPr>
-              <a:spcBef>
-                <a:spcPts val="0"/>
-              </a:spcBef>
-              <a:spcAft>
-                <a:spcPts val="1200"/>
-              </a:spcAft>
-            </a:pPr>
-            <a:r>
-              <a:rPr lang="en-US" sz="2200" b="1" dirty="0">
-                <a:latin typeface="Aptos" panose="020B0004020202020204" pitchFamily="34" charset="0"/>
-              </a:rPr>
-              <a:t>Mobile Edge Computing (MEC)</a:t>
-            </a:r>
-            <a:r>
-              <a:rPr lang="en-US" sz="2200" dirty="0">
-                <a:latin typeface="Aptos" panose="020B0004020202020204" pitchFamily="34" charset="0"/>
-              </a:rPr>
-              <a:t>: Computing at mobile network edges for real-time responses.</a:t>
-            </a:r>
-            <a:endParaRPr lang="en-US" sz="2200" b="1" dirty="0">
-              <a:latin typeface="Aptos" panose="020B0004020202020204" pitchFamily="34" charset="0"/>
-            </a:endParaRPr>
-          </a:p>
-          <a:p>
-            <a:pPr>
-              <a:spcBef>
-                <a:spcPts val="0"/>
-              </a:spcBef>
-              <a:spcAft>
-                <a:spcPts val="1200"/>
-              </a:spcAft>
-            </a:pPr>
-            <a:r>
-              <a:rPr lang="en-US" sz="2200" b="1" dirty="0">
-                <a:latin typeface="Aptos" panose="020B0004020202020204" pitchFamily="34" charset="0"/>
-              </a:rPr>
-              <a:t>Mobile Ad Hoc Cloud (MAC)</a:t>
-            </a:r>
-            <a:r>
-              <a:rPr lang="en-US" sz="2200" dirty="0">
-                <a:latin typeface="Aptos" panose="020B0004020202020204" pitchFamily="34" charset="0"/>
-              </a:rPr>
-              <a:t>: Dynamic use of nearby mobile devices for processing.</a:t>
-            </a:r>
-            <a:endParaRPr lang="en-US" sz="2200" b="1" dirty="0">
-              <a:latin typeface="Aptos" panose="020B0004020202020204" pitchFamily="34" charset="0"/>
-            </a:endParaRPr>
-          </a:p>
-          <a:p>
-            <a:pPr>
-              <a:spcBef>
-                <a:spcPts val="0"/>
-              </a:spcBef>
-              <a:spcAft>
-                <a:spcPts val="1200"/>
-              </a:spcAft>
-            </a:pPr>
-            <a:r>
-              <a:rPr lang="en-US" sz="2200" b="1" dirty="0">
-                <a:latin typeface="Aptos" panose="020B0004020202020204" pitchFamily="34" charset="0"/>
-              </a:rPr>
-              <a:t>Hybrid Computing</a:t>
-            </a:r>
-            <a:r>
-              <a:rPr lang="en-US" sz="2200" dirty="0">
-                <a:latin typeface="Aptos" panose="020B0004020202020204" pitchFamily="34" charset="0"/>
-              </a:rPr>
-              <a:t>: Combines cloud and edge for balanced performance.</a:t>
-            </a:r>
-            <a:endParaRPr lang="en-GB" sz="2200" dirty="0">
-              <a:latin typeface="Aptos" panose="020B0004020202020204" pitchFamily="34" charset="0"/>
-            </a:endParaRPr>
-          </a:p>
-        </p:txBody>
-      </p:sp>
+            <a:r>
+              <a:rPr lang="en-US" sz="2800" dirty="0">
+                <a:latin typeface="Aptos" panose="020B0004020202020204" pitchFamily="34" charset="0"/>
+              </a:rPr>
+              <a:t>A study on Mobile Edge Computing (MEC)</a:t>
+            </a:r>
+            <a:endParaRPr lang="en-GB" sz="2800" dirty="0"/>
+          </a:p>
+        </p:txBody>
+      </p:sp>
+      <p:pic>
+        <p:nvPicPr>
+          <p:cNvPr id="6" name="Segnaposto contenuto 5">
+            <a:extLst>
+              <a:ext uri="{FF2B5EF4-FFF2-40B4-BE49-F238E27FC236}">
+                <a16:creationId xmlns:a16="http://schemas.microsoft.com/office/drawing/2014/main" id="{F8734891-186A-F4CD-EEE1-5EA4CFF74CA9}"/>
+              </a:ext>
+            </a:extLst>
+          </p:cNvPr>
+          <p:cNvPicPr>
+            <a:picLocks noGrp="1" noChangeAspect="1"/>
+          </p:cNvPicPr>
+          <p:nvPr>
+            <p:ph idx="1"/>
+          </p:nvPr>
+        </p:nvPicPr>
+        <p:blipFill>
+          <a:blip r:embed="rId2"/>
+          <a:stretch>
+            <a:fillRect/>
+          </a:stretch>
+        </p:blipFill>
+        <p:spPr>
+          <a:xfrm>
+            <a:off x="1028396" y="1260475"/>
+            <a:ext cx="7087208" cy="4351338"/>
+          </a:xfrm>
+        </p:spPr>
+      </p:pic>
       <p:sp>
         <p:nvSpPr>
           <p:cNvPr id="4" name="Segnaposto numero diapositiva 3">
             <a:extLst>
               <a:ext uri="{FF2B5EF4-FFF2-40B4-BE49-F238E27FC236}">
-                <a16:creationId xmlns:a16="http://schemas.microsoft.com/office/drawing/2014/main" id="{18C5C538-5146-A10E-05AE-7147107C63E0}"/>
+                <a16:creationId xmlns:a16="http://schemas.microsoft.com/office/drawing/2014/main" id="{E126EE7F-4D83-931A-46E6-BFBFB260AECD}"/>
               </a:ext>
             </a:extLst>
           </p:cNvPr>
@@ -4505,7 +3880,50 @@
               <a:rPr lang="en-US" dirty="0">
                 <a:latin typeface="Aptos" panose="020B0004020202020204" pitchFamily="34" charset="0"/>
               </a:rPr>
-              <a:t> of 15</a:t>
+              <a:t> of 13</a:t>
+            </a:r>
+          </a:p>
+        </p:txBody>
+      </p:sp>
+      <p:sp>
+        <p:nvSpPr>
+          <p:cNvPr id="11" name="CasellaDiTesto 10">
+            <a:extLst>
+              <a:ext uri="{FF2B5EF4-FFF2-40B4-BE49-F238E27FC236}">
+                <a16:creationId xmlns:a16="http://schemas.microsoft.com/office/drawing/2014/main" id="{3A3A0075-1EDF-CD73-E5EC-6C91E068147E}"/>
+              </a:ext>
+            </a:extLst>
+          </p:cNvPr>
+          <p:cNvSpPr txBox="1"/>
+          <p:nvPr/>
+        </p:nvSpPr>
+        <p:spPr>
+          <a:xfrm>
+            <a:off x="2240212" y="5757863"/>
+            <a:ext cx="4663575" cy="369332"/>
+          </a:xfrm>
+          <a:prstGeom prst="rect">
+            <a:avLst/>
+          </a:prstGeom>
+          <a:noFill/>
+        </p:spPr>
+        <p:txBody>
+          <a:bodyPr wrap="square" rtlCol="0">
+            <a:spAutoFit/>
+          </a:bodyPr>
+          <a:lstStyle/>
+          <a:p>
+            <a:r>
+              <a:rPr lang="en-GB" sz="1800" b="0" i="0" u="none" strike="noStrike" baseline="0" dirty="0">
+                <a:latin typeface="Aptos" panose="020B0004020202020204" pitchFamily="34" charset="0"/>
+              </a:rPr>
+              <a:t>Mobility-aware hierarchical MEC framework</a:t>
+            </a:r>
+            <a:r>
+              <a:rPr lang="en-GB" dirty="0">
+                <a:latin typeface="Aptos" panose="020B0004020202020204" pitchFamily="34" charset="0"/>
+              </a:rPr>
+              <a:t> </a:t>
             </a:r>
           </a:p>
         </p:txBody>
@@ -4513,7 +3931,7 @@
     </p:spTree>
     <p:extLst>
       <p:ext uri="{BB962C8B-B14F-4D97-AF65-F5344CB8AC3E}">
-        <p14:creationId xmlns:p14="http://schemas.microsoft.com/office/powerpoint/2010/main" val="4072636620"/>
+        <p14:creationId xmlns:p14="http://schemas.microsoft.com/office/powerpoint/2010/main" val="4004152936"/>
       </p:ext>
     </p:extLst>
   </p:cSld>
@@ -4545,178 +3963,6 @@
           <p:cNvPr id="2" name="Titolo 1">
             <a:extLst>
               <a:ext uri="{FF2B5EF4-FFF2-40B4-BE49-F238E27FC236}">
-                <a16:creationId xmlns:a16="http://schemas.microsoft.com/office/drawing/2014/main" id="{FCB36F05-2DB2-EB71-8E5E-742A11CEE5B0}"/>
-              </a:ext>
-            </a:extLst>
-          </p:cNvPr>
-          <p:cNvSpPr>
-            <a:spLocks noGrp="1"/>
-          </p:cNvSpPr>
-          <p:nvPr>
-            <p:ph type="title"/>
-          </p:nvPr>
-        </p:nvSpPr>
-        <p:spPr/>
-        <p:txBody>
-          <a:bodyPr>
-            <a:noAutofit/>
-          </a:bodyPr>
-          <a:lstStyle/>
-          <a:p>
-            <a:r>
-              <a:rPr lang="en-US" sz="2800" dirty="0">
-                <a:latin typeface="Aptos" panose="020B0004020202020204" pitchFamily="34" charset="0"/>
-              </a:rPr>
-              <a:t>A study on Mobile Edge Computing (MEC)</a:t>
-            </a:r>
-            <a:endParaRPr lang="en-GB" sz="2800" dirty="0"/>
-          </a:p>
-        </p:txBody>
-      </p:sp>
-      <p:pic>
-        <p:nvPicPr>
-          <p:cNvPr id="6" name="Segnaposto contenuto 5">
-            <a:extLst>
-              <a:ext uri="{FF2B5EF4-FFF2-40B4-BE49-F238E27FC236}">
-                <a16:creationId xmlns:a16="http://schemas.microsoft.com/office/drawing/2014/main" id="{F8734891-186A-F4CD-EEE1-5EA4CFF74CA9}"/>
-              </a:ext>
-            </a:extLst>
-          </p:cNvPr>
-          <p:cNvPicPr>
-            <a:picLocks noGrp="1" noChangeAspect="1"/>
-          </p:cNvPicPr>
-          <p:nvPr>
-            <p:ph idx="1"/>
-          </p:nvPr>
-        </p:nvPicPr>
-        <p:blipFill>
-          <a:blip r:embed="rId2"/>
-          <a:stretch>
-            <a:fillRect/>
-          </a:stretch>
-        </p:blipFill>
-        <p:spPr>
-          <a:xfrm>
-            <a:off x="1028396" y="1260475"/>
-            <a:ext cx="7087208" cy="4351338"/>
-          </a:xfrm>
-        </p:spPr>
-      </p:pic>
-      <p:sp>
-        <p:nvSpPr>
-          <p:cNvPr id="4" name="Segnaposto numero diapositiva 3">
-            <a:extLst>
-              <a:ext uri="{FF2B5EF4-FFF2-40B4-BE49-F238E27FC236}">
-                <a16:creationId xmlns:a16="http://schemas.microsoft.com/office/drawing/2014/main" id="{E126EE7F-4D83-931A-46E6-BFBFB260AECD}"/>
-              </a:ext>
-            </a:extLst>
-          </p:cNvPr>
-          <p:cNvSpPr>
-            <a:spLocks noGrp="1"/>
-          </p:cNvSpPr>
-          <p:nvPr>
-            <p:ph type="sldNum" sz="quarter" idx="4"/>
-          </p:nvPr>
-        </p:nvSpPr>
-        <p:spPr/>
-        <p:txBody>
-          <a:bodyPr/>
-          <a:lstStyle/>
-          <a:p>
-            <a:fld id="{4D021CEB-2F22-4EA1-9BAF-E3833982B82A}" type="slidenum">
-              <a:rPr lang="en-US" smtClean="0">
-                <a:latin typeface="Aptos" panose="020B0004020202020204" pitchFamily="34" charset="0"/>
-              </a:rPr>
-              <a:pPr/>
-              <a:t>7</a:t>
-            </a:fld>
-            <a:r>
-              <a:rPr lang="en-US" dirty="0">
-                <a:latin typeface="Aptos" panose="020B0004020202020204" pitchFamily="34" charset="0"/>
-              </a:rPr>
-              <a:t> of 15</a:t>
-            </a:r>
-          </a:p>
-        </p:txBody>
-      </p:sp>
-      <p:sp>
-        <p:nvSpPr>
-          <p:cNvPr id="11" name="CasellaDiTesto 10">
-            <a:extLst>
-              <a:ext uri="{FF2B5EF4-FFF2-40B4-BE49-F238E27FC236}">
-                <a16:creationId xmlns:a16="http://schemas.microsoft.com/office/drawing/2014/main" id="{3A3A0075-1EDF-CD73-E5EC-6C91E068147E}"/>
-              </a:ext>
-            </a:extLst>
-          </p:cNvPr>
-          <p:cNvSpPr txBox="1"/>
-          <p:nvPr/>
-        </p:nvSpPr>
-        <p:spPr>
-          <a:xfrm>
-            <a:off x="2240212" y="5757863"/>
-            <a:ext cx="4663575" cy="369332"/>
-          </a:xfrm>
-          <a:prstGeom prst="rect">
-            <a:avLst/>
-          </a:prstGeom>
-          <a:noFill/>
-        </p:spPr>
-        <p:txBody>
-          <a:bodyPr wrap="square" rtlCol="0">
-            <a:spAutoFit/>
-          </a:bodyPr>
-          <a:lstStyle/>
-          <a:p>
-            <a:r>
-              <a:rPr lang="en-GB" sz="1800" b="0" i="0" u="none" strike="noStrike" baseline="0" dirty="0">
-                <a:latin typeface="Aptos" panose="020B0004020202020204" pitchFamily="34" charset="0"/>
-              </a:rPr>
-              <a:t>Mobility-aware hierarchical MEC framework</a:t>
-            </a:r>
-            <a:r>
-              <a:rPr lang="en-GB" dirty="0">
-                <a:latin typeface="Aptos" panose="020B0004020202020204" pitchFamily="34" charset="0"/>
-              </a:rPr>
-              <a:t> </a:t>
-            </a:r>
-          </a:p>
-        </p:txBody>
-      </p:sp>
-    </p:spTree>
-    <p:extLst>
-      <p:ext uri="{BB962C8B-B14F-4D97-AF65-F5344CB8AC3E}">
-        <p14:creationId xmlns:p14="http://schemas.microsoft.com/office/powerpoint/2010/main" val="4004152936"/>
-      </p:ext>
-    </p:extLst>
-  </p:cSld>
-  <p:clrMapOvr>
-    <a:masterClrMapping/>
-  </p:clrMapOvr>
-</p:sld>
-</file>
-
-<file path=ppt/slides/slide8.xml><?xml version="1.0" encoding="utf-8"?>
-<p:sld xmlns:a="http://schemas.openxmlformats.org/drawingml/2006/main" xmlns:r="http://schemas.openxmlformats.org/officeDocument/2006/relationships" xmlns:p="http://schemas.openxmlformats.org/presentationml/2006/main">
-  <p:cSld>
-    <p:spTree>
-      <p:nvGrpSpPr>
-        <p:cNvPr id="1" name=""/>
-        <p:cNvGrpSpPr/>
-        <p:nvPr/>
-      </p:nvGrpSpPr>
-      <p:grpSpPr>
-        <a:xfrm>
-          <a:off x="0" y="0"/>
-          <a:ext cx="0" cy="0"/>
-          <a:chOff x="0" y="0"/>
-          <a:chExt cx="0" cy="0"/>
-        </a:xfrm>
-      </p:grpSpPr>
-      <p:sp>
-        <p:nvSpPr>
-          <p:cNvPr id="2" name="Titolo 1">
-            <a:extLst>
-              <a:ext uri="{FF2B5EF4-FFF2-40B4-BE49-F238E27FC236}">
                 <a16:creationId xmlns:a16="http://schemas.microsoft.com/office/drawing/2014/main" id="{3C0758D5-AC57-6F31-B599-B481D0B8D023}"/>
               </a:ext>
             </a:extLst>
@@ -4800,13 +4046,13 @@
                 <a:latin typeface="Aptos" panose="020B0004020202020204" pitchFamily="34" charset="0"/>
               </a:rPr>
               <a:pPr/>
-              <a:t>8</a:t>
+              <a:t>7</a:t>
             </a:fld>
             <a:r>
               <a:rPr lang="en-US" dirty="0">
                 <a:latin typeface="Aptos" panose="020B0004020202020204" pitchFamily="34" charset="0"/>
               </a:rPr>
-              <a:t> of 15</a:t>
+              <a:t> of 13</a:t>
             </a:r>
           </a:p>
         </p:txBody>
@@ -5064,7 +4310,7 @@
 </p:sld>
 </file>
 
-<file path=ppt/slides/slide9.xml><?xml version="1.0" encoding="utf-8"?>
+<file path=ppt/slides/slide8.xml><?xml version="1.0" encoding="utf-8"?>
 <p:sld xmlns:a="http://schemas.openxmlformats.org/drawingml/2006/main" xmlns:r="http://schemas.openxmlformats.org/officeDocument/2006/relationships" xmlns:p="http://schemas.openxmlformats.org/presentationml/2006/main">
   <p:cSld>
     <p:spTree>
@@ -5233,13 +4479,13 @@
                 <a:latin typeface="Aptos" panose="020B0004020202020204" pitchFamily="34" charset="0"/>
               </a:rPr>
               <a:pPr/>
-              <a:t>9</a:t>
+              <a:t>8</a:t>
             </a:fld>
             <a:r>
               <a:rPr lang="en-US" dirty="0">
                 <a:latin typeface="Aptos" panose="020B0004020202020204" pitchFamily="34" charset="0"/>
               </a:rPr>
-              <a:t> of 15</a:t>
+              <a:t> of 13</a:t>
             </a:r>
           </a:p>
         </p:txBody>
@@ -5278,6 +4524,229 @@
     <p:extLst>
       <p:ext uri="{BB962C8B-B14F-4D97-AF65-F5344CB8AC3E}">
         <p14:creationId xmlns:p14="http://schemas.microsoft.com/office/powerpoint/2010/main" val="2053308776"/>
+      </p:ext>
+    </p:extLst>
+  </p:cSld>
+  <p:clrMapOvr>
+    <a:masterClrMapping/>
+  </p:clrMapOvr>
+</p:sld>
+</file>
+
+<file path=ppt/slides/slide9.xml><?xml version="1.0" encoding="utf-8"?>
+<p:sld xmlns:a="http://schemas.openxmlformats.org/drawingml/2006/main" xmlns:r="http://schemas.openxmlformats.org/officeDocument/2006/relationships" xmlns:p="http://schemas.openxmlformats.org/presentationml/2006/main">
+  <p:cSld>
+    <p:spTree>
+      <p:nvGrpSpPr>
+        <p:cNvPr id="1" name=""/>
+        <p:cNvGrpSpPr/>
+        <p:nvPr/>
+      </p:nvGrpSpPr>
+      <p:grpSpPr>
+        <a:xfrm>
+          <a:off x="0" y="0"/>
+          <a:ext cx="0" cy="0"/>
+          <a:chOff x="0" y="0"/>
+          <a:chExt cx="0" cy="0"/>
+        </a:xfrm>
+      </p:grpSpPr>
+      <p:sp>
+        <p:nvSpPr>
+          <p:cNvPr id="2" name="Titolo 1">
+            <a:extLst>
+              <a:ext uri="{FF2B5EF4-FFF2-40B4-BE49-F238E27FC236}">
+                <a16:creationId xmlns:a16="http://schemas.microsoft.com/office/drawing/2014/main" id="{102AE1BD-8965-72C6-927D-819BAF7F1F62}"/>
+              </a:ext>
+            </a:extLst>
+          </p:cNvPr>
+          <p:cNvSpPr>
+            <a:spLocks noGrp="1"/>
+          </p:cNvSpPr>
+          <p:nvPr>
+            <p:ph type="title"/>
+          </p:nvPr>
+        </p:nvSpPr>
+        <p:spPr/>
+        <p:txBody>
+          <a:bodyPr>
+            <a:normAutofit/>
+          </a:bodyPr>
+          <a:lstStyle/>
+          <a:p>
+            <a:r>
+              <a:rPr lang="en-GB" sz="4000" dirty="0">
+                <a:latin typeface="Aptos" panose="020B0004020202020204" pitchFamily="34" charset="0"/>
+              </a:rPr>
+              <a:t>A study on mobile gaming</a:t>
+            </a:r>
+            <a:endParaRPr lang="en-GB" sz="4000" dirty="0"/>
+          </a:p>
+        </p:txBody>
+      </p:sp>
+      <p:sp>
+        <p:nvSpPr>
+          <p:cNvPr id="3" name="Segnaposto contenuto 2">
+            <a:extLst>
+              <a:ext uri="{FF2B5EF4-FFF2-40B4-BE49-F238E27FC236}">
+                <a16:creationId xmlns:a16="http://schemas.microsoft.com/office/drawing/2014/main" id="{0B672E95-C66D-804E-FB40-978D2F4DB097}"/>
+              </a:ext>
+            </a:extLst>
+          </p:cNvPr>
+          <p:cNvSpPr>
+            <a:spLocks noGrp="1"/>
+          </p:cNvSpPr>
+          <p:nvPr>
+            <p:ph idx="1"/>
+          </p:nvPr>
+        </p:nvSpPr>
+        <p:spPr>
+          <a:xfrm>
+            <a:off x="625959" y="1406413"/>
+            <a:ext cx="8046985" cy="4615696"/>
+          </a:xfrm>
+        </p:spPr>
+        <p:txBody>
+          <a:bodyPr>
+            <a:normAutofit/>
+          </a:bodyPr>
+          <a:lstStyle/>
+          <a:p>
+            <a:r>
+              <a:rPr lang="en-GB" sz="2200" b="1" dirty="0">
+                <a:latin typeface="Aptos" panose="020B0004020202020204" pitchFamily="34" charset="0"/>
+              </a:rPr>
+              <a:t>Findings</a:t>
+            </a:r>
+            <a:r>
+              <a:rPr lang="en-GB" sz="2200" dirty="0">
+                <a:latin typeface="Aptos" panose="020B0004020202020204" pitchFamily="34" charset="0"/>
+              </a:rPr>
+              <a:t>:</a:t>
+            </a:r>
+          </a:p>
+          <a:p>
+            <a:pPr lvl="1">
+              <a:buFont typeface="Courier New" panose="02070309020205020404" pitchFamily="49" charset="0"/>
+              <a:buChar char="o"/>
+            </a:pPr>
+            <a:r>
+              <a:rPr lang="en-GB" sz="2200" b="1" u="sng" dirty="0">
+                <a:latin typeface="Aptos" panose="020B0004020202020204" pitchFamily="34" charset="0"/>
+              </a:rPr>
+              <a:t>Latency</a:t>
+            </a:r>
+            <a:r>
+              <a:rPr lang="en-GB" sz="2200" dirty="0">
+                <a:latin typeface="Aptos" panose="020B0004020202020204" pitchFamily="34" charset="0"/>
+              </a:rPr>
+              <a:t>: Edge setup achieved network delay (ND) of &lt;20ms, outperforming cloud setups which showed &gt;50ms delay.</a:t>
+            </a:r>
+          </a:p>
+          <a:p>
+            <a:pPr lvl="1">
+              <a:buFont typeface="Courier New" panose="02070309020205020404" pitchFamily="49" charset="0"/>
+              <a:buChar char="o"/>
+            </a:pPr>
+            <a:r>
+              <a:rPr lang="en-GB" sz="2200" b="1" u="sng" dirty="0">
+                <a:latin typeface="Aptos" panose="020B0004020202020204" pitchFamily="34" charset="0"/>
+              </a:rPr>
+              <a:t>Virtualization</a:t>
+            </a:r>
+            <a:r>
+              <a:rPr lang="en-GB" sz="2200" dirty="0">
+                <a:latin typeface="Aptos" panose="020B0004020202020204" pitchFamily="34" charset="0"/>
+              </a:rPr>
+              <a:t>: Containers delivered near-bare-metal performance, while hypervisor virtualization incurred ~30% higher processing delay.</a:t>
+            </a:r>
+          </a:p>
+          <a:p>
+            <a:pPr lvl="1">
+              <a:buFont typeface="Courier New" panose="02070309020205020404" pitchFamily="49" charset="0"/>
+              <a:buChar char="o"/>
+            </a:pPr>
+            <a:r>
+              <a:rPr lang="en-GB" sz="2200" b="1" u="sng" dirty="0">
+                <a:latin typeface="Aptos" panose="020B0004020202020204" pitchFamily="34" charset="0"/>
+              </a:rPr>
+              <a:t>Resolution</a:t>
+            </a:r>
+            <a:r>
+              <a:rPr lang="en-GB" sz="2200" dirty="0">
+                <a:latin typeface="Aptos" panose="020B0004020202020204" pitchFamily="34" charset="0"/>
+              </a:rPr>
+              <a:t>: HD processing times below 70 </a:t>
+            </a:r>
+            <a:r>
+              <a:rPr lang="en-GB" sz="2200" dirty="0" err="1">
+                <a:latin typeface="Aptos" panose="020B0004020202020204" pitchFamily="34" charset="0"/>
+              </a:rPr>
+              <a:t>ms</a:t>
+            </a:r>
+            <a:r>
+              <a:rPr lang="en-GB" sz="2200" dirty="0">
+                <a:latin typeface="Aptos" panose="020B0004020202020204" pitchFamily="34" charset="0"/>
+              </a:rPr>
+              <a:t> with the edge setup even considering fast-paced interactions.</a:t>
+            </a:r>
+          </a:p>
+          <a:p>
+            <a:r>
+              <a:rPr lang="en-GB" sz="2200" b="1" dirty="0">
+                <a:latin typeface="Aptos" panose="020B0004020202020204" pitchFamily="34" charset="0"/>
+              </a:rPr>
+              <a:t>Conclusion</a:t>
+            </a:r>
+            <a:r>
+              <a:rPr lang="en-GB" sz="2200" dirty="0">
+                <a:latin typeface="Aptos" panose="020B0004020202020204" pitchFamily="34" charset="0"/>
+              </a:rPr>
+              <a:t>: Proximity of computational resources crucial to enhance the user experience.</a:t>
+            </a:r>
+          </a:p>
+        </p:txBody>
+      </p:sp>
+      <p:sp>
+        <p:nvSpPr>
+          <p:cNvPr id="4" name="Segnaposto numero diapositiva 3">
+            <a:extLst>
+              <a:ext uri="{FF2B5EF4-FFF2-40B4-BE49-F238E27FC236}">
+                <a16:creationId xmlns:a16="http://schemas.microsoft.com/office/drawing/2014/main" id="{6A42A948-B0AA-9936-C960-9A762B4A9493}"/>
+              </a:ext>
+            </a:extLst>
+          </p:cNvPr>
+          <p:cNvSpPr>
+            <a:spLocks noGrp="1"/>
+          </p:cNvSpPr>
+          <p:nvPr>
+            <p:ph type="sldNum" sz="quarter" idx="4"/>
+          </p:nvPr>
+        </p:nvSpPr>
+        <p:spPr/>
+        <p:txBody>
+          <a:bodyPr/>
+          <a:lstStyle/>
+          <a:p>
+            <a:fld id="{4D021CEB-2F22-4EA1-9BAF-E3833982B82A}" type="slidenum">
+              <a:rPr lang="en-US" smtClean="0">
+                <a:latin typeface="Aptos" panose="020B0004020202020204" pitchFamily="34" charset="0"/>
+              </a:rPr>
+              <a:pPr/>
+              <a:t>9</a:t>
+            </a:fld>
+            <a:r>
+              <a:rPr lang="en-US" dirty="0">
+                <a:latin typeface="Aptos" panose="020B0004020202020204" pitchFamily="34" charset="0"/>
+              </a:rPr>
+              <a:t> of 13</a:t>
+            </a:r>
+          </a:p>
+        </p:txBody>
+      </p:sp>
+    </p:spTree>
+    <p:extLst>
+      <p:ext uri="{BB962C8B-B14F-4D97-AF65-F5344CB8AC3E}">
+        <p14:creationId xmlns:p14="http://schemas.microsoft.com/office/powerpoint/2010/main" val="1807275355"/>
       </p:ext>
     </p:extLst>
   </p:cSld>

</xml_diff>